<commit_message>
Add selection and projection queries 1
</commit_message>
<xml_diff>
--- a/MongoDB Project.pptx
+++ b/MongoDB Project.pptx
@@ -5,10 +5,10 @@
     <p:sldMasterId id="2147483684" r:id="rId4"/>
   </p:sldMasterIdLst>
   <p:notesMasterIdLst>
-    <p:notesMasterId r:id="rId10"/>
+    <p:notesMasterId r:id="rId13"/>
   </p:notesMasterIdLst>
   <p:handoutMasterIdLst>
-    <p:handoutMasterId r:id="rId11"/>
+    <p:handoutMasterId r:id="rId14"/>
   </p:handoutMasterIdLst>
   <p:sldIdLst>
     <p:sldId id="256" r:id="rId5"/>
@@ -16,6 +16,9 @@
     <p:sldId id="261" r:id="rId7"/>
     <p:sldId id="262" r:id="rId8"/>
     <p:sldId id="263" r:id="rId9"/>
+    <p:sldId id="264" r:id="rId10"/>
+    <p:sldId id="266" r:id="rId11"/>
+    <p:sldId id="265" r:id="rId12"/>
   </p:sldIdLst>
   <p:sldSz cx="12192000" cy="6858000"/>
   <p:notesSz cx="6858000" cy="9144000"/>
@@ -4311,11 +4314,19 @@
               <a:buChar char="•"/>
             </a:pPr>
             <a:r>
-              <a:rPr lang="en-US" sz="2400" dirty="0"/>
+              <a:rPr lang="en-US" sz="2400" dirty="0">
+                <a:latin typeface="Tahoma" panose="020B0604030504040204" pitchFamily="34" charset="0"/>
+                <a:ea typeface="Tahoma" panose="020B0604030504040204" pitchFamily="34" charset="0"/>
+                <a:cs typeface="Tahoma" panose="020B0604030504040204" pitchFamily="34" charset="0"/>
+              </a:rPr>
               <a:t>Movies were fetched using </a:t>
             </a:r>
             <a:r>
-              <a:rPr lang="en-US" sz="3200" b="1" dirty="0"/>
+              <a:rPr lang="en-US" sz="3200" b="1" dirty="0">
+                <a:latin typeface="Tahoma" panose="020B0604030504040204" pitchFamily="34" charset="0"/>
+                <a:ea typeface="Tahoma" panose="020B0604030504040204" pitchFamily="34" charset="0"/>
+                <a:cs typeface="Tahoma" panose="020B0604030504040204" pitchFamily="34" charset="0"/>
+              </a:rPr>
               <a:t>The Movie DB API (TMDB)</a:t>
             </a:r>
           </a:p>
@@ -4325,15 +4336,27 @@
               <a:buChar char="•"/>
             </a:pPr>
             <a:r>
-              <a:rPr lang="en-US" sz="2400" dirty="0"/>
+              <a:rPr lang="en-US" sz="2400" dirty="0">
+                <a:latin typeface="Tahoma" panose="020B0604030504040204" pitchFamily="34" charset="0"/>
+                <a:ea typeface="Tahoma" panose="020B0604030504040204" pitchFamily="34" charset="0"/>
+                <a:cs typeface="Tahoma" panose="020B0604030504040204" pitchFamily="34" charset="0"/>
+              </a:rPr>
               <a:t>Shows were fetched using </a:t>
             </a:r>
             <a:r>
-              <a:rPr lang="en-US" sz="3200" b="1" dirty="0" err="1"/>
+              <a:rPr lang="en-US" sz="3200" b="1" dirty="0" err="1">
+                <a:latin typeface="Tahoma" panose="020B0604030504040204" pitchFamily="34" charset="0"/>
+                <a:ea typeface="Tahoma" panose="020B0604030504040204" pitchFamily="34" charset="0"/>
+                <a:cs typeface="Tahoma" panose="020B0604030504040204" pitchFamily="34" charset="0"/>
+              </a:rPr>
               <a:t>TVMaze</a:t>
             </a:r>
             <a:r>
-              <a:rPr lang="en-US" sz="3200" b="1" dirty="0"/>
+              <a:rPr lang="en-US" sz="3200" b="1" dirty="0">
+                <a:latin typeface="Tahoma" panose="020B0604030504040204" pitchFamily="34" charset="0"/>
+                <a:ea typeface="Tahoma" panose="020B0604030504040204" pitchFamily="34" charset="0"/>
+                <a:cs typeface="Tahoma" panose="020B0604030504040204" pitchFamily="34" charset="0"/>
+              </a:rPr>
               <a:t> API</a:t>
             </a:r>
           </a:p>
@@ -4399,7 +4422,11 @@
           <a:p>
             <a:pPr algn="ctr"/>
             <a:r>
-              <a:rPr lang="en-US" sz="2800" dirty="0"/>
+              <a:rPr lang="en-US" sz="2800" dirty="0">
+                <a:latin typeface="Tahoma" panose="020B0604030504040204" pitchFamily="34" charset="0"/>
+                <a:ea typeface="Tahoma" panose="020B0604030504040204" pitchFamily="34" charset="0"/>
+                <a:cs typeface="Tahoma" panose="020B0604030504040204" pitchFamily="34" charset="0"/>
+              </a:rPr>
               <a:t>API Response Data</a:t>
             </a:r>
           </a:p>
@@ -4464,7 +4491,11 @@
           <a:p>
             <a:pPr algn="ctr"/>
             <a:r>
-              <a:rPr lang="en-US" sz="2800" dirty="0"/>
+              <a:rPr lang="en-US" sz="2800" dirty="0">
+                <a:latin typeface="Tahoma" panose="020B0604030504040204" pitchFamily="34" charset="0"/>
+                <a:ea typeface="Tahoma" panose="020B0604030504040204" pitchFamily="34" charset="0"/>
+                <a:cs typeface="Tahoma" panose="020B0604030504040204" pitchFamily="34" charset="0"/>
+              </a:rPr>
               <a:t>Formatted Data</a:t>
             </a:r>
           </a:p>
@@ -4597,6 +4628,553 @@
     <p:extLst>
       <p:ext uri="{BB962C8B-B14F-4D97-AF65-F5344CB8AC3E}">
         <p14:creationId xmlns:p14="http://schemas.microsoft.com/office/powerpoint/2010/main" val="3326015372"/>
+      </p:ext>
+    </p:extLst>
+  </p:cSld>
+  <p:clrMapOvr>
+    <a:masterClrMapping/>
+  </p:clrMapOvr>
+</p:sld>
+</file>
+
+<file path=ppt/slides/slide6.xml><?xml version="1.0" encoding="utf-8"?>
+<p:sld xmlns:a="http://schemas.openxmlformats.org/drawingml/2006/main" xmlns:r="http://schemas.openxmlformats.org/officeDocument/2006/relationships" xmlns:p="http://schemas.openxmlformats.org/presentationml/2006/main">
+  <p:cSld>
+    <p:spTree>
+      <p:nvGrpSpPr>
+        <p:cNvPr id="1" name=""/>
+        <p:cNvGrpSpPr/>
+        <p:nvPr/>
+      </p:nvGrpSpPr>
+      <p:grpSpPr>
+        <a:xfrm>
+          <a:off x="0" y="0"/>
+          <a:ext cx="0" cy="0"/>
+          <a:chOff x="0" y="0"/>
+          <a:chExt cx="0" cy="0"/>
+        </a:xfrm>
+      </p:grpSpPr>
+      <p:sp>
+        <p:nvSpPr>
+          <p:cNvPr id="2" name="Title 1">
+            <a:extLst>
+              <a:ext uri="{FF2B5EF4-FFF2-40B4-BE49-F238E27FC236}">
+                <a16:creationId xmlns:a16="http://schemas.microsoft.com/office/drawing/2014/main" id="{F2153DD3-C27C-457D-ADDD-066D01CB95CA}"/>
+              </a:ext>
+            </a:extLst>
+          </p:cNvPr>
+          <p:cNvSpPr>
+            <a:spLocks noGrp="1"/>
+          </p:cNvSpPr>
+          <p:nvPr>
+            <p:ph type="title"/>
+          </p:nvPr>
+        </p:nvSpPr>
+        <p:spPr>
+          <a:xfrm>
+            <a:off x="679704" y="1097280"/>
+            <a:ext cx="4395216" cy="1737360"/>
+          </a:xfrm>
+        </p:spPr>
+        <p:txBody>
+          <a:bodyPr anchor="t"/>
+          <a:lstStyle/>
+          <a:p>
+            <a:r>
+              <a:rPr lang="en-US" dirty="0">
+                <a:latin typeface="Rockwell" panose="02060603020205020403" pitchFamily="18" charset="0"/>
+              </a:rPr>
+              <a:t>Database Queries</a:t>
+            </a:r>
+          </a:p>
+        </p:txBody>
+      </p:sp>
+      <p:pic>
+        <p:nvPicPr>
+          <p:cNvPr id="7" name="Picture Placeholder 6">
+            <a:extLst>
+              <a:ext uri="{FF2B5EF4-FFF2-40B4-BE49-F238E27FC236}">
+                <a16:creationId xmlns:a16="http://schemas.microsoft.com/office/drawing/2014/main" id="{37F44812-F514-46E8-8913-EDBD6B941E46}"/>
+              </a:ext>
+            </a:extLst>
+          </p:cNvPr>
+          <p:cNvPicPr>
+            <a:picLocks noGrp="1" noChangeAspect="1"/>
+          </p:cNvPicPr>
+          <p:nvPr>
+            <p:ph type="pic" idx="1"/>
+          </p:nvPr>
+        </p:nvPicPr>
+        <p:blipFill>
+          <a:blip r:embed="rId2"/>
+          <a:srcRect l="7296" r="7296"/>
+          <a:stretch>
+            <a:fillRect/>
+          </a:stretch>
+        </p:blipFill>
+        <p:spPr>
+          <a:xfrm>
+            <a:off x="5413248" y="1097280"/>
+            <a:ext cx="6099048" cy="4800600"/>
+          </a:xfrm>
+        </p:spPr>
+      </p:pic>
+      <p:sp>
+        <p:nvSpPr>
+          <p:cNvPr id="4" name="Content Placeholder 3">
+            <a:extLst>
+              <a:ext uri="{FF2B5EF4-FFF2-40B4-BE49-F238E27FC236}">
+                <a16:creationId xmlns:a16="http://schemas.microsoft.com/office/drawing/2014/main" id="{C73FF414-3511-4790-9099-1E632A6D975E}"/>
+              </a:ext>
+            </a:extLst>
+          </p:cNvPr>
+          <p:cNvSpPr>
+            <a:spLocks noGrp="1"/>
+          </p:cNvSpPr>
+          <p:nvPr>
+            <p:ph type="body" sz="half" idx="2"/>
+          </p:nvPr>
+        </p:nvSpPr>
+        <p:spPr>
+          <a:xfrm>
+            <a:off x="679704" y="2834640"/>
+            <a:ext cx="4395216" cy="2880360"/>
+          </a:xfrm>
+        </p:spPr>
+        <p:txBody>
+          <a:bodyPr/>
+          <a:lstStyle/>
+          <a:p>
+            <a:pPr marL="45720" indent="0">
+              <a:buNone/>
+            </a:pPr>
+            <a:r>
+              <a:rPr lang="en-US" sz="2800" dirty="0">
+                <a:solidFill>
+                  <a:schemeClr val="tx1">
+                    <a:lumMod val="95000"/>
+                    <a:lumOff val="5000"/>
+                  </a:schemeClr>
+                </a:solidFill>
+                <a:latin typeface="Tahoma" panose="020B0604030504040204" pitchFamily="34" charset="0"/>
+                <a:ea typeface="Tahoma" panose="020B0604030504040204" pitchFamily="34" charset="0"/>
+                <a:cs typeface="Tahoma" panose="020B0604030504040204" pitchFamily="34" charset="0"/>
+              </a:rPr>
+              <a:t>1- Selection:</a:t>
+            </a:r>
+          </a:p>
+          <a:p>
+            <a:pPr marL="342900" indent="-342900">
+              <a:buFont typeface="Arial" panose="020B0604020202020204" pitchFamily="34" charset="0"/>
+              <a:buChar char="•"/>
+            </a:pPr>
+            <a:r>
+              <a:rPr lang="en-US" sz="2200" dirty="0" err="1">
+                <a:latin typeface="Tahoma" panose="020B0604030504040204" pitchFamily="34" charset="0"/>
+                <a:ea typeface="Tahoma" panose="020B0604030504040204" pitchFamily="34" charset="0"/>
+                <a:cs typeface="Tahoma" panose="020B0604030504040204" pitchFamily="34" charset="0"/>
+              </a:rPr>
+              <a:t>db.mycol.find</a:t>
+            </a:r>
+            <a:r>
+              <a:rPr lang="en-US" sz="2200" dirty="0">
+                <a:latin typeface="Tahoma" panose="020B0604030504040204" pitchFamily="34" charset="0"/>
+                <a:ea typeface="Tahoma" panose="020B0604030504040204" pitchFamily="34" charset="0"/>
+                <a:cs typeface="Tahoma" panose="020B0604030504040204" pitchFamily="34" charset="0"/>
+              </a:rPr>
+              <a:t>();</a:t>
+            </a:r>
+          </a:p>
+          <a:p>
+            <a:pPr marL="342900" indent="-342900">
+              <a:buFont typeface="Arial" panose="020B0604020202020204" pitchFamily="34" charset="0"/>
+              <a:buChar char="•"/>
+            </a:pPr>
+            <a:r>
+              <a:rPr lang="en-US" sz="2200" dirty="0" err="1">
+                <a:latin typeface="Tahoma" panose="020B0604030504040204" pitchFamily="34" charset="0"/>
+                <a:ea typeface="Tahoma" panose="020B0604030504040204" pitchFamily="34" charset="0"/>
+                <a:cs typeface="Tahoma" panose="020B0604030504040204" pitchFamily="34" charset="0"/>
+              </a:rPr>
+              <a:t>db.mycol.find</a:t>
+            </a:r>
+            <a:r>
+              <a:rPr lang="en-US" sz="2200" dirty="0">
+                <a:latin typeface="Tahoma" panose="020B0604030504040204" pitchFamily="34" charset="0"/>
+                <a:ea typeface="Tahoma" panose="020B0604030504040204" pitchFamily="34" charset="0"/>
+                <a:cs typeface="Tahoma" panose="020B0604030504040204" pitchFamily="34" charset="0"/>
+              </a:rPr>
+              <a:t>().pretty();</a:t>
+            </a:r>
+          </a:p>
+          <a:p>
+            <a:pPr marL="342900" indent="-342900">
+              <a:buFont typeface="Arial" panose="020B0604020202020204" pitchFamily="34" charset="0"/>
+              <a:buChar char="•"/>
+            </a:pPr>
+            <a:r>
+              <a:rPr lang="en-US" sz="2200" dirty="0" err="1">
+                <a:latin typeface="Tahoma" panose="020B0604030504040204" pitchFamily="34" charset="0"/>
+                <a:ea typeface="Tahoma" panose="020B0604030504040204" pitchFamily="34" charset="0"/>
+                <a:cs typeface="Tahoma" panose="020B0604030504040204" pitchFamily="34" charset="0"/>
+              </a:rPr>
+              <a:t>db.mycol.find</a:t>
+            </a:r>
+            <a:r>
+              <a:rPr lang="en-US" sz="2200" dirty="0">
+                <a:latin typeface="Tahoma" panose="020B0604030504040204" pitchFamily="34" charset="0"/>
+                <a:ea typeface="Tahoma" panose="020B0604030504040204" pitchFamily="34" charset="0"/>
+                <a:cs typeface="Tahoma" panose="020B0604030504040204" pitchFamily="34" charset="0"/>
+              </a:rPr>
+              <a:t>({“</a:t>
+            </a:r>
+            <a:r>
+              <a:rPr lang="en-US" sz="2200" dirty="0" err="1">
+                <a:latin typeface="Tahoma" panose="020B0604030504040204" pitchFamily="34" charset="0"/>
+                <a:ea typeface="Tahoma" panose="020B0604030504040204" pitchFamily="34" charset="0"/>
+                <a:cs typeface="Tahoma" panose="020B0604030504040204" pitchFamily="34" charset="0"/>
+              </a:rPr>
+              <a:t>key":“value</a:t>
+            </a:r>
+            <a:r>
+              <a:rPr lang="en-US" sz="2200" dirty="0">
+                <a:latin typeface="Tahoma" panose="020B0604030504040204" pitchFamily="34" charset="0"/>
+                <a:ea typeface="Tahoma" panose="020B0604030504040204" pitchFamily="34" charset="0"/>
+                <a:cs typeface="Tahoma" panose="020B0604030504040204" pitchFamily="34" charset="0"/>
+              </a:rPr>
+              <a:t>/condition"}).pretty();</a:t>
+            </a:r>
+          </a:p>
+        </p:txBody>
+      </p:sp>
+    </p:spTree>
+    <p:extLst>
+      <p:ext uri="{BB962C8B-B14F-4D97-AF65-F5344CB8AC3E}">
+        <p14:creationId xmlns:p14="http://schemas.microsoft.com/office/powerpoint/2010/main" val="2127507231"/>
+      </p:ext>
+    </p:extLst>
+  </p:cSld>
+  <p:clrMapOvr>
+    <a:masterClrMapping/>
+  </p:clrMapOvr>
+</p:sld>
+</file>
+
+<file path=ppt/slides/slide7.xml><?xml version="1.0" encoding="utf-8"?>
+<p:sld xmlns:a="http://schemas.openxmlformats.org/drawingml/2006/main" xmlns:r="http://schemas.openxmlformats.org/officeDocument/2006/relationships" xmlns:p="http://schemas.openxmlformats.org/presentationml/2006/main">
+  <p:cSld>
+    <p:spTree>
+      <p:nvGrpSpPr>
+        <p:cNvPr id="1" name=""/>
+        <p:cNvGrpSpPr/>
+        <p:nvPr/>
+      </p:nvGrpSpPr>
+      <p:grpSpPr>
+        <a:xfrm>
+          <a:off x="0" y="0"/>
+          <a:ext cx="0" cy="0"/>
+          <a:chOff x="0" y="0"/>
+          <a:chExt cx="0" cy="0"/>
+        </a:xfrm>
+      </p:grpSpPr>
+      <p:sp>
+        <p:nvSpPr>
+          <p:cNvPr id="4" name="Content Placeholder 3">
+            <a:extLst>
+              <a:ext uri="{FF2B5EF4-FFF2-40B4-BE49-F238E27FC236}">
+                <a16:creationId xmlns:a16="http://schemas.microsoft.com/office/drawing/2014/main" id="{C73FF414-3511-4790-9099-1E632A6D975E}"/>
+              </a:ext>
+            </a:extLst>
+          </p:cNvPr>
+          <p:cNvSpPr>
+            <a:spLocks noGrp="1"/>
+          </p:cNvSpPr>
+          <p:nvPr>
+            <p:ph type="body" sz="half" idx="2"/>
+          </p:nvPr>
+        </p:nvSpPr>
+        <p:spPr>
+          <a:xfrm>
+            <a:off x="679703" y="1069847"/>
+            <a:ext cx="4462139" cy="4800600"/>
+          </a:xfrm>
+        </p:spPr>
+        <p:txBody>
+          <a:bodyPr anchor="ctr"/>
+          <a:lstStyle/>
+          <a:p>
+            <a:pPr indent="0">
+              <a:spcBef>
+                <a:spcPts val="600"/>
+              </a:spcBef>
+              <a:spcAft>
+                <a:spcPts val="600"/>
+              </a:spcAft>
+              <a:buNone/>
+            </a:pPr>
+            <a:r>
+              <a:rPr lang="en-US" sz="2800" dirty="0">
+                <a:solidFill>
+                  <a:schemeClr val="tx1">
+                    <a:lumMod val="95000"/>
+                    <a:lumOff val="5000"/>
+                  </a:schemeClr>
+                </a:solidFill>
+                <a:latin typeface="Tahoma" panose="020B0604030504040204" pitchFamily="34" charset="0"/>
+                <a:ea typeface="Tahoma" panose="020B0604030504040204" pitchFamily="34" charset="0"/>
+                <a:cs typeface="Tahoma" panose="020B0604030504040204" pitchFamily="34" charset="0"/>
+              </a:rPr>
+              <a:t>2- Projection:</a:t>
+            </a:r>
+          </a:p>
+          <a:p>
+            <a:pPr indent="-342900">
+              <a:spcBef>
+                <a:spcPts val="600"/>
+              </a:spcBef>
+              <a:spcAft>
+                <a:spcPts val="600"/>
+              </a:spcAft>
+              <a:buFont typeface="Arial" panose="020B0604020202020204" pitchFamily="34" charset="0"/>
+              <a:buChar char="•"/>
+            </a:pPr>
+            <a:r>
+              <a:rPr lang="en-US" sz="2200" b="1" dirty="0" err="1">
+                <a:latin typeface="Tahoma" panose="020B0604030504040204" pitchFamily="34" charset="0"/>
+                <a:ea typeface="Tahoma" panose="020B0604030504040204" pitchFamily="34" charset="0"/>
+                <a:cs typeface="Tahoma" panose="020B0604030504040204" pitchFamily="34" charset="0"/>
+              </a:rPr>
+              <a:t>db.COLLECTION_NAME.find</a:t>
+            </a:r>
+            <a:r>
+              <a:rPr lang="en-US" sz="2200" b="1" dirty="0">
+                <a:latin typeface="Tahoma" panose="020B0604030504040204" pitchFamily="34" charset="0"/>
+                <a:ea typeface="Tahoma" panose="020B0604030504040204" pitchFamily="34" charset="0"/>
+                <a:cs typeface="Tahoma" panose="020B0604030504040204" pitchFamily="34" charset="0"/>
+              </a:rPr>
+              <a:t>({}, {KEY1: 1, KEY2: 1})</a:t>
+            </a:r>
+          </a:p>
+          <a:p>
+            <a:pPr marL="0" lvl="1" indent="-342900">
+              <a:spcBef>
+                <a:spcPts val="600"/>
+              </a:spcBef>
+              <a:spcAft>
+                <a:spcPts val="600"/>
+              </a:spcAft>
+              <a:buFont typeface="Arial" panose="020B0604020202020204" pitchFamily="34" charset="0"/>
+              <a:buChar char="•"/>
+            </a:pPr>
+            <a:r>
+              <a:rPr lang="en-US" sz="2200" dirty="0">
+                <a:latin typeface="Tahoma" panose="020B0604030504040204" pitchFamily="34" charset="0"/>
+                <a:ea typeface="Tahoma" panose="020B0604030504040204" pitchFamily="34" charset="0"/>
+                <a:cs typeface="Tahoma" panose="020B0604030504040204" pitchFamily="34" charset="0"/>
+              </a:rPr>
+              <a:t>KEY: 1 -&gt; Show KEY</a:t>
+            </a:r>
+          </a:p>
+          <a:p>
+            <a:pPr marL="0" lvl="1" indent="-342900">
+              <a:spcBef>
+                <a:spcPts val="600"/>
+              </a:spcBef>
+              <a:spcAft>
+                <a:spcPts val="600"/>
+              </a:spcAft>
+              <a:buFont typeface="Arial" panose="020B0604020202020204" pitchFamily="34" charset="0"/>
+              <a:buChar char="•"/>
+            </a:pPr>
+            <a:r>
+              <a:rPr lang="en-US" sz="2200" dirty="0">
+                <a:latin typeface="Tahoma" panose="020B0604030504040204" pitchFamily="34" charset="0"/>
+                <a:ea typeface="Tahoma" panose="020B0604030504040204" pitchFamily="34" charset="0"/>
+                <a:cs typeface="Tahoma" panose="020B0604030504040204" pitchFamily="34" charset="0"/>
+              </a:rPr>
+              <a:t>KEY: 0 -&gt; Hide KEY</a:t>
+            </a:r>
+          </a:p>
+        </p:txBody>
+      </p:sp>
+      <p:pic>
+        <p:nvPicPr>
+          <p:cNvPr id="10" name="Picture Placeholder 9">
+            <a:extLst>
+              <a:ext uri="{FF2B5EF4-FFF2-40B4-BE49-F238E27FC236}">
+                <a16:creationId xmlns:a16="http://schemas.microsoft.com/office/drawing/2014/main" id="{3E500747-D8F8-47FB-BBBB-DC6B6BE909F1}"/>
+              </a:ext>
+            </a:extLst>
+          </p:cNvPr>
+          <p:cNvPicPr>
+            <a:picLocks noGrp="1" noChangeAspect="1"/>
+          </p:cNvPicPr>
+          <p:nvPr>
+            <p:ph type="pic" idx="1"/>
+          </p:nvPr>
+        </p:nvPicPr>
+        <p:blipFill>
+          <a:blip r:embed="rId2"/>
+          <a:srcRect l="4836" r="4836"/>
+          <a:stretch>
+            <a:fillRect/>
+          </a:stretch>
+        </p:blipFill>
+        <p:spPr/>
+      </p:pic>
+    </p:spTree>
+    <p:extLst>
+      <p:ext uri="{BB962C8B-B14F-4D97-AF65-F5344CB8AC3E}">
+        <p14:creationId xmlns:p14="http://schemas.microsoft.com/office/powerpoint/2010/main" val="3978817235"/>
+      </p:ext>
+    </p:extLst>
+  </p:cSld>
+  <p:clrMapOvr>
+    <a:masterClrMapping/>
+  </p:clrMapOvr>
+</p:sld>
+</file>
+
+<file path=ppt/slides/slide8.xml><?xml version="1.0" encoding="utf-8"?>
+<p:sld xmlns:a="http://schemas.openxmlformats.org/drawingml/2006/main" xmlns:r="http://schemas.openxmlformats.org/officeDocument/2006/relationships" xmlns:p="http://schemas.openxmlformats.org/presentationml/2006/main">
+  <p:cSld>
+    <p:spTree>
+      <p:nvGrpSpPr>
+        <p:cNvPr id="1" name=""/>
+        <p:cNvGrpSpPr/>
+        <p:nvPr/>
+      </p:nvGrpSpPr>
+      <p:grpSpPr>
+        <a:xfrm>
+          <a:off x="0" y="0"/>
+          <a:ext cx="0" cy="0"/>
+          <a:chOff x="0" y="0"/>
+          <a:chExt cx="0" cy="0"/>
+        </a:xfrm>
+      </p:grpSpPr>
+      <p:sp>
+        <p:nvSpPr>
+          <p:cNvPr id="6" name="Text Placeholder 5">
+            <a:extLst>
+              <a:ext uri="{FF2B5EF4-FFF2-40B4-BE49-F238E27FC236}">
+                <a16:creationId xmlns:a16="http://schemas.microsoft.com/office/drawing/2014/main" id="{8F8B411F-C9E3-4641-B591-CB924CBDDB50}"/>
+              </a:ext>
+            </a:extLst>
+          </p:cNvPr>
+          <p:cNvSpPr>
+            <a:spLocks noGrp="1"/>
+          </p:cNvSpPr>
+          <p:nvPr>
+            <p:ph type="body" idx="1"/>
+          </p:nvPr>
+        </p:nvSpPr>
+        <p:spPr>
+          <a:xfrm>
+            <a:off x="1143000" y="580958"/>
+            <a:ext cx="4754880" cy="777240"/>
+          </a:xfrm>
+        </p:spPr>
+        <p:txBody>
+          <a:bodyPr/>
+          <a:lstStyle/>
+          <a:p>
+            <a:endParaRPr lang="en-US" dirty="0"/>
+          </a:p>
+        </p:txBody>
+      </p:sp>
+      <p:pic>
+        <p:nvPicPr>
+          <p:cNvPr id="3" name="Content Placeholder 2">
+            <a:extLst>
+              <a:ext uri="{FF2B5EF4-FFF2-40B4-BE49-F238E27FC236}">
+                <a16:creationId xmlns:a16="http://schemas.microsoft.com/office/drawing/2014/main" id="{9615D78D-D787-40A8-8E04-1FC6C17C32B7}"/>
+              </a:ext>
+            </a:extLst>
+          </p:cNvPr>
+          <p:cNvPicPr>
+            <a:picLocks noGrp="1" noChangeAspect="1"/>
+          </p:cNvPicPr>
+          <p:nvPr>
+            <p:ph sz="half" idx="2"/>
+          </p:nvPr>
+        </p:nvPicPr>
+        <p:blipFill>
+          <a:blip r:embed="rId2"/>
+          <a:stretch>
+            <a:fillRect/>
+          </a:stretch>
+        </p:blipFill>
+        <p:spPr>
+          <a:xfrm>
+            <a:off x="1143000" y="1358198"/>
+            <a:ext cx="4754880" cy="4747327"/>
+          </a:xfrm>
+        </p:spPr>
+      </p:pic>
+      <p:sp>
+        <p:nvSpPr>
+          <p:cNvPr id="8" name="Text Placeholder 7">
+            <a:extLst>
+              <a:ext uri="{FF2B5EF4-FFF2-40B4-BE49-F238E27FC236}">
+                <a16:creationId xmlns:a16="http://schemas.microsoft.com/office/drawing/2014/main" id="{666DA11C-2B17-40CE-A991-030E8568F1FD}"/>
+              </a:ext>
+            </a:extLst>
+          </p:cNvPr>
+          <p:cNvSpPr>
+            <a:spLocks noGrp="1"/>
+          </p:cNvSpPr>
+          <p:nvPr>
+            <p:ph type="body" sz="quarter" idx="3"/>
+          </p:nvPr>
+        </p:nvSpPr>
+        <p:spPr>
+          <a:xfrm>
+            <a:off x="6096000" y="580958"/>
+            <a:ext cx="4754880" cy="777240"/>
+          </a:xfrm>
+        </p:spPr>
+        <p:txBody>
+          <a:bodyPr/>
+          <a:lstStyle/>
+          <a:p>
+            <a:endParaRPr lang="en-US" dirty="0"/>
+          </a:p>
+        </p:txBody>
+      </p:sp>
+      <p:sp>
+        <p:nvSpPr>
+          <p:cNvPr id="9" name="Content Placeholder 8">
+            <a:extLst>
+              <a:ext uri="{FF2B5EF4-FFF2-40B4-BE49-F238E27FC236}">
+                <a16:creationId xmlns:a16="http://schemas.microsoft.com/office/drawing/2014/main" id="{94E12BF2-35A6-4D45-B9CD-85102158F038}"/>
+              </a:ext>
+            </a:extLst>
+          </p:cNvPr>
+          <p:cNvSpPr>
+            <a:spLocks noGrp="1"/>
+          </p:cNvSpPr>
+          <p:nvPr>
+            <p:ph sz="quarter" idx="4"/>
+          </p:nvPr>
+        </p:nvSpPr>
+        <p:spPr>
+          <a:xfrm>
+            <a:off x="6096000" y="1357435"/>
+            <a:ext cx="4754880" cy="4747327"/>
+          </a:xfrm>
+        </p:spPr>
+        <p:txBody>
+          <a:bodyPr/>
+          <a:lstStyle/>
+          <a:p>
+            <a:endParaRPr lang="en-US" dirty="0"/>
+          </a:p>
+        </p:txBody>
+      </p:sp>
+    </p:spTree>
+    <p:extLst>
+      <p:ext uri="{BB962C8B-B14F-4D97-AF65-F5344CB8AC3E}">
+        <p14:creationId xmlns:p14="http://schemas.microsoft.com/office/powerpoint/2010/main" val="2479869723"/>
       </p:ext>
     </p:extLst>
   </p:cSld>
@@ -5434,23 +6012,6 @@
 </file>
 
 <file path=customXml/item1.xml><?xml version="1.0" encoding="utf-8"?>
-<p:properties xmlns:p="http://schemas.microsoft.com/office/2006/metadata/properties" xmlns:xsi="http://www.w3.org/2001/XMLSchema-instance" xmlns:pc="http://schemas.microsoft.com/office/infopath/2007/PartnerControls">
-  <documentManagement>
-    <MediaServiceKeyPoints xmlns="71af3243-3dd4-4a8d-8c0d-dd76da1f02a5" xsi:nil="true"/>
-  </documentManagement>
-</p:properties>
-</file>
-
-<file path=customXml/item2.xml><?xml version="1.0" encoding="utf-8"?>
-<?mso-contentType ?>
-<FormTemplates xmlns="http://schemas.microsoft.com/sharepoint/v3/contenttype/forms">
-  <Display>DocumentLibraryForm</Display>
-  <Edit>DocumentLibraryForm</Edit>
-  <New>DocumentLibraryForm</New>
-</FormTemplates>
-</file>
-
-<file path=customXml/item3.xml><?xml version="1.0" encoding="utf-8"?>
 <ct:contentTypeSchema xmlns:ct="http://schemas.microsoft.com/office/2006/metadata/contentType" xmlns:ma="http://schemas.microsoft.com/office/2006/metadata/properties/metaAttributes" ct:_="" ma:_="" ma:contentTypeName="Document" ma:contentTypeID="0x01010079F111ED35F8CC479449609E8A0923A6" ma:contentTypeVersion="11" ma:contentTypeDescription="Create a new document." ma:contentTypeScope="" ma:versionID="96291512c1ee715ab617f4c07df79fc1">
   <xsd:schema xmlns:xsd="http://www.w3.org/2001/XMLSchema" xmlns:xs="http://www.w3.org/2001/XMLSchema" xmlns:p="http://schemas.microsoft.com/office/2006/metadata/properties" xmlns:ns2="71af3243-3dd4-4a8d-8c0d-dd76da1f02a5" xmlns:ns3="16c05727-aa75-4e4a-9b5f-8a80a1165891" targetNamespace="http://schemas.microsoft.com/office/2006/metadata/properties" ma:root="true" ma:fieldsID="8256c27c40ca5c40ce1cf6c44f0205df" ns2:_="" ns3:_="">
     <xsd:import namespace="71af3243-3dd4-4a8d-8c0d-dd76da1f02a5"/>
@@ -5661,25 +6222,24 @@
 </ct:contentTypeSchema>
 </file>
 
-<file path=customXml/itemProps1.xml><?xml version="1.0" encoding="utf-8"?>
-<ds:datastoreItem xmlns:ds="http://schemas.openxmlformats.org/officeDocument/2006/customXml" ds:itemID="{3D6CA70E-ED75-4FF0-A862-8EF12B737755}">
-  <ds:schemaRefs>
-    <ds:schemaRef ds:uri="http://schemas.microsoft.com/office/2006/metadata/properties"/>
-    <ds:schemaRef ds:uri="http://schemas.microsoft.com/office/infopath/2007/PartnerControls"/>
-    <ds:schemaRef ds:uri="71af3243-3dd4-4a8d-8c0d-dd76da1f02a5"/>
-  </ds:schemaRefs>
-</ds:datastoreItem>
+<file path=customXml/item2.xml><?xml version="1.0" encoding="utf-8"?>
+<?mso-contentType ?>
+<FormTemplates xmlns="http://schemas.microsoft.com/sharepoint/v3/contenttype/forms">
+  <Display>DocumentLibraryForm</Display>
+  <Edit>DocumentLibraryForm</Edit>
+  <New>DocumentLibraryForm</New>
+</FormTemplates>
 </file>
 
-<file path=customXml/itemProps2.xml><?xml version="1.0" encoding="utf-8"?>
-<ds:datastoreItem xmlns:ds="http://schemas.openxmlformats.org/officeDocument/2006/customXml" ds:itemID="{ABF1ABED-93B7-45AC-A513-2CB1FF159AFF}">
-  <ds:schemaRefs>
-    <ds:schemaRef ds:uri="http://schemas.microsoft.com/sharepoint/v3/contenttype/forms"/>
-  </ds:schemaRefs>
-</ds:datastoreItem>
+<file path=customXml/item3.xml><?xml version="1.0" encoding="utf-8"?>
+<p:properties xmlns:p="http://schemas.microsoft.com/office/2006/metadata/properties" xmlns:xsi="http://www.w3.org/2001/XMLSchema-instance" xmlns:pc="http://schemas.microsoft.com/office/infopath/2007/PartnerControls">
+  <documentManagement>
+    <MediaServiceKeyPoints xmlns="71af3243-3dd4-4a8d-8c0d-dd76da1f02a5" xsi:nil="true"/>
+  </documentManagement>
+</p:properties>
 </file>
 
-<file path=customXml/itemProps3.xml><?xml version="1.0" encoding="utf-8"?>
+<file path=customXml/itemProps1.xml><?xml version="1.0" encoding="utf-8"?>
 <ds:datastoreItem xmlns:ds="http://schemas.openxmlformats.org/officeDocument/2006/customXml" ds:itemID="{79B27744-7857-4992-B755-05855FC59147}">
   <ds:schemaRefs>
     <ds:schemaRef ds:uri="http://schemas.microsoft.com/office/2006/metadata/contentType"/>
@@ -5696,4 +6256,22 @@
     <ds:schemaRef ds:uri="http://schemas.microsoft.com/internal/obd"/>
   </ds:schemaRefs>
 </ds:datastoreItem>
+</file>
+
+<file path=customXml/itemProps2.xml><?xml version="1.0" encoding="utf-8"?>
+<ds:datastoreItem xmlns:ds="http://schemas.openxmlformats.org/officeDocument/2006/customXml" ds:itemID="{ABF1ABED-93B7-45AC-A513-2CB1FF159AFF}">
+  <ds:schemaRefs>
+    <ds:schemaRef ds:uri="http://schemas.microsoft.com/sharepoint/v3/contenttype/forms"/>
+  </ds:schemaRefs>
+</ds:datastoreItem>
+</file>
+
+<file path=customXml/itemProps3.xml><?xml version="1.0" encoding="utf-8"?>
+<ds:datastoreItem xmlns:ds="http://schemas.openxmlformats.org/officeDocument/2006/customXml" ds:itemID="{3D6CA70E-ED75-4FF0-A862-8EF12B737755}">
+  <ds:schemaRefs>
+    <ds:schemaRef ds:uri="http://schemas.microsoft.com/office/2006/metadata/properties"/>
+    <ds:schemaRef ds:uri="http://schemas.microsoft.com/office/infopath/2007/PartnerControls"/>
+    <ds:schemaRef ds:uri="71af3243-3dd4-4a8d-8c0d-dd76da1f02a5"/>
+  </ds:schemaRefs>
+</ds:datastoreItem>
 </file>
</xml_diff>

<commit_message>
Add the presentation introduction
</commit_message>
<xml_diff>
--- a/MongoDB Project.pptx
+++ b/MongoDB Project.pptx
@@ -5,20 +5,25 @@
     <p:sldMasterId id="2147483684" r:id="rId4"/>
   </p:sldMasterIdLst>
   <p:notesMasterIdLst>
-    <p:notesMasterId r:id="rId13"/>
+    <p:notesMasterId r:id="rId18"/>
   </p:notesMasterIdLst>
   <p:handoutMasterIdLst>
-    <p:handoutMasterId r:id="rId14"/>
+    <p:handoutMasterId r:id="rId19"/>
   </p:handoutMasterIdLst>
   <p:sldIdLst>
     <p:sldId id="256" r:id="rId5"/>
-    <p:sldId id="260" r:id="rId6"/>
-    <p:sldId id="261" r:id="rId7"/>
-    <p:sldId id="262" r:id="rId8"/>
-    <p:sldId id="263" r:id="rId9"/>
-    <p:sldId id="264" r:id="rId10"/>
-    <p:sldId id="266" r:id="rId11"/>
-    <p:sldId id="265" r:id="rId12"/>
+    <p:sldId id="257" r:id="rId6"/>
+    <p:sldId id="258" r:id="rId7"/>
+    <p:sldId id="259" r:id="rId8"/>
+    <p:sldId id="267" r:id="rId9"/>
+    <p:sldId id="268" r:id="rId10"/>
+    <p:sldId id="269" r:id="rId11"/>
+    <p:sldId id="261" r:id="rId12"/>
+    <p:sldId id="262" r:id="rId13"/>
+    <p:sldId id="263" r:id="rId14"/>
+    <p:sldId id="264" r:id="rId15"/>
+    <p:sldId id="266" r:id="rId16"/>
+    <p:sldId id="265" r:id="rId17"/>
   </p:sldIdLst>
   <p:sldSz cx="12192000" cy="6858000"/>
   <p:notesSz cx="6858000" cy="9144000"/>
@@ -222,7 +227,7 @@
           <a:p>
             <a:fld id="{2F51DC69-60C3-4CF7-A135-6E702ECCE0F0}" type="datetimeFigureOut">
               <a:rPr lang="en-US" smtClean="0"/>
-              <a:t>1/13/2020</a:t>
+              <a:t>1/14/2020</a:t>
             </a:fld>
             <a:endParaRPr lang="en-US" dirty="0"/>
           </a:p>
@@ -399,7 +404,7 @@
           <a:p>
             <a:fld id="{36E3EC7B-6C72-4FBB-87DF-2BD2CB7DC1E6}" type="datetimeFigureOut">
               <a:rPr lang="en-US" smtClean="0"/>
-              <a:t>1/13/2020</a:t>
+              <a:t>1/14/2020</a:t>
             </a:fld>
             <a:endParaRPr lang="en-US" dirty="0"/>
           </a:p>
@@ -774,6 +779,1101 @@
 </p:notes>
 </file>
 
+<file path=ppt/notesSlides/notesSlide2.xml><?xml version="1.0" encoding="utf-8"?>
+<p:notes xmlns:a="http://schemas.openxmlformats.org/drawingml/2006/main" xmlns:r="http://schemas.openxmlformats.org/officeDocument/2006/relationships" xmlns:p="http://schemas.openxmlformats.org/presentationml/2006/main" showMasterSp="0" showMasterPhAnim="0">
+  <p:cSld>
+    <p:spTree>
+      <p:nvGrpSpPr>
+        <p:cNvPr id="1" name="Shape 95"/>
+        <p:cNvGrpSpPr/>
+        <p:nvPr/>
+      </p:nvGrpSpPr>
+      <p:grpSpPr>
+        <a:xfrm>
+          <a:off x="0" y="0"/>
+          <a:ext cx="0" cy="0"/>
+          <a:chOff x="0" y="0"/>
+          <a:chExt cx="0" cy="0"/>
+        </a:xfrm>
+      </p:grpSpPr>
+      <p:sp>
+        <p:nvSpPr>
+          <p:cNvPr id="96" name="Google Shape;96;p2:notes"/>
+          <p:cNvSpPr txBox="1">
+            <a:spLocks noGrp="1"/>
+          </p:cNvSpPr>
+          <p:nvPr>
+            <p:ph type="body" idx="1"/>
+          </p:nvPr>
+        </p:nvSpPr>
+        <p:spPr>
+          <a:xfrm>
+            <a:off x="685800" y="4400550"/>
+            <a:ext cx="5486400" cy="3600450"/>
+          </a:xfrm>
+          <a:prstGeom prst="rect">
+            <a:avLst/>
+          </a:prstGeom>
+        </p:spPr>
+        <p:txBody>
+          <a:bodyPr spcFirstLastPara="1" wrap="square" lIns="91425" tIns="45700" rIns="91425" bIns="45700" anchor="t" anchorCtr="0">
+            <a:noAutofit/>
+          </a:bodyPr>
+          <a:lstStyle/>
+          <a:p>
+            <a:pPr marL="0" lvl="0" indent="0" algn="l" rtl="0">
+              <a:spcBef>
+                <a:spcPts val="0"/>
+              </a:spcBef>
+              <a:spcAft>
+                <a:spcPts val="0"/>
+              </a:spcAft>
+              <a:buNone/>
+            </a:pPr>
+            <a:endParaRPr/>
+          </a:p>
+        </p:txBody>
+      </p:sp>
+      <p:sp>
+        <p:nvSpPr>
+          <p:cNvPr id="97" name="Google Shape;97;p2:notes"/>
+          <p:cNvSpPr>
+            <a:spLocks noGrp="1" noRot="1" noChangeAspect="1"/>
+          </p:cNvSpPr>
+          <p:nvPr>
+            <p:ph type="sldImg" idx="2"/>
+          </p:nvPr>
+        </p:nvSpPr>
+        <p:spPr>
+          <a:xfrm>
+            <a:off x="685800" y="1143000"/>
+            <a:ext cx="5486400" cy="3086100"/>
+          </a:xfrm>
+          <a:custGeom>
+            <a:avLst/>
+            <a:gdLst/>
+            <a:ahLst/>
+            <a:cxnLst/>
+            <a:rect l="l" t="t" r="r" b="b"/>
+            <a:pathLst>
+              <a:path w="120000" h="120000" extrusionOk="0">
+                <a:moveTo>
+                  <a:pt x="0" y="0"/>
+                </a:moveTo>
+                <a:lnTo>
+                  <a:pt x="120000" y="0"/>
+                </a:lnTo>
+                <a:lnTo>
+                  <a:pt x="120000" y="120000"/>
+                </a:lnTo>
+                <a:lnTo>
+                  <a:pt x="0" y="120000"/>
+                </a:lnTo>
+                <a:close/>
+              </a:path>
+            </a:pathLst>
+          </a:custGeom>
+        </p:spPr>
+      </p:sp>
+    </p:spTree>
+  </p:cSld>
+  <p:clrMapOvr>
+    <a:masterClrMapping/>
+  </p:clrMapOvr>
+</p:notes>
+</file>
+
+<file path=ppt/notesSlides/notesSlide3.xml><?xml version="1.0" encoding="utf-8"?>
+<p:notes xmlns:a="http://schemas.openxmlformats.org/drawingml/2006/main" xmlns:r="http://schemas.openxmlformats.org/officeDocument/2006/relationships" xmlns:p="http://schemas.openxmlformats.org/presentationml/2006/main" showMasterSp="0" showMasterPhAnim="0">
+  <p:cSld>
+    <p:spTree>
+      <p:nvGrpSpPr>
+        <p:cNvPr id="1" name="Shape 101"/>
+        <p:cNvGrpSpPr/>
+        <p:nvPr/>
+      </p:nvGrpSpPr>
+      <p:grpSpPr>
+        <a:xfrm>
+          <a:off x="0" y="0"/>
+          <a:ext cx="0" cy="0"/>
+          <a:chOff x="0" y="0"/>
+          <a:chExt cx="0" cy="0"/>
+        </a:xfrm>
+      </p:grpSpPr>
+      <p:sp>
+        <p:nvSpPr>
+          <p:cNvPr id="102" name="Google Shape;102;g7668f30493_0_0:notes"/>
+          <p:cNvSpPr>
+            <a:spLocks noGrp="1" noRot="1" noChangeAspect="1"/>
+          </p:cNvSpPr>
+          <p:nvPr>
+            <p:ph type="sldImg" idx="2"/>
+          </p:nvPr>
+        </p:nvSpPr>
+        <p:spPr>
+          <a:xfrm>
+            <a:off x="685800" y="1143000"/>
+            <a:ext cx="5486400" cy="3086100"/>
+          </a:xfrm>
+          <a:custGeom>
+            <a:avLst/>
+            <a:gdLst/>
+            <a:ahLst/>
+            <a:cxnLst/>
+            <a:rect l="l" t="t" r="r" b="b"/>
+            <a:pathLst>
+              <a:path w="120000" h="120000" extrusionOk="0">
+                <a:moveTo>
+                  <a:pt x="0" y="0"/>
+                </a:moveTo>
+                <a:lnTo>
+                  <a:pt x="120000" y="0"/>
+                </a:lnTo>
+                <a:lnTo>
+                  <a:pt x="120000" y="120000"/>
+                </a:lnTo>
+                <a:lnTo>
+                  <a:pt x="0" y="120000"/>
+                </a:lnTo>
+                <a:close/>
+              </a:path>
+            </a:pathLst>
+          </a:custGeom>
+        </p:spPr>
+      </p:sp>
+      <p:sp>
+        <p:nvSpPr>
+          <p:cNvPr id="103" name="Google Shape;103;g7668f30493_0_0:notes"/>
+          <p:cNvSpPr txBox="1">
+            <a:spLocks noGrp="1"/>
+          </p:cNvSpPr>
+          <p:nvPr>
+            <p:ph type="body" idx="1"/>
+          </p:nvPr>
+        </p:nvSpPr>
+        <p:spPr>
+          <a:xfrm>
+            <a:off x="685800" y="4400550"/>
+            <a:ext cx="5486400" cy="3600600"/>
+          </a:xfrm>
+          <a:prstGeom prst="rect">
+            <a:avLst/>
+          </a:prstGeom>
+        </p:spPr>
+        <p:txBody>
+          <a:bodyPr spcFirstLastPara="1" wrap="square" lIns="91425" tIns="45700" rIns="91425" bIns="45700" anchor="t" anchorCtr="0">
+            <a:noAutofit/>
+          </a:bodyPr>
+          <a:lstStyle/>
+          <a:p>
+            <a:pPr marL="0" lvl="0" indent="0" algn="l" rtl="0">
+              <a:spcBef>
+                <a:spcPts val="0"/>
+              </a:spcBef>
+              <a:spcAft>
+                <a:spcPts val="0"/>
+              </a:spcAft>
+              <a:buNone/>
+            </a:pPr>
+            <a:r>
+              <a:rPr lang="en-US"/>
+              <a:t>Big data describes data sets that are so large that traditional methods of storage and processing are inadequate  </a:t>
+            </a:r>
+            <a:endParaRPr/>
+          </a:p>
+          <a:p>
+            <a:pPr marL="0" lvl="0" indent="0" algn="l" rtl="0">
+              <a:spcBef>
+                <a:spcPts val="0"/>
+              </a:spcBef>
+              <a:spcAft>
+                <a:spcPts val="0"/>
+              </a:spcAft>
+              <a:buNone/>
+            </a:pPr>
+            <a:endParaRPr/>
+          </a:p>
+          <a:p>
+            <a:pPr marL="0" lvl="0" indent="0" algn="l" rtl="0">
+              <a:spcBef>
+                <a:spcPts val="0"/>
+              </a:spcBef>
+              <a:spcAft>
+                <a:spcPts val="0"/>
+              </a:spcAft>
+              <a:buNone/>
+            </a:pPr>
+            <a:r>
+              <a:rPr lang="en-US"/>
+              <a:t>where to find : 1- Social media [ FB, Twitter ]</a:t>
+            </a:r>
+            <a:endParaRPr/>
+          </a:p>
+          <a:p>
+            <a:pPr marL="0" lvl="0" indent="0" algn="l" rtl="0">
+              <a:spcBef>
+                <a:spcPts val="0"/>
+              </a:spcBef>
+              <a:spcAft>
+                <a:spcPts val="0"/>
+              </a:spcAft>
+              <a:buNone/>
+            </a:pPr>
+            <a:r>
+              <a:rPr lang="en-US"/>
+              <a:t>		 2- Search Engines [ Google ]</a:t>
+            </a:r>
+            <a:endParaRPr/>
+          </a:p>
+          <a:p>
+            <a:pPr marL="0" lvl="0" indent="0" algn="l" rtl="0">
+              <a:spcBef>
+                <a:spcPts val="0"/>
+              </a:spcBef>
+              <a:spcAft>
+                <a:spcPts val="0"/>
+              </a:spcAft>
+              <a:buNone/>
+            </a:pPr>
+            <a:endParaRPr/>
+          </a:p>
+          <a:p>
+            <a:pPr marL="0" lvl="0" indent="0" algn="l" rtl="0">
+              <a:spcBef>
+                <a:spcPts val="0"/>
+              </a:spcBef>
+              <a:spcAft>
+                <a:spcPts val="0"/>
+              </a:spcAft>
+              <a:buNone/>
+            </a:pPr>
+            <a:r>
+              <a:rPr lang="en-US"/>
+              <a:t>Challenges : storage , capture , analysis, transfer , .. etc </a:t>
+            </a:r>
+            <a:endParaRPr/>
+          </a:p>
+          <a:p>
+            <a:pPr marL="0" lvl="0" indent="0" algn="l" rtl="0">
+              <a:spcBef>
+                <a:spcPts val="0"/>
+              </a:spcBef>
+              <a:spcAft>
+                <a:spcPts val="0"/>
+              </a:spcAft>
+              <a:buNone/>
+            </a:pPr>
+            <a:endParaRPr/>
+          </a:p>
+        </p:txBody>
+      </p:sp>
+      <p:sp>
+        <p:nvSpPr>
+          <p:cNvPr id="104" name="Google Shape;104;g7668f30493_0_0:notes"/>
+          <p:cNvSpPr txBox="1">
+            <a:spLocks noGrp="1"/>
+          </p:cNvSpPr>
+          <p:nvPr>
+            <p:ph type="sldNum" idx="12"/>
+          </p:nvPr>
+        </p:nvSpPr>
+        <p:spPr>
+          <a:xfrm>
+            <a:off x="3884613" y="8685213"/>
+            <a:ext cx="2971800" cy="458700"/>
+          </a:xfrm>
+          <a:prstGeom prst="rect">
+            <a:avLst/>
+          </a:prstGeom>
+        </p:spPr>
+        <p:txBody>
+          <a:bodyPr spcFirstLastPara="1" wrap="square" lIns="91425" tIns="45700" rIns="91425" bIns="45700" anchor="b" anchorCtr="0">
+            <a:noAutofit/>
+          </a:bodyPr>
+          <a:lstStyle/>
+          <a:p>
+            <a:pPr marL="0" lvl="0" indent="0" algn="r" rtl="0">
+              <a:spcBef>
+                <a:spcPts val="0"/>
+              </a:spcBef>
+              <a:spcAft>
+                <a:spcPts val="0"/>
+              </a:spcAft>
+              <a:buClr>
+                <a:srgbClr val="000000"/>
+              </a:buClr>
+              <a:buFont typeface="Arial"/>
+              <a:buNone/>
+            </a:pPr>
+            <a:fld id="{00000000-1234-1234-1234-123412341234}" type="slidenum">
+              <a:rPr lang="en-US"/>
+              <a:t>3</a:t>
+            </a:fld>
+            <a:endParaRPr/>
+          </a:p>
+        </p:txBody>
+      </p:sp>
+    </p:spTree>
+  </p:cSld>
+  <p:clrMapOvr>
+    <a:masterClrMapping/>
+  </p:clrMapOvr>
+</p:notes>
+</file>
+
+<file path=ppt/notesSlides/notesSlide4.xml><?xml version="1.0" encoding="utf-8"?>
+<p:notes xmlns:a="http://schemas.openxmlformats.org/drawingml/2006/main" xmlns:r="http://schemas.openxmlformats.org/officeDocument/2006/relationships" xmlns:p="http://schemas.openxmlformats.org/presentationml/2006/main" showMasterSp="0" showMasterPhAnim="0">
+  <p:cSld>
+    <p:spTree>
+      <p:nvGrpSpPr>
+        <p:cNvPr id="1" name="Shape 108"/>
+        <p:cNvGrpSpPr/>
+        <p:nvPr/>
+      </p:nvGrpSpPr>
+      <p:grpSpPr>
+        <a:xfrm>
+          <a:off x="0" y="0"/>
+          <a:ext cx="0" cy="0"/>
+          <a:chOff x="0" y="0"/>
+          <a:chExt cx="0" cy="0"/>
+        </a:xfrm>
+      </p:grpSpPr>
+      <p:sp>
+        <p:nvSpPr>
+          <p:cNvPr id="109" name="Google Shape;109;g7668f30493_0_9:notes"/>
+          <p:cNvSpPr>
+            <a:spLocks noGrp="1" noRot="1" noChangeAspect="1"/>
+          </p:cNvSpPr>
+          <p:nvPr>
+            <p:ph type="sldImg" idx="2"/>
+          </p:nvPr>
+        </p:nvSpPr>
+        <p:spPr>
+          <a:xfrm>
+            <a:off x="685800" y="1143000"/>
+            <a:ext cx="5486400" cy="3086100"/>
+          </a:xfrm>
+          <a:custGeom>
+            <a:avLst/>
+            <a:gdLst/>
+            <a:ahLst/>
+            <a:cxnLst/>
+            <a:rect l="l" t="t" r="r" b="b"/>
+            <a:pathLst>
+              <a:path w="120000" h="120000" extrusionOk="0">
+                <a:moveTo>
+                  <a:pt x="0" y="0"/>
+                </a:moveTo>
+                <a:lnTo>
+                  <a:pt x="120000" y="0"/>
+                </a:lnTo>
+                <a:lnTo>
+                  <a:pt x="120000" y="120000"/>
+                </a:lnTo>
+                <a:lnTo>
+                  <a:pt x="0" y="120000"/>
+                </a:lnTo>
+                <a:close/>
+              </a:path>
+            </a:pathLst>
+          </a:custGeom>
+        </p:spPr>
+      </p:sp>
+      <p:sp>
+        <p:nvSpPr>
+          <p:cNvPr id="110" name="Google Shape;110;g7668f30493_0_9:notes"/>
+          <p:cNvSpPr txBox="1">
+            <a:spLocks noGrp="1"/>
+          </p:cNvSpPr>
+          <p:nvPr>
+            <p:ph type="body" idx="1"/>
+          </p:nvPr>
+        </p:nvSpPr>
+        <p:spPr>
+          <a:xfrm>
+            <a:off x="685800" y="4400550"/>
+            <a:ext cx="5486400" cy="3600600"/>
+          </a:xfrm>
+          <a:prstGeom prst="rect">
+            <a:avLst/>
+          </a:prstGeom>
+        </p:spPr>
+        <p:txBody>
+          <a:bodyPr spcFirstLastPara="1" wrap="square" lIns="91425" tIns="45700" rIns="91425" bIns="45700" anchor="t" anchorCtr="0">
+            <a:noAutofit/>
+          </a:bodyPr>
+          <a:lstStyle/>
+          <a:p>
+            <a:pPr marL="0" lvl="0" indent="0" algn="l" rtl="0">
+              <a:spcBef>
+                <a:spcPts val="0"/>
+              </a:spcBef>
+              <a:spcAft>
+                <a:spcPts val="0"/>
+              </a:spcAft>
+              <a:buNone/>
+            </a:pPr>
+            <a:r>
+              <a:rPr lang="en-US"/>
+              <a:t>It’s good to clarify  that RDBS is as important as NOSQL but here’s few advantages  are worth to be mentioned </a:t>
+            </a:r>
+            <a:endParaRPr/>
+          </a:p>
+          <a:p>
+            <a:pPr marL="0" lvl="0" indent="0" algn="l" rtl="0">
+              <a:spcBef>
+                <a:spcPts val="0"/>
+              </a:spcBef>
+              <a:spcAft>
+                <a:spcPts val="0"/>
+              </a:spcAft>
+              <a:buNone/>
+            </a:pPr>
+            <a:endParaRPr/>
+          </a:p>
+          <a:p>
+            <a:pPr marL="0" lvl="0" indent="0" algn="l" rtl="0">
+              <a:spcBef>
+                <a:spcPts val="0"/>
+              </a:spcBef>
+              <a:spcAft>
+                <a:spcPts val="0"/>
+              </a:spcAft>
+              <a:buNone/>
+            </a:pPr>
+            <a:r>
+              <a:rPr lang="en-US"/>
+              <a:t>1- handles big data :  does it very Quickly </a:t>
+            </a:r>
+            <a:endParaRPr/>
+          </a:p>
+          <a:p>
+            <a:pPr marL="0" lvl="0" indent="0" algn="l" rtl="0">
+              <a:spcBef>
+                <a:spcPts val="0"/>
+              </a:spcBef>
+              <a:spcAft>
+                <a:spcPts val="0"/>
+              </a:spcAft>
+              <a:buNone/>
+            </a:pPr>
+            <a:r>
+              <a:rPr lang="en-US"/>
+              <a:t>2- Data models : no predefined Schemas </a:t>
+            </a:r>
+            <a:endParaRPr/>
+          </a:p>
+          <a:p>
+            <a:pPr marL="0" lvl="0" indent="0" algn="l" rtl="0">
+              <a:spcBef>
+                <a:spcPts val="0"/>
+              </a:spcBef>
+              <a:spcAft>
+                <a:spcPts val="0"/>
+              </a:spcAft>
+              <a:buNone/>
+            </a:pPr>
+            <a:r>
+              <a:rPr lang="en-US"/>
+              <a:t>3- data structure : nosql handles unstructured data which means it is cheaper to manage </a:t>
+            </a:r>
+            <a:endParaRPr/>
+          </a:p>
+          <a:p>
+            <a:pPr marL="0" lvl="0" indent="0" algn="l" rtl="0">
+              <a:spcBef>
+                <a:spcPts val="0"/>
+              </a:spcBef>
+              <a:spcAft>
+                <a:spcPts val="0"/>
+              </a:spcAft>
+              <a:buNone/>
+            </a:pPr>
+            <a:r>
+              <a:rPr lang="en-US"/>
+              <a:t>4- Scaling : it is the opposite of RDB using Scale up , vertical Scaling  </a:t>
+            </a:r>
+            <a:endParaRPr/>
+          </a:p>
+        </p:txBody>
+      </p:sp>
+      <p:sp>
+        <p:nvSpPr>
+          <p:cNvPr id="111" name="Google Shape;111;g7668f30493_0_9:notes"/>
+          <p:cNvSpPr txBox="1">
+            <a:spLocks noGrp="1"/>
+          </p:cNvSpPr>
+          <p:nvPr>
+            <p:ph type="sldNum" idx="12"/>
+          </p:nvPr>
+        </p:nvSpPr>
+        <p:spPr>
+          <a:xfrm>
+            <a:off x="3884613" y="8685213"/>
+            <a:ext cx="2971800" cy="458700"/>
+          </a:xfrm>
+          <a:prstGeom prst="rect">
+            <a:avLst/>
+          </a:prstGeom>
+        </p:spPr>
+        <p:txBody>
+          <a:bodyPr spcFirstLastPara="1" wrap="square" lIns="91425" tIns="45700" rIns="91425" bIns="45700" anchor="b" anchorCtr="0">
+            <a:noAutofit/>
+          </a:bodyPr>
+          <a:lstStyle/>
+          <a:p>
+            <a:pPr marL="0" lvl="0" indent="0" algn="r" rtl="0">
+              <a:spcBef>
+                <a:spcPts val="0"/>
+              </a:spcBef>
+              <a:spcAft>
+                <a:spcPts val="0"/>
+              </a:spcAft>
+              <a:buClr>
+                <a:srgbClr val="000000"/>
+              </a:buClr>
+              <a:buFont typeface="Arial"/>
+              <a:buNone/>
+            </a:pPr>
+            <a:fld id="{00000000-1234-1234-1234-123412341234}" type="slidenum">
+              <a:rPr lang="en-US"/>
+              <a:t>4</a:t>
+            </a:fld>
+            <a:endParaRPr/>
+          </a:p>
+        </p:txBody>
+      </p:sp>
+    </p:spTree>
+  </p:cSld>
+  <p:clrMapOvr>
+    <a:masterClrMapping/>
+  </p:clrMapOvr>
+</p:notes>
+</file>
+
+<file path=ppt/notesSlides/notesSlide5.xml><?xml version="1.0" encoding="utf-8"?>
+<p:notes xmlns:a="http://schemas.openxmlformats.org/drawingml/2006/main" xmlns:r="http://schemas.openxmlformats.org/officeDocument/2006/relationships" xmlns:p="http://schemas.openxmlformats.org/presentationml/2006/main" showMasterSp="0" showMasterPhAnim="0">
+  <p:cSld>
+    <p:spTree>
+      <p:nvGrpSpPr>
+        <p:cNvPr id="1" name="Shape 115"/>
+        <p:cNvGrpSpPr/>
+        <p:nvPr/>
+      </p:nvGrpSpPr>
+      <p:grpSpPr>
+        <a:xfrm>
+          <a:off x="0" y="0"/>
+          <a:ext cx="0" cy="0"/>
+          <a:chOff x="0" y="0"/>
+          <a:chExt cx="0" cy="0"/>
+        </a:xfrm>
+      </p:grpSpPr>
+      <p:sp>
+        <p:nvSpPr>
+          <p:cNvPr id="116" name="Google Shape;116;g7668f30493_0_15:notes"/>
+          <p:cNvSpPr>
+            <a:spLocks noGrp="1" noRot="1" noChangeAspect="1"/>
+          </p:cNvSpPr>
+          <p:nvPr>
+            <p:ph type="sldImg" idx="2"/>
+          </p:nvPr>
+        </p:nvSpPr>
+        <p:spPr>
+          <a:xfrm>
+            <a:off x="685800" y="1143000"/>
+            <a:ext cx="5486400" cy="3086100"/>
+          </a:xfrm>
+          <a:custGeom>
+            <a:avLst/>
+            <a:gdLst/>
+            <a:ahLst/>
+            <a:cxnLst/>
+            <a:rect l="l" t="t" r="r" b="b"/>
+            <a:pathLst>
+              <a:path w="120000" h="120000" extrusionOk="0">
+                <a:moveTo>
+                  <a:pt x="0" y="0"/>
+                </a:moveTo>
+                <a:lnTo>
+                  <a:pt x="120000" y="0"/>
+                </a:lnTo>
+                <a:lnTo>
+                  <a:pt x="120000" y="120000"/>
+                </a:lnTo>
+                <a:lnTo>
+                  <a:pt x="0" y="120000"/>
+                </a:lnTo>
+                <a:close/>
+              </a:path>
+            </a:pathLst>
+          </a:custGeom>
+        </p:spPr>
+      </p:sp>
+      <p:sp>
+        <p:nvSpPr>
+          <p:cNvPr id="117" name="Google Shape;117;g7668f30493_0_15:notes"/>
+          <p:cNvSpPr txBox="1">
+            <a:spLocks noGrp="1"/>
+          </p:cNvSpPr>
+          <p:nvPr>
+            <p:ph type="body" idx="1"/>
+          </p:nvPr>
+        </p:nvSpPr>
+        <p:spPr>
+          <a:xfrm>
+            <a:off x="685800" y="4400550"/>
+            <a:ext cx="5486400" cy="3600600"/>
+          </a:xfrm>
+          <a:prstGeom prst="rect">
+            <a:avLst/>
+          </a:prstGeom>
+        </p:spPr>
+        <p:txBody>
+          <a:bodyPr spcFirstLastPara="1" wrap="square" lIns="91425" tIns="45700" rIns="91425" bIns="45700" anchor="t" anchorCtr="0">
+            <a:noAutofit/>
+          </a:bodyPr>
+          <a:lstStyle/>
+          <a:p>
+            <a:pPr marL="0" lvl="0" indent="0" algn="l" rtl="0">
+              <a:spcBef>
+                <a:spcPts val="0"/>
+              </a:spcBef>
+              <a:spcAft>
+                <a:spcPts val="0"/>
+              </a:spcAft>
+              <a:buNone/>
+            </a:pPr>
+            <a:r>
+              <a:rPr lang="en-US"/>
+              <a:t>example that explains scaling mentioned in previous slide</a:t>
+            </a:r>
+            <a:endParaRPr/>
+          </a:p>
+        </p:txBody>
+      </p:sp>
+      <p:sp>
+        <p:nvSpPr>
+          <p:cNvPr id="118" name="Google Shape;118;g7668f30493_0_15:notes"/>
+          <p:cNvSpPr txBox="1">
+            <a:spLocks noGrp="1"/>
+          </p:cNvSpPr>
+          <p:nvPr>
+            <p:ph type="sldNum" idx="12"/>
+          </p:nvPr>
+        </p:nvSpPr>
+        <p:spPr>
+          <a:xfrm>
+            <a:off x="3884613" y="8685213"/>
+            <a:ext cx="2971800" cy="458700"/>
+          </a:xfrm>
+          <a:prstGeom prst="rect">
+            <a:avLst/>
+          </a:prstGeom>
+        </p:spPr>
+        <p:txBody>
+          <a:bodyPr spcFirstLastPara="1" wrap="square" lIns="91425" tIns="45700" rIns="91425" bIns="45700" anchor="b" anchorCtr="0">
+            <a:noAutofit/>
+          </a:bodyPr>
+          <a:lstStyle/>
+          <a:p>
+            <a:pPr marL="0" lvl="0" indent="0" algn="r" rtl="0">
+              <a:spcBef>
+                <a:spcPts val="0"/>
+              </a:spcBef>
+              <a:spcAft>
+                <a:spcPts val="0"/>
+              </a:spcAft>
+              <a:buClr>
+                <a:srgbClr val="000000"/>
+              </a:buClr>
+              <a:buFont typeface="Arial"/>
+              <a:buNone/>
+            </a:pPr>
+            <a:fld id="{00000000-1234-1234-1234-123412341234}" type="slidenum">
+              <a:rPr lang="en-US"/>
+              <a:t>5</a:t>
+            </a:fld>
+            <a:endParaRPr/>
+          </a:p>
+        </p:txBody>
+      </p:sp>
+    </p:spTree>
+  </p:cSld>
+  <p:clrMapOvr>
+    <a:masterClrMapping/>
+  </p:clrMapOvr>
+</p:notes>
+</file>
+
+<file path=ppt/notesSlides/notesSlide6.xml><?xml version="1.0" encoding="utf-8"?>
+<p:notes xmlns:a="http://schemas.openxmlformats.org/drawingml/2006/main" xmlns:r="http://schemas.openxmlformats.org/officeDocument/2006/relationships" xmlns:p="http://schemas.openxmlformats.org/presentationml/2006/main" showMasterSp="0" showMasterPhAnim="0">
+  <p:cSld>
+    <p:spTree>
+      <p:nvGrpSpPr>
+        <p:cNvPr id="1" name="Shape 121"/>
+        <p:cNvGrpSpPr/>
+        <p:nvPr/>
+      </p:nvGrpSpPr>
+      <p:grpSpPr>
+        <a:xfrm>
+          <a:off x="0" y="0"/>
+          <a:ext cx="0" cy="0"/>
+          <a:chOff x="0" y="0"/>
+          <a:chExt cx="0" cy="0"/>
+        </a:xfrm>
+      </p:grpSpPr>
+      <p:sp>
+        <p:nvSpPr>
+          <p:cNvPr id="122" name="Google Shape;122;g7668f30493_0_22:notes"/>
+          <p:cNvSpPr>
+            <a:spLocks noGrp="1" noRot="1" noChangeAspect="1"/>
+          </p:cNvSpPr>
+          <p:nvPr>
+            <p:ph type="sldImg" idx="2"/>
+          </p:nvPr>
+        </p:nvSpPr>
+        <p:spPr>
+          <a:xfrm>
+            <a:off x="685800" y="1143000"/>
+            <a:ext cx="5486400" cy="3086100"/>
+          </a:xfrm>
+          <a:custGeom>
+            <a:avLst/>
+            <a:gdLst/>
+            <a:ahLst/>
+            <a:cxnLst/>
+            <a:rect l="l" t="t" r="r" b="b"/>
+            <a:pathLst>
+              <a:path w="120000" h="120000" extrusionOk="0">
+                <a:moveTo>
+                  <a:pt x="0" y="0"/>
+                </a:moveTo>
+                <a:lnTo>
+                  <a:pt x="120000" y="0"/>
+                </a:lnTo>
+                <a:lnTo>
+                  <a:pt x="120000" y="120000"/>
+                </a:lnTo>
+                <a:lnTo>
+                  <a:pt x="0" y="120000"/>
+                </a:lnTo>
+                <a:close/>
+              </a:path>
+            </a:pathLst>
+          </a:custGeom>
+        </p:spPr>
+      </p:sp>
+      <p:sp>
+        <p:nvSpPr>
+          <p:cNvPr id="123" name="Google Shape;123;g7668f30493_0_22:notes"/>
+          <p:cNvSpPr txBox="1">
+            <a:spLocks noGrp="1"/>
+          </p:cNvSpPr>
+          <p:nvPr>
+            <p:ph type="body" idx="1"/>
+          </p:nvPr>
+        </p:nvSpPr>
+        <p:spPr>
+          <a:xfrm>
+            <a:off x="685800" y="4400550"/>
+            <a:ext cx="5486400" cy="3600600"/>
+          </a:xfrm>
+          <a:prstGeom prst="rect">
+            <a:avLst/>
+          </a:prstGeom>
+        </p:spPr>
+        <p:txBody>
+          <a:bodyPr spcFirstLastPara="1" wrap="square" lIns="91425" tIns="45700" rIns="91425" bIns="45700" anchor="t" anchorCtr="0">
+            <a:noAutofit/>
+          </a:bodyPr>
+          <a:lstStyle/>
+          <a:p>
+            <a:pPr marL="457200" lvl="0" indent="-317500" algn="l" rtl="0">
+              <a:spcBef>
+                <a:spcPts val="0"/>
+              </a:spcBef>
+              <a:spcAft>
+                <a:spcPts val="0"/>
+              </a:spcAft>
+              <a:buSzPts val="1400"/>
+              <a:buChar char="-"/>
+            </a:pPr>
+            <a:r>
+              <a:rPr lang="en-US"/>
+              <a:t>Normalization organize data in away that eliminate redundancy it allows database to take up as a little space as possible</a:t>
+            </a:r>
+            <a:endParaRPr/>
+          </a:p>
+          <a:p>
+            <a:pPr marL="457200" lvl="0" indent="-317500" algn="l" rtl="0">
+              <a:spcBef>
+                <a:spcPts val="0"/>
+              </a:spcBef>
+              <a:spcAft>
+                <a:spcPts val="0"/>
+              </a:spcAft>
+              <a:buSzPts val="1400"/>
+              <a:buChar char="-"/>
+            </a:pPr>
+            <a:r>
+              <a:rPr lang="en-US"/>
+              <a:t>Very solid because it’s a bit old language but still it’s easy to learn </a:t>
+            </a:r>
+            <a:endParaRPr/>
+          </a:p>
+          <a:p>
+            <a:pPr marL="0" lvl="0" indent="0" algn="l" rtl="0">
+              <a:spcBef>
+                <a:spcPts val="0"/>
+              </a:spcBef>
+              <a:spcAft>
+                <a:spcPts val="0"/>
+              </a:spcAft>
+              <a:buNone/>
+            </a:pPr>
+            <a:endParaRPr/>
+          </a:p>
+          <a:p>
+            <a:pPr marL="0" lvl="0" indent="0" algn="l" rtl="0">
+              <a:spcBef>
+                <a:spcPts val="0"/>
+              </a:spcBef>
+              <a:spcAft>
+                <a:spcPts val="0"/>
+              </a:spcAft>
+              <a:buNone/>
+            </a:pPr>
+            <a:r>
+              <a:rPr lang="en-US"/>
+              <a:t>ACID : </a:t>
+            </a:r>
+            <a:r>
+              <a:rPr lang="en-US">
+                <a:solidFill>
+                  <a:srgbClr val="222222"/>
+                </a:solidFill>
+                <a:highlight>
+                  <a:srgbClr val="FFFFFF"/>
+                </a:highlight>
+                <a:latin typeface="Arial"/>
+                <a:ea typeface="Arial"/>
+                <a:cs typeface="Arial"/>
+                <a:sym typeface="Arial"/>
+              </a:rPr>
+              <a:t>Atomicity</a:t>
+            </a:r>
+            <a:r>
+              <a:rPr lang="en-US"/>
+              <a:t> , consistency, integrability , Durability </a:t>
+            </a:r>
+            <a:endParaRPr/>
+          </a:p>
+        </p:txBody>
+      </p:sp>
+      <p:sp>
+        <p:nvSpPr>
+          <p:cNvPr id="124" name="Google Shape;124;g7668f30493_0_22:notes"/>
+          <p:cNvSpPr txBox="1">
+            <a:spLocks noGrp="1"/>
+          </p:cNvSpPr>
+          <p:nvPr>
+            <p:ph type="sldNum" idx="12"/>
+          </p:nvPr>
+        </p:nvSpPr>
+        <p:spPr>
+          <a:xfrm>
+            <a:off x="3884613" y="8685213"/>
+            <a:ext cx="2971800" cy="458700"/>
+          </a:xfrm>
+          <a:prstGeom prst="rect">
+            <a:avLst/>
+          </a:prstGeom>
+        </p:spPr>
+        <p:txBody>
+          <a:bodyPr spcFirstLastPara="1" wrap="square" lIns="91425" tIns="45700" rIns="91425" bIns="45700" anchor="b" anchorCtr="0">
+            <a:noAutofit/>
+          </a:bodyPr>
+          <a:lstStyle/>
+          <a:p>
+            <a:pPr marL="0" lvl="0" indent="0" algn="r" rtl="0">
+              <a:spcBef>
+                <a:spcPts val="0"/>
+              </a:spcBef>
+              <a:spcAft>
+                <a:spcPts val="0"/>
+              </a:spcAft>
+              <a:buClr>
+                <a:srgbClr val="000000"/>
+              </a:buClr>
+              <a:buFont typeface="Arial"/>
+              <a:buNone/>
+            </a:pPr>
+            <a:fld id="{00000000-1234-1234-1234-123412341234}" type="slidenum">
+              <a:rPr lang="en-US"/>
+              <a:t>6</a:t>
+            </a:fld>
+            <a:endParaRPr/>
+          </a:p>
+        </p:txBody>
+      </p:sp>
+    </p:spTree>
+  </p:cSld>
+  <p:clrMapOvr>
+    <a:masterClrMapping/>
+  </p:clrMapOvr>
+</p:notes>
+</file>
+
+<file path=ppt/notesSlides/notesSlide7.xml><?xml version="1.0" encoding="utf-8"?>
+<p:notes xmlns:a="http://schemas.openxmlformats.org/drawingml/2006/main" xmlns:r="http://schemas.openxmlformats.org/officeDocument/2006/relationships" xmlns:p="http://schemas.openxmlformats.org/presentationml/2006/main" showMasterSp="0" showMasterPhAnim="0">
+  <p:cSld>
+    <p:spTree>
+      <p:nvGrpSpPr>
+        <p:cNvPr id="1" name="Shape 128"/>
+        <p:cNvGrpSpPr/>
+        <p:nvPr/>
+      </p:nvGrpSpPr>
+      <p:grpSpPr>
+        <a:xfrm>
+          <a:off x="0" y="0"/>
+          <a:ext cx="0" cy="0"/>
+          <a:chOff x="0" y="0"/>
+          <a:chExt cx="0" cy="0"/>
+        </a:xfrm>
+      </p:grpSpPr>
+      <p:sp>
+        <p:nvSpPr>
+          <p:cNvPr id="129" name="Google Shape;129;g7668f30493_0_29:notes"/>
+          <p:cNvSpPr>
+            <a:spLocks noGrp="1" noRot="1" noChangeAspect="1"/>
+          </p:cNvSpPr>
+          <p:nvPr>
+            <p:ph type="sldImg" idx="2"/>
+          </p:nvPr>
+        </p:nvSpPr>
+        <p:spPr>
+          <a:xfrm>
+            <a:off x="685800" y="1143000"/>
+            <a:ext cx="5486400" cy="3086100"/>
+          </a:xfrm>
+          <a:custGeom>
+            <a:avLst/>
+            <a:gdLst/>
+            <a:ahLst/>
+            <a:cxnLst/>
+            <a:rect l="l" t="t" r="r" b="b"/>
+            <a:pathLst>
+              <a:path w="120000" h="120000" extrusionOk="0">
+                <a:moveTo>
+                  <a:pt x="0" y="0"/>
+                </a:moveTo>
+                <a:lnTo>
+                  <a:pt x="120000" y="0"/>
+                </a:lnTo>
+                <a:lnTo>
+                  <a:pt x="120000" y="120000"/>
+                </a:lnTo>
+                <a:lnTo>
+                  <a:pt x="0" y="120000"/>
+                </a:lnTo>
+                <a:close/>
+              </a:path>
+            </a:pathLst>
+          </a:custGeom>
+        </p:spPr>
+      </p:sp>
+      <p:sp>
+        <p:nvSpPr>
+          <p:cNvPr id="130" name="Google Shape;130;g7668f30493_0_29:notes"/>
+          <p:cNvSpPr txBox="1">
+            <a:spLocks noGrp="1"/>
+          </p:cNvSpPr>
+          <p:nvPr>
+            <p:ph type="body" idx="1"/>
+          </p:nvPr>
+        </p:nvSpPr>
+        <p:spPr>
+          <a:xfrm>
+            <a:off x="685800" y="4400550"/>
+            <a:ext cx="5486400" cy="3600600"/>
+          </a:xfrm>
+          <a:prstGeom prst="rect">
+            <a:avLst/>
+          </a:prstGeom>
+        </p:spPr>
+        <p:txBody>
+          <a:bodyPr spcFirstLastPara="1" wrap="square" lIns="91425" tIns="45700" rIns="91425" bIns="45700" anchor="t" anchorCtr="0">
+            <a:noAutofit/>
+          </a:bodyPr>
+          <a:lstStyle/>
+          <a:p>
+            <a:pPr marL="0" lvl="0" indent="0" algn="l" rtl="0">
+              <a:spcBef>
+                <a:spcPts val="0"/>
+              </a:spcBef>
+              <a:spcAft>
+                <a:spcPts val="0"/>
+              </a:spcAft>
+              <a:buNone/>
+            </a:pPr>
+            <a:endParaRPr/>
+          </a:p>
+        </p:txBody>
+      </p:sp>
+      <p:sp>
+        <p:nvSpPr>
+          <p:cNvPr id="131" name="Google Shape;131;g7668f30493_0_29:notes"/>
+          <p:cNvSpPr txBox="1">
+            <a:spLocks noGrp="1"/>
+          </p:cNvSpPr>
+          <p:nvPr>
+            <p:ph type="sldNum" idx="12"/>
+          </p:nvPr>
+        </p:nvSpPr>
+        <p:spPr>
+          <a:xfrm>
+            <a:off x="3884613" y="8685213"/>
+            <a:ext cx="2971800" cy="458700"/>
+          </a:xfrm>
+          <a:prstGeom prst="rect">
+            <a:avLst/>
+          </a:prstGeom>
+        </p:spPr>
+        <p:txBody>
+          <a:bodyPr spcFirstLastPara="1" wrap="square" lIns="91425" tIns="45700" rIns="91425" bIns="45700" anchor="b" anchorCtr="0">
+            <a:noAutofit/>
+          </a:bodyPr>
+          <a:lstStyle/>
+          <a:p>
+            <a:pPr marL="0" lvl="0" indent="0" algn="r" rtl="0">
+              <a:spcBef>
+                <a:spcPts val="0"/>
+              </a:spcBef>
+              <a:spcAft>
+                <a:spcPts val="0"/>
+              </a:spcAft>
+              <a:buClr>
+                <a:srgbClr val="000000"/>
+              </a:buClr>
+              <a:buFont typeface="Arial"/>
+              <a:buNone/>
+            </a:pPr>
+            <a:fld id="{00000000-1234-1234-1234-123412341234}" type="slidenum">
+              <a:rPr lang="en-US"/>
+              <a:t>7</a:t>
+            </a:fld>
+            <a:endParaRPr/>
+          </a:p>
+        </p:txBody>
+      </p:sp>
+    </p:spTree>
+  </p:cSld>
+  <p:clrMapOvr>
+    <a:masterClrMapping/>
+  </p:clrMapOvr>
+</p:notes>
+</file>
+
 <file path=ppt/slideLayouts/slideLayout1.xml><?xml version="1.0" encoding="utf-8"?>
 <p:sldLayout xmlns:a="http://schemas.openxmlformats.org/drawingml/2006/main" xmlns:r="http://schemas.openxmlformats.org/officeDocument/2006/relationships" xmlns:p="http://schemas.openxmlformats.org/presentationml/2006/main" type="title" preserve="1">
   <p:cSld name="Title Slide">
@@ -970,7 +2070,7 @@
           <a:p>
             <a:fld id="{48A87A34-81AB-432B-8DAE-1953F412C126}" type="datetimeFigureOut">
               <a:rPr lang="en-US" smtClean="0"/>
-              <a:t>1/13/2020</a:t>
+              <a:t>1/14/2020</a:t>
             </a:fld>
             <a:endParaRPr lang="en-US" dirty="0"/>
           </a:p>
@@ -1191,7 +2291,7 @@
           <a:p>
             <a:fld id="{48A87A34-81AB-432B-8DAE-1953F412C126}" type="datetimeFigureOut">
               <a:rPr lang="en-US" smtClean="0"/>
-              <a:t>1/13/2020</a:t>
+              <a:t>1/14/2020</a:t>
             </a:fld>
             <a:endParaRPr lang="en-US" dirty="0"/>
           </a:p>
@@ -1371,7 +2471,7 @@
           <a:p>
             <a:fld id="{48A87A34-81AB-432B-8DAE-1953F412C126}" type="datetimeFigureOut">
               <a:rPr lang="en-US" smtClean="0"/>
-              <a:t>1/13/2020</a:t>
+              <a:t>1/14/2020</a:t>
             </a:fld>
             <a:endParaRPr lang="en-US" dirty="0"/>
           </a:p>
@@ -1541,7 +2641,7 @@
           <a:p>
             <a:fld id="{48A87A34-81AB-432B-8DAE-1953F412C126}" type="datetimeFigureOut">
               <a:rPr lang="en-US" smtClean="0"/>
-              <a:t>1/13/2020</a:t>
+              <a:t>1/14/2020</a:t>
             </a:fld>
             <a:endParaRPr lang="en-US" dirty="0"/>
           </a:p>
@@ -1792,7 +2892,7 @@
           <a:p>
             <a:fld id="{48A87A34-81AB-432B-8DAE-1953F412C126}" type="datetimeFigureOut">
               <a:rPr lang="en-US" smtClean="0"/>
-              <a:t>1/13/2020</a:t>
+              <a:t>1/14/2020</a:t>
             </a:fld>
             <a:endParaRPr lang="en-US" dirty="0"/>
           </a:p>
@@ -2115,7 +3215,7 @@
           <a:p>
             <a:fld id="{48A87A34-81AB-432B-8DAE-1953F412C126}" type="datetimeFigureOut">
               <a:rPr lang="en-US" smtClean="0"/>
-              <a:t>1/13/2020</a:t>
+              <a:t>1/14/2020</a:t>
             </a:fld>
             <a:endParaRPr lang="en-US" dirty="0"/>
           </a:p>
@@ -2539,7 +3639,7 @@
           <a:p>
             <a:fld id="{48A87A34-81AB-432B-8DAE-1953F412C126}" type="datetimeFigureOut">
               <a:rPr lang="en-US" smtClean="0"/>
-              <a:t>1/13/2020</a:t>
+              <a:t>1/14/2020</a:t>
             </a:fld>
             <a:endParaRPr lang="en-US" dirty="0"/>
           </a:p>
@@ -2657,7 +3757,7 @@
           <a:p>
             <a:fld id="{48A87A34-81AB-432B-8DAE-1953F412C126}" type="datetimeFigureOut">
               <a:rPr lang="en-US" smtClean="0"/>
-              <a:t>1/13/2020</a:t>
+              <a:t>1/14/2020</a:t>
             </a:fld>
             <a:endParaRPr lang="en-US" dirty="0"/>
           </a:p>
@@ -2752,7 +3852,7 @@
           <a:p>
             <a:fld id="{48A87A34-81AB-432B-8DAE-1953F412C126}" type="datetimeFigureOut">
               <a:rPr lang="en-US" smtClean="0"/>
-              <a:t>1/13/2020</a:t>
+              <a:t>1/14/2020</a:t>
             </a:fld>
             <a:endParaRPr lang="en-US" dirty="0"/>
           </a:p>
@@ -3042,7 +4142,7 @@
           <a:p>
             <a:fld id="{48A87A34-81AB-432B-8DAE-1953F412C126}" type="datetimeFigureOut">
               <a:rPr lang="en-US" smtClean="0"/>
-              <a:t>1/13/2020</a:t>
+              <a:t>1/14/2020</a:t>
             </a:fld>
             <a:endParaRPr lang="en-US" dirty="0"/>
           </a:p>
@@ -3315,7 +4415,7 @@
             <a:fld id="{48A87A34-81AB-432B-8DAE-1953F412C126}" type="datetimeFigureOut">
               <a:rPr lang="en-US" smtClean="0"/>
               <a:pPr/>
-              <a:t>1/13/2020</a:t>
+              <a:t>1/14/2020</a:t>
             </a:fld>
             <a:endParaRPr lang="en-US" dirty="0"/>
           </a:p>
@@ -3570,7 +4670,7 @@
             <a:fld id="{48A87A34-81AB-432B-8DAE-1953F412C126}" type="datetimeFigureOut">
               <a:rPr lang="en-US" smtClean="0"/>
               <a:pPr/>
-              <a:t>1/13/2020</a:t>
+              <a:t>1/14/2020</a:t>
             </a:fld>
             <a:endParaRPr lang="en-US" dirty="0"/>
           </a:p>
@@ -4109,441 +5209,7 @@
 </p:sld>
 </file>
 
-<file path=ppt/slides/slide2.xml><?xml version="1.0" encoding="utf-8"?>
-<p:sld xmlns:a="http://schemas.openxmlformats.org/drawingml/2006/main" xmlns:r="http://schemas.openxmlformats.org/officeDocument/2006/relationships" xmlns:p="http://schemas.openxmlformats.org/presentationml/2006/main">
-  <p:cSld>
-    <p:spTree>
-      <p:nvGrpSpPr>
-        <p:cNvPr id="1" name=""/>
-        <p:cNvGrpSpPr/>
-        <p:nvPr/>
-      </p:nvGrpSpPr>
-      <p:grpSpPr>
-        <a:xfrm>
-          <a:off x="0" y="0"/>
-          <a:ext cx="0" cy="0"/>
-          <a:chOff x="0" y="0"/>
-          <a:chExt cx="0" cy="0"/>
-        </a:xfrm>
-      </p:grpSpPr>
-      <p:sp>
-        <p:nvSpPr>
-          <p:cNvPr id="2" name="Title 1">
-            <a:extLst>
-              <a:ext uri="{FF2B5EF4-FFF2-40B4-BE49-F238E27FC236}">
-                <a16:creationId xmlns:a16="http://schemas.microsoft.com/office/drawing/2014/main" id="{F2153DD3-C27C-457D-ADDD-066D01CB95CA}"/>
-              </a:ext>
-            </a:extLst>
-          </p:cNvPr>
-          <p:cNvSpPr>
-            <a:spLocks noGrp="1"/>
-          </p:cNvSpPr>
-          <p:nvPr>
-            <p:ph type="title"/>
-          </p:nvPr>
-        </p:nvSpPr>
-        <p:spPr>
-          <a:xfrm>
-            <a:off x="1140144" y="231140"/>
-            <a:ext cx="9875520" cy="1356360"/>
-          </a:xfrm>
-        </p:spPr>
-        <p:txBody>
-          <a:bodyPr/>
-          <a:lstStyle/>
-          <a:p>
-            <a:r>
-              <a:rPr lang="en-US" dirty="0">
-                <a:latin typeface="Rockwell" panose="02060603020205020403" pitchFamily="18" charset="0"/>
-              </a:rPr>
-              <a:t>Introduction</a:t>
-            </a:r>
-          </a:p>
-        </p:txBody>
-      </p:sp>
-      <p:sp>
-        <p:nvSpPr>
-          <p:cNvPr id="5" name="Content Placeholder 4">
-            <a:extLst>
-              <a:ext uri="{FF2B5EF4-FFF2-40B4-BE49-F238E27FC236}">
-                <a16:creationId xmlns:a16="http://schemas.microsoft.com/office/drawing/2014/main" id="{E7F6BB3A-BC82-4616-BF12-40983E2F9D33}"/>
-              </a:ext>
-            </a:extLst>
-          </p:cNvPr>
-          <p:cNvSpPr>
-            <a:spLocks noGrp="1"/>
-          </p:cNvSpPr>
-          <p:nvPr>
-            <p:ph idx="1"/>
-          </p:nvPr>
-        </p:nvSpPr>
-        <p:spPr/>
-        <p:txBody>
-          <a:bodyPr/>
-          <a:lstStyle/>
-          <a:p>
-            <a:endParaRPr lang="en-US"/>
-          </a:p>
-        </p:txBody>
-      </p:sp>
-    </p:spTree>
-    <p:extLst>
-      <p:ext uri="{BB962C8B-B14F-4D97-AF65-F5344CB8AC3E}">
-        <p14:creationId xmlns:p14="http://schemas.microsoft.com/office/powerpoint/2010/main" val="1524077779"/>
-      </p:ext>
-    </p:extLst>
-  </p:cSld>
-  <p:clrMapOvr>
-    <a:masterClrMapping/>
-  </p:clrMapOvr>
-</p:sld>
-</file>
-
-<file path=ppt/slides/slide3.xml><?xml version="1.0" encoding="utf-8"?>
-<p:sld xmlns:a="http://schemas.openxmlformats.org/drawingml/2006/main" xmlns:r="http://schemas.openxmlformats.org/officeDocument/2006/relationships" xmlns:p="http://schemas.openxmlformats.org/presentationml/2006/main">
-  <p:cSld>
-    <p:spTree>
-      <p:nvGrpSpPr>
-        <p:cNvPr id="1" name=""/>
-        <p:cNvGrpSpPr/>
-        <p:nvPr/>
-      </p:nvGrpSpPr>
-      <p:grpSpPr>
-        <a:xfrm>
-          <a:off x="0" y="0"/>
-          <a:ext cx="0" cy="0"/>
-          <a:chOff x="0" y="0"/>
-          <a:chExt cx="0" cy="0"/>
-        </a:xfrm>
-      </p:grpSpPr>
-      <p:sp>
-        <p:nvSpPr>
-          <p:cNvPr id="2" name="Title 1">
-            <a:extLst>
-              <a:ext uri="{FF2B5EF4-FFF2-40B4-BE49-F238E27FC236}">
-                <a16:creationId xmlns:a16="http://schemas.microsoft.com/office/drawing/2014/main" id="{F2153DD3-C27C-457D-ADDD-066D01CB95CA}"/>
-              </a:ext>
-            </a:extLst>
-          </p:cNvPr>
-          <p:cNvSpPr>
-            <a:spLocks noGrp="1"/>
-          </p:cNvSpPr>
-          <p:nvPr>
-            <p:ph type="title"/>
-          </p:nvPr>
-        </p:nvSpPr>
-        <p:spPr>
-          <a:xfrm>
-            <a:off x="940904" y="641673"/>
-            <a:ext cx="4134016" cy="691763"/>
-          </a:xfrm>
-        </p:spPr>
-        <p:txBody>
-          <a:bodyPr/>
-          <a:lstStyle/>
-          <a:p>
-            <a:r>
-              <a:rPr lang="en-US" sz="4400" dirty="0">
-                <a:latin typeface="Rockwell" panose="02060603020205020403" pitchFamily="18" charset="0"/>
-              </a:rPr>
-              <a:t>Fetching Data</a:t>
-            </a:r>
-          </a:p>
-        </p:txBody>
-      </p:sp>
-      <p:pic>
-        <p:nvPicPr>
-          <p:cNvPr id="7" name="Picture Placeholder 6">
-            <a:extLst>
-              <a:ext uri="{FF2B5EF4-FFF2-40B4-BE49-F238E27FC236}">
-                <a16:creationId xmlns:a16="http://schemas.microsoft.com/office/drawing/2014/main" id="{1B5957C2-9FF0-481F-AC68-0A3E3C7ECB6F}"/>
-              </a:ext>
-            </a:extLst>
-          </p:cNvPr>
-          <p:cNvPicPr>
-            <a:picLocks noGrp="1" noChangeAspect="1"/>
-          </p:cNvPicPr>
-          <p:nvPr>
-            <p:ph type="pic" idx="1"/>
-          </p:nvPr>
-        </p:nvPicPr>
-        <p:blipFill>
-          <a:blip r:embed="rId2"/>
-          <a:srcRect t="1194" b="1194"/>
-          <a:stretch>
-            <a:fillRect/>
-          </a:stretch>
-        </p:blipFill>
-        <p:spPr>
-          <a:xfrm>
-            <a:off x="5413375" y="1246188"/>
-            <a:ext cx="6099175" cy="4624387"/>
-          </a:xfrm>
-        </p:spPr>
-      </p:pic>
-      <p:sp>
-        <p:nvSpPr>
-          <p:cNvPr id="4" name="Text Placeholder 3">
-            <a:extLst>
-              <a:ext uri="{FF2B5EF4-FFF2-40B4-BE49-F238E27FC236}">
-                <a16:creationId xmlns:a16="http://schemas.microsoft.com/office/drawing/2014/main" id="{03C506D5-2B7F-42A6-8C0C-B3954218B7CE}"/>
-              </a:ext>
-            </a:extLst>
-          </p:cNvPr>
-          <p:cNvSpPr>
-            <a:spLocks noGrp="1"/>
-          </p:cNvSpPr>
-          <p:nvPr>
-            <p:ph type="body" sz="half" idx="2"/>
-          </p:nvPr>
-        </p:nvSpPr>
-        <p:spPr>
-          <a:xfrm>
-            <a:off x="940904" y="1484242"/>
-            <a:ext cx="4134016" cy="4386203"/>
-          </a:xfrm>
-        </p:spPr>
-        <p:txBody>
-          <a:bodyPr anchor="ctr">
-            <a:normAutofit/>
-          </a:bodyPr>
-          <a:lstStyle/>
-          <a:p>
-            <a:pPr marL="285750" indent="-285750">
-              <a:buFont typeface="Arial" panose="020B0604020202020204" pitchFamily="34" charset="0"/>
-              <a:buChar char="•"/>
-            </a:pPr>
-            <a:r>
-              <a:rPr lang="en-US" sz="2400" dirty="0">
-                <a:latin typeface="Tahoma" panose="020B0604030504040204" pitchFamily="34" charset="0"/>
-                <a:ea typeface="Tahoma" panose="020B0604030504040204" pitchFamily="34" charset="0"/>
-                <a:cs typeface="Tahoma" panose="020B0604030504040204" pitchFamily="34" charset="0"/>
-              </a:rPr>
-              <a:t>Movies were fetched using </a:t>
-            </a:r>
-            <a:r>
-              <a:rPr lang="en-US" sz="3200" b="1" dirty="0">
-                <a:latin typeface="Tahoma" panose="020B0604030504040204" pitchFamily="34" charset="0"/>
-                <a:ea typeface="Tahoma" panose="020B0604030504040204" pitchFamily="34" charset="0"/>
-                <a:cs typeface="Tahoma" panose="020B0604030504040204" pitchFamily="34" charset="0"/>
-              </a:rPr>
-              <a:t>The Movie DB API (TMDB)</a:t>
-            </a:r>
-          </a:p>
-          <a:p>
-            <a:pPr marL="285750" indent="-285750">
-              <a:buFont typeface="Arial" panose="020B0604020202020204" pitchFamily="34" charset="0"/>
-              <a:buChar char="•"/>
-            </a:pPr>
-            <a:r>
-              <a:rPr lang="en-US" sz="2400" dirty="0">
-                <a:latin typeface="Tahoma" panose="020B0604030504040204" pitchFamily="34" charset="0"/>
-                <a:ea typeface="Tahoma" panose="020B0604030504040204" pitchFamily="34" charset="0"/>
-                <a:cs typeface="Tahoma" panose="020B0604030504040204" pitchFamily="34" charset="0"/>
-              </a:rPr>
-              <a:t>Shows were fetched using </a:t>
-            </a:r>
-            <a:r>
-              <a:rPr lang="en-US" sz="3200" b="1" dirty="0" err="1">
-                <a:latin typeface="Tahoma" panose="020B0604030504040204" pitchFamily="34" charset="0"/>
-                <a:ea typeface="Tahoma" panose="020B0604030504040204" pitchFamily="34" charset="0"/>
-                <a:cs typeface="Tahoma" panose="020B0604030504040204" pitchFamily="34" charset="0"/>
-              </a:rPr>
-              <a:t>TVMaze</a:t>
-            </a:r>
-            <a:r>
-              <a:rPr lang="en-US" sz="3200" b="1" dirty="0">
-                <a:latin typeface="Tahoma" panose="020B0604030504040204" pitchFamily="34" charset="0"/>
-                <a:ea typeface="Tahoma" panose="020B0604030504040204" pitchFamily="34" charset="0"/>
-                <a:cs typeface="Tahoma" panose="020B0604030504040204" pitchFamily="34" charset="0"/>
-              </a:rPr>
-              <a:t> API</a:t>
-            </a:r>
-          </a:p>
-        </p:txBody>
-      </p:sp>
-    </p:spTree>
-    <p:extLst>
-      <p:ext uri="{BB962C8B-B14F-4D97-AF65-F5344CB8AC3E}">
-        <p14:creationId xmlns:p14="http://schemas.microsoft.com/office/powerpoint/2010/main" val="2820311883"/>
-      </p:ext>
-    </p:extLst>
-  </p:cSld>
-  <p:clrMapOvr>
-    <a:masterClrMapping/>
-  </p:clrMapOvr>
-</p:sld>
-</file>
-
-<file path=ppt/slides/slide4.xml><?xml version="1.0" encoding="utf-8"?>
-<p:sld xmlns:a="http://schemas.openxmlformats.org/drawingml/2006/main" xmlns:r="http://schemas.openxmlformats.org/officeDocument/2006/relationships" xmlns:p="http://schemas.openxmlformats.org/presentationml/2006/main">
-  <p:cSld>
-    <p:spTree>
-      <p:nvGrpSpPr>
-        <p:cNvPr id="1" name=""/>
-        <p:cNvGrpSpPr/>
-        <p:nvPr/>
-      </p:nvGrpSpPr>
-      <p:grpSpPr>
-        <a:xfrm>
-          <a:off x="0" y="0"/>
-          <a:ext cx="0" cy="0"/>
-          <a:chOff x="0" y="0"/>
-          <a:chExt cx="0" cy="0"/>
-        </a:xfrm>
-      </p:grpSpPr>
-      <p:sp>
-        <p:nvSpPr>
-          <p:cNvPr id="9" name="Text Placeholder 8">
-            <a:extLst>
-              <a:ext uri="{FF2B5EF4-FFF2-40B4-BE49-F238E27FC236}">
-                <a16:creationId xmlns:a16="http://schemas.microsoft.com/office/drawing/2014/main" id="{A834D9EE-8EAF-46B6-A4D6-97262A2B9D43}"/>
-              </a:ext>
-            </a:extLst>
-          </p:cNvPr>
-          <p:cNvSpPr>
-            <a:spLocks noGrp="1"/>
-          </p:cNvSpPr>
-          <p:nvPr>
-            <p:ph type="body" idx="1"/>
-          </p:nvPr>
-        </p:nvSpPr>
-        <p:spPr>
-          <a:xfrm>
-            <a:off x="1143000" y="753237"/>
-            <a:ext cx="4754880" cy="817429"/>
-          </a:xfrm>
-        </p:spPr>
-        <p:txBody>
-          <a:bodyPr>
-            <a:normAutofit/>
-          </a:bodyPr>
-          <a:lstStyle/>
-          <a:p>
-            <a:pPr algn="ctr"/>
-            <a:r>
-              <a:rPr lang="en-US" sz="2800" dirty="0">
-                <a:latin typeface="Tahoma" panose="020B0604030504040204" pitchFamily="34" charset="0"/>
-                <a:ea typeface="Tahoma" panose="020B0604030504040204" pitchFamily="34" charset="0"/>
-                <a:cs typeface="Tahoma" panose="020B0604030504040204" pitchFamily="34" charset="0"/>
-              </a:rPr>
-              <a:t>API Response Data</a:t>
-            </a:r>
-          </a:p>
-        </p:txBody>
-      </p:sp>
-      <p:pic>
-        <p:nvPicPr>
-          <p:cNvPr id="16" name="Content Placeholder 15">
-            <a:extLst>
-              <a:ext uri="{FF2B5EF4-FFF2-40B4-BE49-F238E27FC236}">
-                <a16:creationId xmlns:a16="http://schemas.microsoft.com/office/drawing/2014/main" id="{D798FC3A-8195-42A1-B605-4931F5203BA2}"/>
-              </a:ext>
-            </a:extLst>
-          </p:cNvPr>
-          <p:cNvPicPr>
-            <a:picLocks noGrp="1" noChangeAspect="1"/>
-          </p:cNvPicPr>
-          <p:nvPr>
-            <p:ph sz="half" idx="2"/>
-          </p:nvPr>
-        </p:nvPicPr>
-        <p:blipFill>
-          <a:blip r:embed="rId2"/>
-          <a:stretch>
-            <a:fillRect/>
-          </a:stretch>
-        </p:blipFill>
-        <p:spPr>
-          <a:xfrm>
-            <a:off x="1143000" y="1581829"/>
-            <a:ext cx="4754563" cy="4511905"/>
-          </a:xfrm>
-        </p:spPr>
-      </p:pic>
-      <p:sp>
-        <p:nvSpPr>
-          <p:cNvPr id="11" name="Text Placeholder 10">
-            <a:extLst>
-              <a:ext uri="{FF2B5EF4-FFF2-40B4-BE49-F238E27FC236}">
-                <a16:creationId xmlns:a16="http://schemas.microsoft.com/office/drawing/2014/main" id="{A0346A2B-C9F7-46F2-B1C2-6E0F670B722F}"/>
-              </a:ext>
-            </a:extLst>
-          </p:cNvPr>
-          <p:cNvSpPr>
-            <a:spLocks noGrp="1"/>
-          </p:cNvSpPr>
-          <p:nvPr>
-            <p:ph type="body" sz="quarter" idx="3"/>
-          </p:nvPr>
-        </p:nvSpPr>
-        <p:spPr>
-          <a:xfrm>
-            <a:off x="6096000" y="753237"/>
-            <a:ext cx="4754880" cy="777240"/>
-          </a:xfrm>
-        </p:spPr>
-        <p:txBody>
-          <a:bodyPr>
-            <a:normAutofit/>
-          </a:bodyPr>
-          <a:lstStyle/>
-          <a:p>
-            <a:pPr algn="ctr"/>
-            <a:r>
-              <a:rPr lang="en-US" sz="2800" dirty="0">
-                <a:latin typeface="Tahoma" panose="020B0604030504040204" pitchFamily="34" charset="0"/>
-                <a:ea typeface="Tahoma" panose="020B0604030504040204" pitchFamily="34" charset="0"/>
-                <a:cs typeface="Tahoma" panose="020B0604030504040204" pitchFamily="34" charset="0"/>
-              </a:rPr>
-              <a:t>Formatted Data</a:t>
-            </a:r>
-          </a:p>
-        </p:txBody>
-      </p:sp>
-      <p:pic>
-        <p:nvPicPr>
-          <p:cNvPr id="18" name="Content Placeholder 17">
-            <a:extLst>
-              <a:ext uri="{FF2B5EF4-FFF2-40B4-BE49-F238E27FC236}">
-                <a16:creationId xmlns:a16="http://schemas.microsoft.com/office/drawing/2014/main" id="{C2B2DB03-8A43-4451-B1B0-9D2AAEAA5305}"/>
-              </a:ext>
-            </a:extLst>
-          </p:cNvPr>
-          <p:cNvPicPr>
-            <a:picLocks noGrp="1" noChangeAspect="1"/>
-          </p:cNvPicPr>
-          <p:nvPr>
-            <p:ph sz="quarter" idx="4"/>
-          </p:nvPr>
-        </p:nvPicPr>
-        <p:blipFill>
-          <a:blip r:embed="rId3"/>
-          <a:stretch>
-            <a:fillRect/>
-          </a:stretch>
-        </p:blipFill>
-        <p:spPr>
-          <a:xfrm>
-            <a:off x="6269038" y="1581829"/>
-            <a:ext cx="4754562" cy="4340602"/>
-          </a:xfrm>
-        </p:spPr>
-      </p:pic>
-    </p:spTree>
-    <p:extLst>
-      <p:ext uri="{BB962C8B-B14F-4D97-AF65-F5344CB8AC3E}">
-        <p14:creationId xmlns:p14="http://schemas.microsoft.com/office/powerpoint/2010/main" val="723261768"/>
-      </p:ext>
-    </p:extLst>
-  </p:cSld>
-  <p:clrMapOvr>
-    <a:masterClrMapping/>
-  </p:clrMapOvr>
-</p:sld>
-</file>
-
-<file path=ppt/slides/slide5.xml><?xml version="1.0" encoding="utf-8"?>
+<file path=ppt/slides/slide10.xml><?xml version="1.0" encoding="utf-8"?>
 <p:sld xmlns:a="http://schemas.openxmlformats.org/drawingml/2006/main" xmlns:r="http://schemas.openxmlformats.org/officeDocument/2006/relationships" xmlns:p="http://schemas.openxmlformats.org/presentationml/2006/main">
   <p:cSld>
     <p:spTree>
@@ -4637,7 +5303,7 @@
 </p:sld>
 </file>
 
-<file path=ppt/slides/slide6.xml><?xml version="1.0" encoding="utf-8"?>
+<file path=ppt/slides/slide11.xml><?xml version="1.0" encoding="utf-8"?>
 <p:sld xmlns:a="http://schemas.openxmlformats.org/drawingml/2006/main" xmlns:r="http://schemas.openxmlformats.org/officeDocument/2006/relationships" xmlns:p="http://schemas.openxmlformats.org/presentationml/2006/main">
   <p:cSld>
     <p:spTree>
@@ -4860,7 +5526,7 @@
 </p:sld>
 </file>
 
-<file path=ppt/slides/slide7.xml><?xml version="1.0" encoding="utf-8"?>
+<file path=ppt/slides/slide12.xml><?xml version="1.0" encoding="utf-8"?>
 <p:sld xmlns:a="http://schemas.openxmlformats.org/drawingml/2006/main" xmlns:r="http://schemas.openxmlformats.org/officeDocument/2006/relationships" xmlns:p="http://schemas.openxmlformats.org/presentationml/2006/main">
   <p:cSld>
     <p:spTree>
@@ -5028,6 +5694,1661 @@
         <p14:creationId xmlns:p14="http://schemas.microsoft.com/office/powerpoint/2010/main" val="3978817235"/>
       </p:ext>
     </p:extLst>
+  </p:cSld>
+  <p:clrMapOvr>
+    <a:masterClrMapping/>
+  </p:clrMapOvr>
+</p:sld>
+</file>
+
+<file path=ppt/slides/slide13.xml><?xml version="1.0" encoding="utf-8"?>
+<p:sld xmlns:a="http://schemas.openxmlformats.org/drawingml/2006/main" xmlns:r="http://schemas.openxmlformats.org/officeDocument/2006/relationships" xmlns:p="http://schemas.openxmlformats.org/presentationml/2006/main">
+  <p:cSld>
+    <p:spTree>
+      <p:nvGrpSpPr>
+        <p:cNvPr id="1" name=""/>
+        <p:cNvGrpSpPr/>
+        <p:nvPr/>
+      </p:nvGrpSpPr>
+      <p:grpSpPr>
+        <a:xfrm>
+          <a:off x="0" y="0"/>
+          <a:ext cx="0" cy="0"/>
+          <a:chOff x="0" y="0"/>
+          <a:chExt cx="0" cy="0"/>
+        </a:xfrm>
+      </p:grpSpPr>
+      <p:sp>
+        <p:nvSpPr>
+          <p:cNvPr id="6" name="Text Placeholder 5">
+            <a:extLst>
+              <a:ext uri="{FF2B5EF4-FFF2-40B4-BE49-F238E27FC236}">
+                <a16:creationId xmlns:a16="http://schemas.microsoft.com/office/drawing/2014/main" id="{8F8B411F-C9E3-4641-B591-CB924CBDDB50}"/>
+              </a:ext>
+            </a:extLst>
+          </p:cNvPr>
+          <p:cNvSpPr>
+            <a:spLocks noGrp="1"/>
+          </p:cNvSpPr>
+          <p:nvPr>
+            <p:ph type="body" idx="1"/>
+          </p:nvPr>
+        </p:nvSpPr>
+        <p:spPr>
+          <a:xfrm>
+            <a:off x="1143000" y="580958"/>
+            <a:ext cx="4754880" cy="777240"/>
+          </a:xfrm>
+        </p:spPr>
+        <p:txBody>
+          <a:bodyPr/>
+          <a:lstStyle/>
+          <a:p>
+            <a:endParaRPr lang="en-US" dirty="0"/>
+          </a:p>
+        </p:txBody>
+      </p:sp>
+      <p:pic>
+        <p:nvPicPr>
+          <p:cNvPr id="3" name="Content Placeholder 2">
+            <a:extLst>
+              <a:ext uri="{FF2B5EF4-FFF2-40B4-BE49-F238E27FC236}">
+                <a16:creationId xmlns:a16="http://schemas.microsoft.com/office/drawing/2014/main" id="{9615D78D-D787-40A8-8E04-1FC6C17C32B7}"/>
+              </a:ext>
+            </a:extLst>
+          </p:cNvPr>
+          <p:cNvPicPr>
+            <a:picLocks noGrp="1" noChangeAspect="1"/>
+          </p:cNvPicPr>
+          <p:nvPr>
+            <p:ph sz="half" idx="2"/>
+          </p:nvPr>
+        </p:nvPicPr>
+        <p:blipFill>
+          <a:blip r:embed="rId2"/>
+          <a:stretch>
+            <a:fillRect/>
+          </a:stretch>
+        </p:blipFill>
+        <p:spPr>
+          <a:xfrm>
+            <a:off x="1143000" y="1358198"/>
+            <a:ext cx="4754880" cy="4747327"/>
+          </a:xfrm>
+        </p:spPr>
+      </p:pic>
+      <p:sp>
+        <p:nvSpPr>
+          <p:cNvPr id="8" name="Text Placeholder 7">
+            <a:extLst>
+              <a:ext uri="{FF2B5EF4-FFF2-40B4-BE49-F238E27FC236}">
+                <a16:creationId xmlns:a16="http://schemas.microsoft.com/office/drawing/2014/main" id="{666DA11C-2B17-40CE-A991-030E8568F1FD}"/>
+              </a:ext>
+            </a:extLst>
+          </p:cNvPr>
+          <p:cNvSpPr>
+            <a:spLocks noGrp="1"/>
+          </p:cNvSpPr>
+          <p:nvPr>
+            <p:ph type="body" sz="quarter" idx="3"/>
+          </p:nvPr>
+        </p:nvSpPr>
+        <p:spPr>
+          <a:xfrm>
+            <a:off x="6096000" y="580958"/>
+            <a:ext cx="4754880" cy="777240"/>
+          </a:xfrm>
+        </p:spPr>
+        <p:txBody>
+          <a:bodyPr/>
+          <a:lstStyle/>
+          <a:p>
+            <a:endParaRPr lang="en-US" dirty="0"/>
+          </a:p>
+        </p:txBody>
+      </p:sp>
+      <p:sp>
+        <p:nvSpPr>
+          <p:cNvPr id="9" name="Content Placeholder 8">
+            <a:extLst>
+              <a:ext uri="{FF2B5EF4-FFF2-40B4-BE49-F238E27FC236}">
+                <a16:creationId xmlns:a16="http://schemas.microsoft.com/office/drawing/2014/main" id="{94E12BF2-35A6-4D45-B9CD-85102158F038}"/>
+              </a:ext>
+            </a:extLst>
+          </p:cNvPr>
+          <p:cNvSpPr>
+            <a:spLocks noGrp="1"/>
+          </p:cNvSpPr>
+          <p:nvPr>
+            <p:ph sz="quarter" idx="4"/>
+          </p:nvPr>
+        </p:nvSpPr>
+        <p:spPr>
+          <a:xfrm>
+            <a:off x="6096000" y="1357435"/>
+            <a:ext cx="4754880" cy="4747327"/>
+          </a:xfrm>
+        </p:spPr>
+        <p:txBody>
+          <a:bodyPr/>
+          <a:lstStyle/>
+          <a:p>
+            <a:endParaRPr lang="en-US" dirty="0"/>
+          </a:p>
+        </p:txBody>
+      </p:sp>
+    </p:spTree>
+    <p:extLst>
+      <p:ext uri="{BB962C8B-B14F-4D97-AF65-F5344CB8AC3E}">
+        <p14:creationId xmlns:p14="http://schemas.microsoft.com/office/powerpoint/2010/main" val="2479869723"/>
+      </p:ext>
+    </p:extLst>
+  </p:cSld>
+  <p:clrMapOvr>
+    <a:masterClrMapping/>
+  </p:clrMapOvr>
+</p:sld>
+</file>
+
+<file path=ppt/slides/slide2.xml><?xml version="1.0" encoding="utf-8"?>
+<p:sld xmlns:a="http://schemas.openxmlformats.org/drawingml/2006/main" xmlns:r="http://schemas.openxmlformats.org/officeDocument/2006/relationships" xmlns:p="http://schemas.openxmlformats.org/presentationml/2006/main">
+  <p:cSld>
+    <p:spTree>
+      <p:nvGrpSpPr>
+        <p:cNvPr id="1" name="Shape 98"/>
+        <p:cNvGrpSpPr/>
+        <p:nvPr/>
+      </p:nvGrpSpPr>
+      <p:grpSpPr>
+        <a:xfrm>
+          <a:off x="0" y="0"/>
+          <a:ext cx="0" cy="0"/>
+          <a:chOff x="0" y="0"/>
+          <a:chExt cx="0" cy="0"/>
+        </a:xfrm>
+      </p:grpSpPr>
+      <p:sp>
+        <p:nvSpPr>
+          <p:cNvPr id="99" name="Google Shape;99;p14"/>
+          <p:cNvSpPr txBox="1">
+            <a:spLocks noGrp="1"/>
+          </p:cNvSpPr>
+          <p:nvPr>
+            <p:ph type="title"/>
+          </p:nvPr>
+        </p:nvSpPr>
+        <p:spPr>
+          <a:xfrm>
+            <a:off x="1141669" y="571765"/>
+            <a:ext cx="9875400" cy="1356300"/>
+          </a:xfrm>
+          <a:prstGeom prst="rect">
+            <a:avLst/>
+          </a:prstGeom>
+          <a:noFill/>
+          <a:ln>
+            <a:noFill/>
+          </a:ln>
+        </p:spPr>
+        <p:txBody>
+          <a:bodyPr spcFirstLastPara="1" wrap="square" lIns="91425" tIns="45700" rIns="91425" bIns="45700" anchor="ctr" anchorCtr="0">
+            <a:noAutofit/>
+          </a:bodyPr>
+          <a:lstStyle/>
+          <a:p>
+            <a:pPr marL="0" lvl="0" indent="0" algn="l" rtl="0">
+              <a:lnSpc>
+                <a:spcPct val="90000"/>
+              </a:lnSpc>
+              <a:spcBef>
+                <a:spcPts val="0"/>
+              </a:spcBef>
+              <a:spcAft>
+                <a:spcPts val="0"/>
+              </a:spcAft>
+              <a:buClr>
+                <a:schemeClr val="accent1"/>
+              </a:buClr>
+              <a:buSzPts val="4400"/>
+              <a:buFont typeface="Rockwell"/>
+              <a:buNone/>
+            </a:pPr>
+            <a:r>
+              <a:rPr lang="en-US" dirty="0">
+                <a:latin typeface="Rockwell"/>
+                <a:ea typeface="Rockwell"/>
+                <a:cs typeface="Rockwell"/>
+                <a:sym typeface="Rockwell"/>
+              </a:rPr>
+              <a:t>Introduction - What Does NOSQL mean?</a:t>
+            </a:r>
+            <a:endParaRPr dirty="0"/>
+          </a:p>
+        </p:txBody>
+      </p:sp>
+      <p:sp>
+        <p:nvSpPr>
+          <p:cNvPr id="100" name="Google Shape;100;p14"/>
+          <p:cNvSpPr txBox="1">
+            <a:spLocks noGrp="1"/>
+          </p:cNvSpPr>
+          <p:nvPr>
+            <p:ph type="body" idx="1"/>
+          </p:nvPr>
+        </p:nvSpPr>
+        <p:spPr>
+          <a:xfrm>
+            <a:off x="1143000" y="1928065"/>
+            <a:ext cx="9872871" cy="4167935"/>
+          </a:xfrm>
+          <a:prstGeom prst="rect">
+            <a:avLst/>
+          </a:prstGeom>
+          <a:noFill/>
+          <a:ln>
+            <a:noFill/>
+          </a:ln>
+        </p:spPr>
+        <p:txBody>
+          <a:bodyPr spcFirstLastPara="1" wrap="square" lIns="91425" tIns="45700" rIns="91425" bIns="45700" anchor="t" anchorCtr="0">
+            <a:noAutofit/>
+          </a:bodyPr>
+          <a:lstStyle/>
+          <a:p>
+            <a:pPr marL="457200" lvl="0" indent="0" algn="l" rtl="0">
+              <a:lnSpc>
+                <a:spcPct val="90000"/>
+              </a:lnSpc>
+              <a:spcBef>
+                <a:spcPts val="0"/>
+              </a:spcBef>
+              <a:spcAft>
+                <a:spcPts val="0"/>
+              </a:spcAft>
+              <a:buNone/>
+            </a:pPr>
+            <a:endParaRPr b="1" dirty="0"/>
+          </a:p>
+          <a:p>
+            <a:pPr marL="457200" lvl="0" indent="-320040" algn="l" rtl="0">
+              <a:lnSpc>
+                <a:spcPct val="90000"/>
+              </a:lnSpc>
+              <a:spcBef>
+                <a:spcPts val="0"/>
+              </a:spcBef>
+              <a:spcAft>
+                <a:spcPts val="0"/>
+              </a:spcAft>
+              <a:buSzPts val="1440"/>
+              <a:buChar char="-"/>
+            </a:pPr>
+            <a:r>
+              <a:rPr lang="en-US" sz="2400" b="1" dirty="0">
+                <a:latin typeface="Tahoma" panose="020B0604030504040204" pitchFamily="34" charset="0"/>
+                <a:ea typeface="Tahoma" panose="020B0604030504040204" pitchFamily="34" charset="0"/>
+                <a:cs typeface="Tahoma" panose="020B0604030504040204" pitchFamily="34" charset="0"/>
+              </a:rPr>
+              <a:t>database Types :</a:t>
+            </a:r>
+            <a:endParaRPr sz="2400" b="1" dirty="0">
+              <a:latin typeface="Tahoma" panose="020B0604030504040204" pitchFamily="34" charset="0"/>
+              <a:ea typeface="Tahoma" panose="020B0604030504040204" pitchFamily="34" charset="0"/>
+              <a:cs typeface="Tahoma" panose="020B0604030504040204" pitchFamily="34" charset="0"/>
+            </a:endParaRPr>
+          </a:p>
+          <a:p>
+            <a:pPr marL="914400" lvl="1" indent="-320040" algn="l" rtl="0">
+              <a:lnSpc>
+                <a:spcPct val="90000"/>
+              </a:lnSpc>
+              <a:spcBef>
+                <a:spcPts val="0"/>
+              </a:spcBef>
+              <a:spcAft>
+                <a:spcPts val="0"/>
+              </a:spcAft>
+              <a:buSzPts val="1440"/>
+              <a:buChar char="-"/>
+            </a:pPr>
+            <a:r>
+              <a:rPr lang="en-US" sz="2400" dirty="0">
+                <a:latin typeface="Tahoma" panose="020B0604030504040204" pitchFamily="34" charset="0"/>
+                <a:ea typeface="Tahoma" panose="020B0604030504040204" pitchFamily="34" charset="0"/>
+                <a:cs typeface="Tahoma" panose="020B0604030504040204" pitchFamily="34" charset="0"/>
+              </a:rPr>
+              <a:t>Relational Databases </a:t>
+            </a:r>
+            <a:endParaRPr sz="2400" dirty="0">
+              <a:latin typeface="Tahoma" panose="020B0604030504040204" pitchFamily="34" charset="0"/>
+              <a:ea typeface="Tahoma" panose="020B0604030504040204" pitchFamily="34" charset="0"/>
+              <a:cs typeface="Tahoma" panose="020B0604030504040204" pitchFamily="34" charset="0"/>
+            </a:endParaRPr>
+          </a:p>
+          <a:p>
+            <a:pPr marL="914400" lvl="1" indent="-320040" algn="l" rtl="0">
+              <a:lnSpc>
+                <a:spcPct val="90000"/>
+              </a:lnSpc>
+              <a:spcBef>
+                <a:spcPts val="0"/>
+              </a:spcBef>
+              <a:spcAft>
+                <a:spcPts val="0"/>
+              </a:spcAft>
+              <a:buSzPts val="1440"/>
+              <a:buChar char="-"/>
+            </a:pPr>
+            <a:r>
+              <a:rPr lang="en-US" sz="2400" dirty="0">
+                <a:latin typeface="Tahoma" panose="020B0604030504040204" pitchFamily="34" charset="0"/>
+                <a:ea typeface="Tahoma" panose="020B0604030504040204" pitchFamily="34" charset="0"/>
+                <a:cs typeface="Tahoma" panose="020B0604030504040204" pitchFamily="34" charset="0"/>
+              </a:rPr>
+              <a:t>Non-Relational Databases</a:t>
+            </a:r>
+            <a:endParaRPr sz="2400" dirty="0">
+              <a:latin typeface="Tahoma" panose="020B0604030504040204" pitchFamily="34" charset="0"/>
+              <a:ea typeface="Tahoma" panose="020B0604030504040204" pitchFamily="34" charset="0"/>
+              <a:cs typeface="Tahoma" panose="020B0604030504040204" pitchFamily="34" charset="0"/>
+            </a:endParaRPr>
+          </a:p>
+          <a:p>
+            <a:pPr marL="0" lvl="0" indent="0" algn="l" rtl="0">
+              <a:lnSpc>
+                <a:spcPct val="90000"/>
+              </a:lnSpc>
+              <a:spcBef>
+                <a:spcPts val="400"/>
+              </a:spcBef>
+              <a:spcAft>
+                <a:spcPts val="0"/>
+              </a:spcAft>
+              <a:buNone/>
+            </a:pPr>
+            <a:endParaRPr sz="2400" dirty="0">
+              <a:latin typeface="Tahoma" panose="020B0604030504040204" pitchFamily="34" charset="0"/>
+              <a:ea typeface="Tahoma" panose="020B0604030504040204" pitchFamily="34" charset="0"/>
+              <a:cs typeface="Tahoma" panose="020B0604030504040204" pitchFamily="34" charset="0"/>
+            </a:endParaRPr>
+          </a:p>
+          <a:p>
+            <a:pPr marL="457200" lvl="0" indent="-320040" algn="l" rtl="0">
+              <a:lnSpc>
+                <a:spcPct val="90000"/>
+              </a:lnSpc>
+              <a:spcBef>
+                <a:spcPts val="0"/>
+              </a:spcBef>
+              <a:spcAft>
+                <a:spcPts val="0"/>
+              </a:spcAft>
+              <a:buSzPts val="1440"/>
+              <a:buChar char="-"/>
+            </a:pPr>
+            <a:r>
+              <a:rPr lang="en-US" sz="2400" b="1" dirty="0">
+                <a:latin typeface="Tahoma" panose="020B0604030504040204" pitchFamily="34" charset="0"/>
+                <a:ea typeface="Tahoma" panose="020B0604030504040204" pitchFamily="34" charset="0"/>
+                <a:cs typeface="Tahoma" panose="020B0604030504040204" pitchFamily="34" charset="0"/>
+              </a:rPr>
+              <a:t>Common Mistake : </a:t>
+            </a:r>
+            <a:r>
+              <a:rPr lang="en-US" sz="2400" dirty="0">
+                <a:latin typeface="Tahoma" panose="020B0604030504040204" pitchFamily="34" charset="0"/>
+                <a:ea typeface="Tahoma" panose="020B0604030504040204" pitchFamily="34" charset="0"/>
+                <a:cs typeface="Tahoma" panose="020B0604030504040204" pitchFamily="34" charset="0"/>
+              </a:rPr>
+              <a:t>No SQL</a:t>
+            </a:r>
+            <a:endParaRPr sz="2400" dirty="0">
+              <a:latin typeface="Tahoma" panose="020B0604030504040204" pitchFamily="34" charset="0"/>
+              <a:ea typeface="Tahoma" panose="020B0604030504040204" pitchFamily="34" charset="0"/>
+              <a:cs typeface="Tahoma" panose="020B0604030504040204" pitchFamily="34" charset="0"/>
+            </a:endParaRPr>
+          </a:p>
+          <a:p>
+            <a:pPr marL="0" lvl="0" indent="0" algn="l" rtl="0">
+              <a:lnSpc>
+                <a:spcPct val="90000"/>
+              </a:lnSpc>
+              <a:spcBef>
+                <a:spcPts val="0"/>
+              </a:spcBef>
+              <a:spcAft>
+                <a:spcPts val="0"/>
+              </a:spcAft>
+              <a:buNone/>
+            </a:pPr>
+            <a:endParaRPr sz="2400" b="1" dirty="0">
+              <a:latin typeface="Tahoma" panose="020B0604030504040204" pitchFamily="34" charset="0"/>
+              <a:ea typeface="Tahoma" panose="020B0604030504040204" pitchFamily="34" charset="0"/>
+              <a:cs typeface="Tahoma" panose="020B0604030504040204" pitchFamily="34" charset="0"/>
+            </a:endParaRPr>
+          </a:p>
+          <a:p>
+            <a:pPr marL="457200" lvl="0" indent="-320040" algn="l" rtl="0">
+              <a:lnSpc>
+                <a:spcPct val="90000"/>
+              </a:lnSpc>
+              <a:spcBef>
+                <a:spcPts val="0"/>
+              </a:spcBef>
+              <a:spcAft>
+                <a:spcPts val="0"/>
+              </a:spcAft>
+              <a:buSzPts val="1440"/>
+              <a:buChar char="-"/>
+            </a:pPr>
+            <a:r>
+              <a:rPr lang="en-US" sz="2400" b="1" dirty="0">
+                <a:latin typeface="Tahoma" panose="020B0604030504040204" pitchFamily="34" charset="0"/>
+                <a:ea typeface="Tahoma" panose="020B0604030504040204" pitchFamily="34" charset="0"/>
+                <a:cs typeface="Tahoma" panose="020B0604030504040204" pitchFamily="34" charset="0"/>
+              </a:rPr>
+              <a:t>NOSQL Stands For : </a:t>
+            </a:r>
+            <a:r>
+              <a:rPr lang="en-US" sz="2400" dirty="0">
+                <a:latin typeface="Tahoma" panose="020B0604030504040204" pitchFamily="34" charset="0"/>
+                <a:ea typeface="Tahoma" panose="020B0604030504040204" pitchFamily="34" charset="0"/>
+                <a:cs typeface="Tahoma" panose="020B0604030504040204" pitchFamily="34" charset="0"/>
+              </a:rPr>
+              <a:t>not only SQL</a:t>
+            </a:r>
+            <a:endParaRPr sz="2400" dirty="0">
+              <a:latin typeface="Tahoma" panose="020B0604030504040204" pitchFamily="34" charset="0"/>
+              <a:ea typeface="Tahoma" panose="020B0604030504040204" pitchFamily="34" charset="0"/>
+              <a:cs typeface="Tahoma" panose="020B0604030504040204" pitchFamily="34" charset="0"/>
+            </a:endParaRPr>
+          </a:p>
+          <a:p>
+            <a:pPr marL="0" lvl="0" indent="0" algn="l" rtl="0">
+              <a:lnSpc>
+                <a:spcPct val="90000"/>
+              </a:lnSpc>
+              <a:spcBef>
+                <a:spcPts val="0"/>
+              </a:spcBef>
+              <a:spcAft>
+                <a:spcPts val="0"/>
+              </a:spcAft>
+              <a:buNone/>
+            </a:pPr>
+            <a:endParaRPr sz="2400" dirty="0">
+              <a:latin typeface="Tahoma" panose="020B0604030504040204" pitchFamily="34" charset="0"/>
+              <a:ea typeface="Tahoma" panose="020B0604030504040204" pitchFamily="34" charset="0"/>
+              <a:cs typeface="Tahoma" panose="020B0604030504040204" pitchFamily="34" charset="0"/>
+            </a:endParaRPr>
+          </a:p>
+          <a:p>
+            <a:pPr marL="457200" lvl="0" indent="-320040" algn="l" rtl="0">
+              <a:lnSpc>
+                <a:spcPct val="90000"/>
+              </a:lnSpc>
+              <a:spcBef>
+                <a:spcPts val="0"/>
+              </a:spcBef>
+              <a:spcAft>
+                <a:spcPts val="0"/>
+              </a:spcAft>
+              <a:buSzPts val="1440"/>
+              <a:buChar char="-"/>
+            </a:pPr>
+            <a:r>
+              <a:rPr lang="en-US" sz="2400" b="1" dirty="0">
+                <a:latin typeface="Tahoma" panose="020B0604030504040204" pitchFamily="34" charset="0"/>
+                <a:ea typeface="Tahoma" panose="020B0604030504040204" pitchFamily="34" charset="0"/>
+                <a:cs typeface="Tahoma" panose="020B0604030504040204" pitchFamily="34" charset="0"/>
+              </a:rPr>
+              <a:t>Possible to use SQL *not Common* </a:t>
+            </a:r>
+            <a:endParaRPr sz="2400" b="1" dirty="0">
+              <a:latin typeface="Tahoma" panose="020B0604030504040204" pitchFamily="34" charset="0"/>
+              <a:ea typeface="Tahoma" panose="020B0604030504040204" pitchFamily="34" charset="0"/>
+              <a:cs typeface="Tahoma" panose="020B0604030504040204" pitchFamily="34" charset="0"/>
+            </a:endParaRPr>
+          </a:p>
+          <a:p>
+            <a:pPr marL="457200" lvl="0" indent="0" algn="l" rtl="0">
+              <a:lnSpc>
+                <a:spcPct val="90000"/>
+              </a:lnSpc>
+              <a:spcBef>
+                <a:spcPts val="0"/>
+              </a:spcBef>
+              <a:spcAft>
+                <a:spcPts val="0"/>
+              </a:spcAft>
+              <a:buNone/>
+            </a:pPr>
+            <a:endParaRPr sz="2400" b="1" dirty="0">
+              <a:latin typeface="Tahoma" panose="020B0604030504040204" pitchFamily="34" charset="0"/>
+              <a:ea typeface="Tahoma" panose="020B0604030504040204" pitchFamily="34" charset="0"/>
+              <a:cs typeface="Tahoma" panose="020B0604030504040204" pitchFamily="34" charset="0"/>
+            </a:endParaRPr>
+          </a:p>
+          <a:p>
+            <a:pPr marL="457200" lvl="0" indent="-320040" algn="l" rtl="0">
+              <a:lnSpc>
+                <a:spcPct val="90000"/>
+              </a:lnSpc>
+              <a:spcBef>
+                <a:spcPts val="0"/>
+              </a:spcBef>
+              <a:spcAft>
+                <a:spcPts val="0"/>
+              </a:spcAft>
+              <a:buSzPts val="1440"/>
+              <a:buChar char="-"/>
+            </a:pPr>
+            <a:r>
+              <a:rPr lang="en-US" sz="2400" b="1" dirty="0">
+                <a:latin typeface="Tahoma" panose="020B0604030504040204" pitchFamily="34" charset="0"/>
+                <a:ea typeface="Tahoma" panose="020B0604030504040204" pitchFamily="34" charset="0"/>
+                <a:cs typeface="Tahoma" panose="020B0604030504040204" pitchFamily="34" charset="0"/>
+              </a:rPr>
+              <a:t>Don’t use columns or tables</a:t>
+            </a:r>
+            <a:endParaRPr sz="2400" b="1" dirty="0">
+              <a:latin typeface="Tahoma" panose="020B0604030504040204" pitchFamily="34" charset="0"/>
+              <a:ea typeface="Tahoma" panose="020B0604030504040204" pitchFamily="34" charset="0"/>
+              <a:cs typeface="Tahoma" panose="020B0604030504040204" pitchFamily="34" charset="0"/>
+            </a:endParaRPr>
+          </a:p>
+        </p:txBody>
+      </p:sp>
+    </p:spTree>
+  </p:cSld>
+  <p:clrMapOvr>
+    <a:masterClrMapping/>
+  </p:clrMapOvr>
+</p:sld>
+</file>
+
+<file path=ppt/slides/slide3.xml><?xml version="1.0" encoding="utf-8"?>
+<p:sld xmlns:a="http://schemas.openxmlformats.org/drawingml/2006/main" xmlns:r="http://schemas.openxmlformats.org/officeDocument/2006/relationships" xmlns:p="http://schemas.openxmlformats.org/presentationml/2006/main">
+  <p:cSld>
+    <p:spTree>
+      <p:nvGrpSpPr>
+        <p:cNvPr id="1" name="Shape 105"/>
+        <p:cNvGrpSpPr/>
+        <p:nvPr/>
+      </p:nvGrpSpPr>
+      <p:grpSpPr>
+        <a:xfrm>
+          <a:off x="0" y="0"/>
+          <a:ext cx="0" cy="0"/>
+          <a:chOff x="0" y="0"/>
+          <a:chExt cx="0" cy="0"/>
+        </a:xfrm>
+      </p:grpSpPr>
+      <p:sp>
+        <p:nvSpPr>
+          <p:cNvPr id="106" name="Google Shape;106;p15"/>
+          <p:cNvSpPr txBox="1">
+            <a:spLocks noGrp="1"/>
+          </p:cNvSpPr>
+          <p:nvPr>
+            <p:ph type="title"/>
+          </p:nvPr>
+        </p:nvSpPr>
+        <p:spPr>
+          <a:xfrm>
+            <a:off x="1143000" y="609600"/>
+            <a:ext cx="9875400" cy="1356300"/>
+          </a:xfrm>
+          <a:prstGeom prst="rect">
+            <a:avLst/>
+          </a:prstGeom>
+        </p:spPr>
+        <p:txBody>
+          <a:bodyPr spcFirstLastPara="1" wrap="square" lIns="91425" tIns="45700" rIns="91425" bIns="45700" anchor="ctr" anchorCtr="0">
+            <a:noAutofit/>
+          </a:bodyPr>
+          <a:lstStyle/>
+          <a:p>
+            <a:pPr marL="0" lvl="0" indent="0" algn="l" rtl="0">
+              <a:spcBef>
+                <a:spcPts val="0"/>
+              </a:spcBef>
+              <a:spcAft>
+                <a:spcPts val="0"/>
+              </a:spcAft>
+              <a:buNone/>
+            </a:pPr>
+            <a:r>
+              <a:rPr lang="en-US" b="1" dirty="0">
+                <a:latin typeface="Rockwell" panose="02060603020205020403" pitchFamily="18" charset="0"/>
+              </a:rPr>
+              <a:t>NOSQL &amp; BIG DATA</a:t>
+            </a:r>
+            <a:endParaRPr b="1" dirty="0">
+              <a:latin typeface="Rockwell" panose="02060603020205020403" pitchFamily="18" charset="0"/>
+            </a:endParaRPr>
+          </a:p>
+        </p:txBody>
+      </p:sp>
+      <p:sp>
+        <p:nvSpPr>
+          <p:cNvPr id="107" name="Google Shape;107;p15"/>
+          <p:cNvSpPr txBox="1">
+            <a:spLocks noGrp="1"/>
+          </p:cNvSpPr>
+          <p:nvPr>
+            <p:ph type="body" idx="1"/>
+          </p:nvPr>
+        </p:nvSpPr>
+        <p:spPr>
+          <a:xfrm>
+            <a:off x="1143000" y="2057400"/>
+            <a:ext cx="9873000" cy="4038600"/>
+          </a:xfrm>
+          <a:prstGeom prst="rect">
+            <a:avLst/>
+          </a:prstGeom>
+        </p:spPr>
+        <p:txBody>
+          <a:bodyPr spcFirstLastPara="1" wrap="square" lIns="91425" tIns="45700" rIns="91425" bIns="45700" anchor="t" anchorCtr="0">
+            <a:noAutofit/>
+          </a:bodyPr>
+          <a:lstStyle/>
+          <a:p>
+            <a:pPr marL="457200" lvl="0" indent="-320040" algn="l" rtl="0">
+              <a:lnSpc>
+                <a:spcPct val="200000"/>
+              </a:lnSpc>
+              <a:spcBef>
+                <a:spcPts val="1400"/>
+              </a:spcBef>
+              <a:spcAft>
+                <a:spcPts val="0"/>
+              </a:spcAft>
+              <a:buSzPts val="1440"/>
+              <a:buChar char="-"/>
+            </a:pPr>
+            <a:r>
+              <a:rPr lang="en-US" sz="2400" dirty="0">
+                <a:latin typeface="Tahoma" panose="020B0604030504040204" pitchFamily="34" charset="0"/>
+                <a:ea typeface="Tahoma" panose="020B0604030504040204" pitchFamily="34" charset="0"/>
+                <a:cs typeface="Tahoma" panose="020B0604030504040204" pitchFamily="34" charset="0"/>
+              </a:rPr>
+              <a:t>NOSQL is usually used for Big Data &amp; real time web applications</a:t>
+            </a:r>
+            <a:endParaRPr sz="2400" dirty="0">
+              <a:latin typeface="Tahoma" panose="020B0604030504040204" pitchFamily="34" charset="0"/>
+              <a:ea typeface="Tahoma" panose="020B0604030504040204" pitchFamily="34" charset="0"/>
+              <a:cs typeface="Tahoma" panose="020B0604030504040204" pitchFamily="34" charset="0"/>
+            </a:endParaRPr>
+          </a:p>
+          <a:p>
+            <a:pPr marL="457200" lvl="0" indent="-340360" algn="l" rtl="0">
+              <a:lnSpc>
+                <a:spcPct val="200000"/>
+              </a:lnSpc>
+              <a:spcBef>
+                <a:spcPts val="0"/>
+              </a:spcBef>
+              <a:spcAft>
+                <a:spcPts val="0"/>
+              </a:spcAft>
+              <a:buSzPts val="1760"/>
+              <a:buChar char="-"/>
+            </a:pPr>
+            <a:r>
+              <a:rPr lang="en-US" sz="2400" b="1" dirty="0">
+                <a:latin typeface="Tahoma" panose="020B0604030504040204" pitchFamily="34" charset="0"/>
+                <a:ea typeface="Tahoma" panose="020B0604030504040204" pitchFamily="34" charset="0"/>
+                <a:cs typeface="Tahoma" panose="020B0604030504040204" pitchFamily="34" charset="0"/>
+              </a:rPr>
+              <a:t>BIG DATA</a:t>
+            </a:r>
+            <a:r>
+              <a:rPr lang="en-US" sz="2400" dirty="0">
+                <a:latin typeface="Tahoma" panose="020B0604030504040204" pitchFamily="34" charset="0"/>
+                <a:ea typeface="Tahoma" panose="020B0604030504040204" pitchFamily="34" charset="0"/>
+                <a:cs typeface="Tahoma" panose="020B0604030504040204" pitchFamily="34" charset="0"/>
+              </a:rPr>
+              <a:t> ? </a:t>
+            </a:r>
+            <a:endParaRPr sz="2400" dirty="0">
+              <a:latin typeface="Tahoma" panose="020B0604030504040204" pitchFamily="34" charset="0"/>
+              <a:ea typeface="Tahoma" panose="020B0604030504040204" pitchFamily="34" charset="0"/>
+              <a:cs typeface="Tahoma" panose="020B0604030504040204" pitchFamily="34" charset="0"/>
+            </a:endParaRPr>
+          </a:p>
+          <a:p>
+            <a:pPr marL="914400" lvl="1" indent="-330200" algn="l" rtl="0">
+              <a:lnSpc>
+                <a:spcPct val="200000"/>
+              </a:lnSpc>
+              <a:spcBef>
+                <a:spcPts val="0"/>
+              </a:spcBef>
+              <a:spcAft>
+                <a:spcPts val="0"/>
+              </a:spcAft>
+              <a:buSzPts val="1600"/>
+              <a:buChar char="-"/>
+            </a:pPr>
+            <a:r>
+              <a:rPr lang="en-US" sz="2400" dirty="0">
+                <a:latin typeface="Tahoma" panose="020B0604030504040204" pitchFamily="34" charset="0"/>
+                <a:ea typeface="Tahoma" panose="020B0604030504040204" pitchFamily="34" charset="0"/>
+                <a:cs typeface="Tahoma" panose="020B0604030504040204" pitchFamily="34" charset="0"/>
+              </a:rPr>
+              <a:t>Where to find? 		</a:t>
+            </a:r>
+            <a:endParaRPr sz="2400" dirty="0">
+              <a:latin typeface="Tahoma" panose="020B0604030504040204" pitchFamily="34" charset="0"/>
+              <a:ea typeface="Tahoma" panose="020B0604030504040204" pitchFamily="34" charset="0"/>
+              <a:cs typeface="Tahoma" panose="020B0604030504040204" pitchFamily="34" charset="0"/>
+            </a:endParaRPr>
+          </a:p>
+          <a:p>
+            <a:pPr marL="914400" lvl="1" indent="-330200" algn="l" rtl="0">
+              <a:lnSpc>
+                <a:spcPct val="200000"/>
+              </a:lnSpc>
+              <a:spcBef>
+                <a:spcPts val="0"/>
+              </a:spcBef>
+              <a:spcAft>
+                <a:spcPts val="0"/>
+              </a:spcAft>
+              <a:buSzPts val="1600"/>
+              <a:buChar char="-"/>
+            </a:pPr>
+            <a:r>
+              <a:rPr lang="en-US" sz="2400" dirty="0">
+                <a:latin typeface="Tahoma" panose="020B0604030504040204" pitchFamily="34" charset="0"/>
+                <a:ea typeface="Tahoma" panose="020B0604030504040204" pitchFamily="34" charset="0"/>
+                <a:cs typeface="Tahoma" panose="020B0604030504040204" pitchFamily="34" charset="0"/>
+              </a:rPr>
+              <a:t>Challenges ?</a:t>
+            </a:r>
+            <a:endParaRPr sz="2400" dirty="0">
+              <a:latin typeface="Tahoma" panose="020B0604030504040204" pitchFamily="34" charset="0"/>
+              <a:ea typeface="Tahoma" panose="020B0604030504040204" pitchFamily="34" charset="0"/>
+              <a:cs typeface="Tahoma" panose="020B0604030504040204" pitchFamily="34" charset="0"/>
+            </a:endParaRPr>
+          </a:p>
+        </p:txBody>
+      </p:sp>
+    </p:spTree>
+  </p:cSld>
+  <p:clrMapOvr>
+    <a:masterClrMapping/>
+  </p:clrMapOvr>
+</p:sld>
+</file>
+
+<file path=ppt/slides/slide4.xml><?xml version="1.0" encoding="utf-8"?>
+<p:sld xmlns:a="http://schemas.openxmlformats.org/drawingml/2006/main" xmlns:r="http://schemas.openxmlformats.org/officeDocument/2006/relationships" xmlns:p="http://schemas.openxmlformats.org/presentationml/2006/main">
+  <p:cSld>
+    <p:spTree>
+      <p:nvGrpSpPr>
+        <p:cNvPr id="1" name="Shape 112"/>
+        <p:cNvGrpSpPr/>
+        <p:nvPr/>
+      </p:nvGrpSpPr>
+      <p:grpSpPr>
+        <a:xfrm>
+          <a:off x="0" y="0"/>
+          <a:ext cx="0" cy="0"/>
+          <a:chOff x="0" y="0"/>
+          <a:chExt cx="0" cy="0"/>
+        </a:xfrm>
+      </p:grpSpPr>
+      <p:sp>
+        <p:nvSpPr>
+          <p:cNvPr id="113" name="Google Shape;113;p16"/>
+          <p:cNvSpPr txBox="1">
+            <a:spLocks noGrp="1"/>
+          </p:cNvSpPr>
+          <p:nvPr>
+            <p:ph type="title"/>
+          </p:nvPr>
+        </p:nvSpPr>
+        <p:spPr>
+          <a:xfrm>
+            <a:off x="1143000" y="609600"/>
+            <a:ext cx="9875400" cy="1356300"/>
+          </a:xfrm>
+          <a:prstGeom prst="rect">
+            <a:avLst/>
+          </a:prstGeom>
+        </p:spPr>
+        <p:txBody>
+          <a:bodyPr spcFirstLastPara="1" wrap="square" lIns="91425" tIns="45700" rIns="91425" bIns="45700" anchor="ctr" anchorCtr="0">
+            <a:noAutofit/>
+          </a:bodyPr>
+          <a:lstStyle/>
+          <a:p>
+            <a:pPr marL="0" lvl="0" indent="0" algn="l" rtl="0">
+              <a:spcBef>
+                <a:spcPts val="0"/>
+              </a:spcBef>
+              <a:spcAft>
+                <a:spcPts val="0"/>
+              </a:spcAft>
+              <a:buNone/>
+            </a:pPr>
+            <a:r>
+              <a:rPr lang="en-US" b="1" dirty="0">
+                <a:latin typeface="Rockwell" panose="02060603020205020403" pitchFamily="18" charset="0"/>
+              </a:rPr>
+              <a:t>Advantages of NOSQL over RDBMS</a:t>
+            </a:r>
+            <a:endParaRPr b="1" dirty="0">
+              <a:latin typeface="Rockwell" panose="02060603020205020403" pitchFamily="18" charset="0"/>
+            </a:endParaRPr>
+          </a:p>
+        </p:txBody>
+      </p:sp>
+      <p:sp>
+        <p:nvSpPr>
+          <p:cNvPr id="114" name="Google Shape;114;p16"/>
+          <p:cNvSpPr txBox="1">
+            <a:spLocks noGrp="1"/>
+          </p:cNvSpPr>
+          <p:nvPr>
+            <p:ph type="body" idx="1"/>
+          </p:nvPr>
+        </p:nvSpPr>
+        <p:spPr>
+          <a:xfrm>
+            <a:off x="1143000" y="2057400"/>
+            <a:ext cx="9873000" cy="4038600"/>
+          </a:xfrm>
+          <a:prstGeom prst="rect">
+            <a:avLst/>
+          </a:prstGeom>
+        </p:spPr>
+        <p:txBody>
+          <a:bodyPr spcFirstLastPara="1" wrap="square" lIns="91425" tIns="45700" rIns="91425" bIns="45700" anchor="t" anchorCtr="0">
+            <a:noAutofit/>
+          </a:bodyPr>
+          <a:lstStyle/>
+          <a:p>
+            <a:pPr marL="457200" lvl="0" indent="-320040" algn="l" rtl="0">
+              <a:lnSpc>
+                <a:spcPct val="200000"/>
+              </a:lnSpc>
+              <a:spcBef>
+                <a:spcPts val="1400"/>
+              </a:spcBef>
+              <a:spcAft>
+                <a:spcPts val="0"/>
+              </a:spcAft>
+              <a:buSzPts val="1440"/>
+              <a:buAutoNum type="arabicPeriod"/>
+            </a:pPr>
+            <a:r>
+              <a:rPr lang="en-US" sz="2400" dirty="0">
+                <a:latin typeface="Tahoma" panose="020B0604030504040204" pitchFamily="34" charset="0"/>
+                <a:ea typeface="Tahoma" panose="020B0604030504040204" pitchFamily="34" charset="0"/>
+                <a:cs typeface="Tahoma" panose="020B0604030504040204" pitchFamily="34" charset="0"/>
+              </a:rPr>
+              <a:t>Handles Big Data</a:t>
+            </a:r>
+            <a:endParaRPr sz="2400" dirty="0">
+              <a:latin typeface="Tahoma" panose="020B0604030504040204" pitchFamily="34" charset="0"/>
+              <a:ea typeface="Tahoma" panose="020B0604030504040204" pitchFamily="34" charset="0"/>
+              <a:cs typeface="Tahoma" panose="020B0604030504040204" pitchFamily="34" charset="0"/>
+            </a:endParaRPr>
+          </a:p>
+          <a:p>
+            <a:pPr marL="457200" lvl="0" indent="-320040" algn="l" rtl="0">
+              <a:lnSpc>
+                <a:spcPct val="200000"/>
+              </a:lnSpc>
+              <a:spcBef>
+                <a:spcPts val="0"/>
+              </a:spcBef>
+              <a:spcAft>
+                <a:spcPts val="0"/>
+              </a:spcAft>
+              <a:buSzPts val="1440"/>
+              <a:buAutoNum type="arabicPeriod"/>
+            </a:pPr>
+            <a:r>
+              <a:rPr lang="en-US" sz="2400" dirty="0">
+                <a:latin typeface="Tahoma" panose="020B0604030504040204" pitchFamily="34" charset="0"/>
+                <a:ea typeface="Tahoma" panose="020B0604030504040204" pitchFamily="34" charset="0"/>
+                <a:cs typeface="Tahoma" panose="020B0604030504040204" pitchFamily="34" charset="0"/>
+              </a:rPr>
+              <a:t>Data Models , No predefined Schemes</a:t>
+            </a:r>
+            <a:endParaRPr sz="2400" dirty="0">
+              <a:latin typeface="Tahoma" panose="020B0604030504040204" pitchFamily="34" charset="0"/>
+              <a:ea typeface="Tahoma" panose="020B0604030504040204" pitchFamily="34" charset="0"/>
+              <a:cs typeface="Tahoma" panose="020B0604030504040204" pitchFamily="34" charset="0"/>
+            </a:endParaRPr>
+          </a:p>
+          <a:p>
+            <a:pPr marL="457200" lvl="0" indent="-320040" algn="l" rtl="0">
+              <a:lnSpc>
+                <a:spcPct val="200000"/>
+              </a:lnSpc>
+              <a:spcBef>
+                <a:spcPts val="0"/>
+              </a:spcBef>
+              <a:spcAft>
+                <a:spcPts val="0"/>
+              </a:spcAft>
+              <a:buSzPts val="1440"/>
+              <a:buAutoNum type="arabicPeriod"/>
+            </a:pPr>
+            <a:r>
+              <a:rPr lang="en-US" sz="2400" dirty="0">
+                <a:latin typeface="Tahoma" panose="020B0604030504040204" pitchFamily="34" charset="0"/>
+                <a:ea typeface="Tahoma" panose="020B0604030504040204" pitchFamily="34" charset="0"/>
+                <a:cs typeface="Tahoma" panose="020B0604030504040204" pitchFamily="34" charset="0"/>
+              </a:rPr>
+              <a:t>Data Structure </a:t>
+            </a:r>
+            <a:endParaRPr sz="2400" dirty="0">
+              <a:latin typeface="Tahoma" panose="020B0604030504040204" pitchFamily="34" charset="0"/>
+              <a:ea typeface="Tahoma" panose="020B0604030504040204" pitchFamily="34" charset="0"/>
+              <a:cs typeface="Tahoma" panose="020B0604030504040204" pitchFamily="34" charset="0"/>
+            </a:endParaRPr>
+          </a:p>
+          <a:p>
+            <a:pPr marL="457200" lvl="0" indent="-320040" algn="l" rtl="0">
+              <a:lnSpc>
+                <a:spcPct val="200000"/>
+              </a:lnSpc>
+              <a:spcBef>
+                <a:spcPts val="0"/>
+              </a:spcBef>
+              <a:spcAft>
+                <a:spcPts val="0"/>
+              </a:spcAft>
+              <a:buSzPts val="1440"/>
+              <a:buAutoNum type="arabicPeriod"/>
+            </a:pPr>
+            <a:r>
+              <a:rPr lang="en-US" sz="2400" dirty="0">
+                <a:latin typeface="Tahoma" panose="020B0604030504040204" pitchFamily="34" charset="0"/>
+                <a:ea typeface="Tahoma" panose="020B0604030504040204" pitchFamily="34" charset="0"/>
+                <a:cs typeface="Tahoma" panose="020B0604030504040204" pitchFamily="34" charset="0"/>
+              </a:rPr>
+              <a:t>Scaling  ( Scale out, Horizontal Scaling)</a:t>
+            </a:r>
+            <a:endParaRPr sz="2400" dirty="0">
+              <a:latin typeface="Tahoma" panose="020B0604030504040204" pitchFamily="34" charset="0"/>
+              <a:ea typeface="Tahoma" panose="020B0604030504040204" pitchFamily="34" charset="0"/>
+              <a:cs typeface="Tahoma" panose="020B0604030504040204" pitchFamily="34" charset="0"/>
+            </a:endParaRPr>
+          </a:p>
+        </p:txBody>
+      </p:sp>
+    </p:spTree>
+  </p:cSld>
+  <p:clrMapOvr>
+    <a:masterClrMapping/>
+  </p:clrMapOvr>
+</p:sld>
+</file>
+
+<file path=ppt/slides/slide5.xml><?xml version="1.0" encoding="utf-8"?>
+<p:sld xmlns:a="http://schemas.openxmlformats.org/drawingml/2006/main" xmlns:r="http://schemas.openxmlformats.org/officeDocument/2006/relationships" xmlns:p="http://schemas.openxmlformats.org/presentationml/2006/main">
+  <p:cSld>
+    <p:spTree>
+      <p:nvGrpSpPr>
+        <p:cNvPr id="1" name="Shape 119"/>
+        <p:cNvGrpSpPr/>
+        <p:nvPr/>
+      </p:nvGrpSpPr>
+      <p:grpSpPr>
+        <a:xfrm>
+          <a:off x="0" y="0"/>
+          <a:ext cx="0" cy="0"/>
+          <a:chOff x="0" y="0"/>
+          <a:chExt cx="0" cy="0"/>
+        </a:xfrm>
+      </p:grpSpPr>
+      <p:pic>
+        <p:nvPicPr>
+          <p:cNvPr id="120" name="Google Shape;120;p17"/>
+          <p:cNvPicPr preferRelativeResize="0"/>
+          <p:nvPr/>
+        </p:nvPicPr>
+        <p:blipFill>
+          <a:blip r:embed="rId3">
+            <a:alphaModFix/>
+          </a:blip>
+          <a:stretch>
+            <a:fillRect/>
+          </a:stretch>
+        </p:blipFill>
+        <p:spPr>
+          <a:xfrm>
+            <a:off x="1055025" y="666550"/>
+            <a:ext cx="10081950" cy="5524900"/>
+          </a:xfrm>
+          <a:prstGeom prst="rect">
+            <a:avLst/>
+          </a:prstGeom>
+          <a:noFill/>
+          <a:ln>
+            <a:noFill/>
+          </a:ln>
+        </p:spPr>
+      </p:pic>
+    </p:spTree>
+  </p:cSld>
+  <p:clrMapOvr>
+    <a:masterClrMapping/>
+  </p:clrMapOvr>
+</p:sld>
+</file>
+
+<file path=ppt/slides/slide6.xml><?xml version="1.0" encoding="utf-8"?>
+<p:sld xmlns:a="http://schemas.openxmlformats.org/drawingml/2006/main" xmlns:r="http://schemas.openxmlformats.org/officeDocument/2006/relationships" xmlns:p="http://schemas.openxmlformats.org/presentationml/2006/main">
+  <p:cSld>
+    <p:spTree>
+      <p:nvGrpSpPr>
+        <p:cNvPr id="1" name="Shape 125"/>
+        <p:cNvGrpSpPr/>
+        <p:nvPr/>
+      </p:nvGrpSpPr>
+      <p:grpSpPr>
+        <a:xfrm>
+          <a:off x="0" y="0"/>
+          <a:ext cx="0" cy="0"/>
+          <a:chOff x="0" y="0"/>
+          <a:chExt cx="0" cy="0"/>
+        </a:xfrm>
+      </p:grpSpPr>
+      <p:sp>
+        <p:nvSpPr>
+          <p:cNvPr id="126" name="Google Shape;126;p18"/>
+          <p:cNvSpPr txBox="1">
+            <a:spLocks noGrp="1"/>
+          </p:cNvSpPr>
+          <p:nvPr>
+            <p:ph type="title"/>
+          </p:nvPr>
+        </p:nvSpPr>
+        <p:spPr>
+          <a:xfrm>
+            <a:off x="1143000" y="609600"/>
+            <a:ext cx="9875400" cy="1356300"/>
+          </a:xfrm>
+          <a:prstGeom prst="rect">
+            <a:avLst/>
+          </a:prstGeom>
+        </p:spPr>
+        <p:txBody>
+          <a:bodyPr spcFirstLastPara="1" wrap="square" lIns="91425" tIns="45700" rIns="91425" bIns="45700" anchor="ctr" anchorCtr="0">
+            <a:noAutofit/>
+          </a:bodyPr>
+          <a:lstStyle/>
+          <a:p>
+            <a:pPr marL="0" lvl="0" indent="0" algn="l" rtl="0">
+              <a:spcBef>
+                <a:spcPts val="0"/>
+              </a:spcBef>
+              <a:spcAft>
+                <a:spcPts val="0"/>
+              </a:spcAft>
+              <a:buNone/>
+            </a:pPr>
+            <a:r>
+              <a:rPr lang="en-US" b="1" dirty="0">
+                <a:latin typeface="Rockwell" panose="02060603020205020403" pitchFamily="18" charset="0"/>
+              </a:rPr>
+              <a:t>Advantages of RDBMS over NOSQL</a:t>
+            </a:r>
+            <a:endParaRPr b="1" dirty="0">
+              <a:latin typeface="Rockwell" panose="02060603020205020403" pitchFamily="18" charset="0"/>
+            </a:endParaRPr>
+          </a:p>
+        </p:txBody>
+      </p:sp>
+      <p:sp>
+        <p:nvSpPr>
+          <p:cNvPr id="127" name="Google Shape;127;p18"/>
+          <p:cNvSpPr txBox="1">
+            <a:spLocks noGrp="1"/>
+          </p:cNvSpPr>
+          <p:nvPr>
+            <p:ph type="body" idx="1"/>
+          </p:nvPr>
+        </p:nvSpPr>
+        <p:spPr>
+          <a:xfrm>
+            <a:off x="1143000" y="2057400"/>
+            <a:ext cx="9873000" cy="4038600"/>
+          </a:xfrm>
+          <a:prstGeom prst="rect">
+            <a:avLst/>
+          </a:prstGeom>
+        </p:spPr>
+        <p:txBody>
+          <a:bodyPr spcFirstLastPara="1" wrap="square" lIns="91425" tIns="45700" rIns="91425" bIns="45700" anchor="t" anchorCtr="0">
+            <a:noAutofit/>
+          </a:bodyPr>
+          <a:lstStyle/>
+          <a:p>
+            <a:pPr marL="457200" lvl="0" indent="-320040" algn="l" rtl="0">
+              <a:lnSpc>
+                <a:spcPct val="150000"/>
+              </a:lnSpc>
+              <a:spcBef>
+                <a:spcPts val="1400"/>
+              </a:spcBef>
+              <a:spcAft>
+                <a:spcPts val="0"/>
+              </a:spcAft>
+              <a:buSzPts val="1440"/>
+              <a:buChar char="-"/>
+            </a:pPr>
+            <a:r>
+              <a:rPr lang="en-US" sz="2400" dirty="0">
+                <a:latin typeface="Tahoma" panose="020B0604030504040204" pitchFamily="34" charset="0"/>
+                <a:ea typeface="Tahoma" panose="020B0604030504040204" pitchFamily="34" charset="0"/>
+                <a:cs typeface="Tahoma" panose="020B0604030504040204" pitchFamily="34" charset="0"/>
+              </a:rPr>
+              <a:t>Better for relational data</a:t>
+            </a:r>
+            <a:endParaRPr sz="2400" dirty="0">
+              <a:latin typeface="Tahoma" panose="020B0604030504040204" pitchFamily="34" charset="0"/>
+              <a:ea typeface="Tahoma" panose="020B0604030504040204" pitchFamily="34" charset="0"/>
+              <a:cs typeface="Tahoma" panose="020B0604030504040204" pitchFamily="34" charset="0"/>
+            </a:endParaRPr>
+          </a:p>
+          <a:p>
+            <a:pPr marL="457200" lvl="0" indent="-320040" algn="l" rtl="0">
+              <a:lnSpc>
+                <a:spcPct val="150000"/>
+              </a:lnSpc>
+              <a:spcBef>
+                <a:spcPts val="0"/>
+              </a:spcBef>
+              <a:spcAft>
+                <a:spcPts val="0"/>
+              </a:spcAft>
+              <a:buSzPts val="1440"/>
+              <a:buChar char="-"/>
+            </a:pPr>
+            <a:r>
+              <a:rPr lang="en-US" sz="2400" dirty="0">
+                <a:latin typeface="Tahoma" panose="020B0604030504040204" pitchFamily="34" charset="0"/>
+                <a:ea typeface="Tahoma" panose="020B0604030504040204" pitchFamily="34" charset="0"/>
+                <a:cs typeface="Tahoma" panose="020B0604030504040204" pitchFamily="34" charset="0"/>
+              </a:rPr>
+              <a:t>Normalization  </a:t>
+            </a:r>
+            <a:endParaRPr sz="2400" dirty="0">
+              <a:latin typeface="Tahoma" panose="020B0604030504040204" pitchFamily="34" charset="0"/>
+              <a:ea typeface="Tahoma" panose="020B0604030504040204" pitchFamily="34" charset="0"/>
+              <a:cs typeface="Tahoma" panose="020B0604030504040204" pitchFamily="34" charset="0"/>
+            </a:endParaRPr>
+          </a:p>
+          <a:p>
+            <a:pPr marL="457200" lvl="0" indent="-320040" algn="l" rtl="0">
+              <a:lnSpc>
+                <a:spcPct val="150000"/>
+              </a:lnSpc>
+              <a:spcBef>
+                <a:spcPts val="0"/>
+              </a:spcBef>
+              <a:spcAft>
+                <a:spcPts val="0"/>
+              </a:spcAft>
+              <a:buSzPts val="1440"/>
+              <a:buChar char="-"/>
+            </a:pPr>
+            <a:r>
+              <a:rPr lang="en-US" sz="2400" dirty="0">
+                <a:latin typeface="Tahoma" panose="020B0604030504040204" pitchFamily="34" charset="0"/>
+                <a:ea typeface="Tahoma" panose="020B0604030504040204" pitchFamily="34" charset="0"/>
+                <a:cs typeface="Tahoma" panose="020B0604030504040204" pitchFamily="34" charset="0"/>
+              </a:rPr>
+              <a:t>Better performance </a:t>
+            </a:r>
+            <a:endParaRPr sz="2400" dirty="0">
+              <a:latin typeface="Tahoma" panose="020B0604030504040204" pitchFamily="34" charset="0"/>
+              <a:ea typeface="Tahoma" panose="020B0604030504040204" pitchFamily="34" charset="0"/>
+              <a:cs typeface="Tahoma" panose="020B0604030504040204" pitchFamily="34" charset="0"/>
+            </a:endParaRPr>
+          </a:p>
+          <a:p>
+            <a:pPr marL="457200" lvl="0" indent="-320040" algn="l" rtl="0">
+              <a:lnSpc>
+                <a:spcPct val="150000"/>
+              </a:lnSpc>
+              <a:spcBef>
+                <a:spcPts val="0"/>
+              </a:spcBef>
+              <a:spcAft>
+                <a:spcPts val="0"/>
+              </a:spcAft>
+              <a:buSzPts val="1440"/>
+              <a:buChar char="-"/>
+            </a:pPr>
+            <a:r>
+              <a:rPr lang="en-US" sz="2400" dirty="0">
+                <a:latin typeface="Tahoma" panose="020B0604030504040204" pitchFamily="34" charset="0"/>
+                <a:ea typeface="Tahoma" panose="020B0604030504040204" pitchFamily="34" charset="0"/>
+                <a:cs typeface="Tahoma" panose="020B0604030504040204" pitchFamily="34" charset="0"/>
+              </a:rPr>
+              <a:t>Very Solid &amp; Easy to learn</a:t>
+            </a:r>
+            <a:endParaRPr sz="2400" dirty="0">
+              <a:latin typeface="Tahoma" panose="020B0604030504040204" pitchFamily="34" charset="0"/>
+              <a:ea typeface="Tahoma" panose="020B0604030504040204" pitchFamily="34" charset="0"/>
+              <a:cs typeface="Tahoma" panose="020B0604030504040204" pitchFamily="34" charset="0"/>
+            </a:endParaRPr>
+          </a:p>
+          <a:p>
+            <a:pPr marL="457200" lvl="0" indent="-320040" algn="l" rtl="0">
+              <a:lnSpc>
+                <a:spcPct val="150000"/>
+              </a:lnSpc>
+              <a:spcBef>
+                <a:spcPts val="0"/>
+              </a:spcBef>
+              <a:spcAft>
+                <a:spcPts val="0"/>
+              </a:spcAft>
+              <a:buSzPts val="1440"/>
+              <a:buChar char="-"/>
+            </a:pPr>
+            <a:r>
+              <a:rPr lang="en-US" sz="2400" dirty="0">
+                <a:latin typeface="Tahoma" panose="020B0604030504040204" pitchFamily="34" charset="0"/>
+                <a:ea typeface="Tahoma" panose="020B0604030504040204" pitchFamily="34" charset="0"/>
+                <a:cs typeface="Tahoma" panose="020B0604030504040204" pitchFamily="34" charset="0"/>
+              </a:rPr>
+              <a:t>Data Integrity </a:t>
+            </a:r>
+            <a:endParaRPr sz="2400" dirty="0">
+              <a:latin typeface="Tahoma" panose="020B0604030504040204" pitchFamily="34" charset="0"/>
+              <a:ea typeface="Tahoma" panose="020B0604030504040204" pitchFamily="34" charset="0"/>
+              <a:cs typeface="Tahoma" panose="020B0604030504040204" pitchFamily="34" charset="0"/>
+            </a:endParaRPr>
+          </a:p>
+          <a:p>
+            <a:pPr marL="457200" lvl="0" indent="-320040" algn="l" rtl="0">
+              <a:lnSpc>
+                <a:spcPct val="150000"/>
+              </a:lnSpc>
+              <a:spcBef>
+                <a:spcPts val="0"/>
+              </a:spcBef>
+              <a:spcAft>
+                <a:spcPts val="0"/>
+              </a:spcAft>
+              <a:buSzPts val="1440"/>
+              <a:buChar char="-"/>
+            </a:pPr>
+            <a:r>
+              <a:rPr lang="en-US" sz="2400" dirty="0">
+                <a:latin typeface="Tahoma" panose="020B0604030504040204" pitchFamily="34" charset="0"/>
+                <a:ea typeface="Tahoma" panose="020B0604030504040204" pitchFamily="34" charset="0"/>
+                <a:cs typeface="Tahoma" panose="020B0604030504040204" pitchFamily="34" charset="0"/>
+              </a:rPr>
+              <a:t>ACID Compliance </a:t>
+            </a:r>
+            <a:endParaRPr sz="2400" dirty="0">
+              <a:latin typeface="Tahoma" panose="020B0604030504040204" pitchFamily="34" charset="0"/>
+              <a:ea typeface="Tahoma" panose="020B0604030504040204" pitchFamily="34" charset="0"/>
+              <a:cs typeface="Tahoma" panose="020B0604030504040204" pitchFamily="34" charset="0"/>
+            </a:endParaRPr>
+          </a:p>
+        </p:txBody>
+      </p:sp>
+    </p:spTree>
+  </p:cSld>
+  <p:clrMapOvr>
+    <a:masterClrMapping/>
+  </p:clrMapOvr>
+</p:sld>
+</file>
+
+<file path=ppt/slides/slide7.xml><?xml version="1.0" encoding="utf-8"?>
+<p:sld xmlns:a="http://schemas.openxmlformats.org/drawingml/2006/main" xmlns:r="http://schemas.openxmlformats.org/officeDocument/2006/relationships" xmlns:p="http://schemas.openxmlformats.org/presentationml/2006/main">
+  <p:cSld>
+    <p:spTree>
+      <p:nvGrpSpPr>
+        <p:cNvPr id="1" name="Shape 132"/>
+        <p:cNvGrpSpPr/>
+        <p:nvPr/>
+      </p:nvGrpSpPr>
+      <p:grpSpPr>
+        <a:xfrm>
+          <a:off x="0" y="0"/>
+          <a:ext cx="0" cy="0"/>
+          <a:chOff x="0" y="0"/>
+          <a:chExt cx="0" cy="0"/>
+        </a:xfrm>
+      </p:grpSpPr>
+      <p:sp>
+        <p:nvSpPr>
+          <p:cNvPr id="133" name="Google Shape;133;p19"/>
+          <p:cNvSpPr txBox="1">
+            <a:spLocks noGrp="1"/>
+          </p:cNvSpPr>
+          <p:nvPr>
+            <p:ph type="title"/>
+          </p:nvPr>
+        </p:nvSpPr>
+        <p:spPr>
+          <a:xfrm>
+            <a:off x="1143000" y="609600"/>
+            <a:ext cx="9875400" cy="1356300"/>
+          </a:xfrm>
+          <a:prstGeom prst="rect">
+            <a:avLst/>
+          </a:prstGeom>
+        </p:spPr>
+        <p:txBody>
+          <a:bodyPr spcFirstLastPara="1" wrap="square" lIns="91425" tIns="45700" rIns="91425" bIns="45700" anchor="ctr" anchorCtr="0">
+            <a:noAutofit/>
+          </a:bodyPr>
+          <a:lstStyle/>
+          <a:p>
+            <a:pPr marL="0" lvl="0" indent="0" algn="l" rtl="0">
+              <a:spcBef>
+                <a:spcPts val="0"/>
+              </a:spcBef>
+              <a:spcAft>
+                <a:spcPts val="0"/>
+              </a:spcAft>
+              <a:buNone/>
+            </a:pPr>
+            <a:r>
+              <a:rPr lang="en-US" b="1" dirty="0">
+                <a:latin typeface="Rockwell" panose="02060603020205020403" pitchFamily="18" charset="0"/>
+              </a:rPr>
+              <a:t>Types of NOSQL Databases</a:t>
+            </a:r>
+            <a:endParaRPr b="1" dirty="0">
+              <a:latin typeface="Rockwell" panose="02060603020205020403" pitchFamily="18" charset="0"/>
+            </a:endParaRPr>
+          </a:p>
+        </p:txBody>
+      </p:sp>
+      <p:sp>
+        <p:nvSpPr>
+          <p:cNvPr id="134" name="Google Shape;134;p19"/>
+          <p:cNvSpPr txBox="1">
+            <a:spLocks noGrp="1"/>
+          </p:cNvSpPr>
+          <p:nvPr>
+            <p:ph type="body" idx="1"/>
+          </p:nvPr>
+        </p:nvSpPr>
+        <p:spPr>
+          <a:xfrm>
+            <a:off x="1143000" y="1617785"/>
+            <a:ext cx="9873000" cy="5020615"/>
+          </a:xfrm>
+          <a:prstGeom prst="rect">
+            <a:avLst/>
+          </a:prstGeom>
+        </p:spPr>
+        <p:txBody>
+          <a:bodyPr spcFirstLastPara="1" wrap="square" lIns="91425" tIns="45700" rIns="91425" bIns="45700" anchor="t" anchorCtr="0">
+            <a:noAutofit/>
+          </a:bodyPr>
+          <a:lstStyle/>
+          <a:p>
+            <a:pPr marL="457200" lvl="0" indent="-320040" algn="l" rtl="0">
+              <a:lnSpc>
+                <a:spcPct val="150000"/>
+              </a:lnSpc>
+              <a:spcBef>
+                <a:spcPts val="1400"/>
+              </a:spcBef>
+              <a:spcAft>
+                <a:spcPts val="0"/>
+              </a:spcAft>
+              <a:buSzPts val="1440"/>
+              <a:buChar char="-"/>
+            </a:pPr>
+            <a:r>
+              <a:rPr lang="en-US" sz="2400" dirty="0">
+                <a:latin typeface="Tahoma" panose="020B0604030504040204" pitchFamily="34" charset="0"/>
+                <a:ea typeface="Tahoma" panose="020B0604030504040204" pitchFamily="34" charset="0"/>
+                <a:cs typeface="Tahoma" panose="020B0604030504040204" pitchFamily="34" charset="0"/>
+              </a:rPr>
+              <a:t>Document-based Store Database </a:t>
+            </a:r>
+            <a:endParaRPr sz="2400" dirty="0">
+              <a:latin typeface="Tahoma" panose="020B0604030504040204" pitchFamily="34" charset="0"/>
+              <a:ea typeface="Tahoma" panose="020B0604030504040204" pitchFamily="34" charset="0"/>
+              <a:cs typeface="Tahoma" panose="020B0604030504040204" pitchFamily="34" charset="0"/>
+            </a:endParaRPr>
+          </a:p>
+          <a:p>
+            <a:pPr marL="914400" lvl="1" indent="-320040" algn="l" rtl="0">
+              <a:lnSpc>
+                <a:spcPct val="150000"/>
+              </a:lnSpc>
+              <a:spcBef>
+                <a:spcPts val="0"/>
+              </a:spcBef>
+              <a:spcAft>
+                <a:spcPts val="0"/>
+              </a:spcAft>
+              <a:buSzPts val="1440"/>
+              <a:buChar char="-"/>
+            </a:pPr>
+            <a:r>
+              <a:rPr lang="en-US" sz="2400" dirty="0">
+                <a:latin typeface="Tahoma" panose="020B0604030504040204" pitchFamily="34" charset="0"/>
+                <a:ea typeface="Tahoma" panose="020B0604030504040204" pitchFamily="34" charset="0"/>
+                <a:cs typeface="Tahoma" panose="020B0604030504040204" pitchFamily="34" charset="0"/>
+              </a:rPr>
+              <a:t>MongoDB , CouchDB </a:t>
+            </a:r>
+            <a:endParaRPr sz="2400" dirty="0">
+              <a:latin typeface="Tahoma" panose="020B0604030504040204" pitchFamily="34" charset="0"/>
+              <a:ea typeface="Tahoma" panose="020B0604030504040204" pitchFamily="34" charset="0"/>
+              <a:cs typeface="Tahoma" panose="020B0604030504040204" pitchFamily="34" charset="0"/>
+            </a:endParaRPr>
+          </a:p>
+          <a:p>
+            <a:pPr marL="457200" lvl="0" indent="-320040" algn="l" rtl="0">
+              <a:lnSpc>
+                <a:spcPct val="150000"/>
+              </a:lnSpc>
+              <a:spcBef>
+                <a:spcPts val="0"/>
+              </a:spcBef>
+              <a:spcAft>
+                <a:spcPts val="0"/>
+              </a:spcAft>
+              <a:buSzPts val="1440"/>
+              <a:buChar char="-"/>
+            </a:pPr>
+            <a:r>
+              <a:rPr lang="en-US" sz="2400" dirty="0">
+                <a:latin typeface="Tahoma" panose="020B0604030504040204" pitchFamily="34" charset="0"/>
+                <a:ea typeface="Tahoma" panose="020B0604030504040204" pitchFamily="34" charset="0"/>
+                <a:cs typeface="Tahoma" panose="020B0604030504040204" pitchFamily="34" charset="0"/>
+              </a:rPr>
+              <a:t> Column- based Database</a:t>
+            </a:r>
+            <a:endParaRPr sz="2400" dirty="0">
+              <a:latin typeface="Tahoma" panose="020B0604030504040204" pitchFamily="34" charset="0"/>
+              <a:ea typeface="Tahoma" panose="020B0604030504040204" pitchFamily="34" charset="0"/>
+              <a:cs typeface="Tahoma" panose="020B0604030504040204" pitchFamily="34" charset="0"/>
+            </a:endParaRPr>
+          </a:p>
+          <a:p>
+            <a:pPr marL="914400" lvl="1" indent="-320040" algn="l" rtl="0">
+              <a:lnSpc>
+                <a:spcPct val="150000"/>
+              </a:lnSpc>
+              <a:spcBef>
+                <a:spcPts val="0"/>
+              </a:spcBef>
+              <a:spcAft>
+                <a:spcPts val="0"/>
+              </a:spcAft>
+              <a:buSzPts val="1440"/>
+              <a:buChar char="-"/>
+            </a:pPr>
+            <a:r>
+              <a:rPr lang="en-US" sz="2400" dirty="0">
+                <a:latin typeface="Tahoma" panose="020B0604030504040204" pitchFamily="34" charset="0"/>
+                <a:ea typeface="Tahoma" panose="020B0604030504040204" pitchFamily="34" charset="0"/>
+                <a:cs typeface="Tahoma" panose="020B0604030504040204" pitchFamily="34" charset="0"/>
+              </a:rPr>
+              <a:t>Apache </a:t>
+            </a:r>
+            <a:r>
+              <a:rPr lang="en-US" sz="2400" dirty="0" err="1">
+                <a:latin typeface="Tahoma" panose="020B0604030504040204" pitchFamily="34" charset="0"/>
+                <a:ea typeface="Tahoma" panose="020B0604030504040204" pitchFamily="34" charset="0"/>
+                <a:cs typeface="Tahoma" panose="020B0604030504040204" pitchFamily="34" charset="0"/>
+              </a:rPr>
+              <a:t>cassandra</a:t>
+            </a:r>
+            <a:r>
+              <a:rPr lang="en-US" sz="2400" dirty="0">
+                <a:latin typeface="Tahoma" panose="020B0604030504040204" pitchFamily="34" charset="0"/>
+                <a:ea typeface="Tahoma" panose="020B0604030504040204" pitchFamily="34" charset="0"/>
+                <a:cs typeface="Tahoma" panose="020B0604030504040204" pitchFamily="34" charset="0"/>
+              </a:rPr>
+              <a:t> </a:t>
+            </a:r>
+            <a:endParaRPr sz="2400" dirty="0">
+              <a:latin typeface="Tahoma" panose="020B0604030504040204" pitchFamily="34" charset="0"/>
+              <a:ea typeface="Tahoma" panose="020B0604030504040204" pitchFamily="34" charset="0"/>
+              <a:cs typeface="Tahoma" panose="020B0604030504040204" pitchFamily="34" charset="0"/>
+            </a:endParaRPr>
+          </a:p>
+          <a:p>
+            <a:pPr marL="457200" lvl="0" indent="-320040" algn="l" rtl="0">
+              <a:lnSpc>
+                <a:spcPct val="150000"/>
+              </a:lnSpc>
+              <a:spcBef>
+                <a:spcPts val="0"/>
+              </a:spcBef>
+              <a:spcAft>
+                <a:spcPts val="0"/>
+              </a:spcAft>
+              <a:buSzPts val="1440"/>
+              <a:buChar char="-"/>
+            </a:pPr>
+            <a:r>
+              <a:rPr lang="en-US" sz="2400" dirty="0">
+                <a:latin typeface="Tahoma" panose="020B0604030504040204" pitchFamily="34" charset="0"/>
+                <a:ea typeface="Tahoma" panose="020B0604030504040204" pitchFamily="34" charset="0"/>
+                <a:cs typeface="Tahoma" panose="020B0604030504040204" pitchFamily="34" charset="0"/>
+              </a:rPr>
+              <a:t>Key value-Store Database</a:t>
+            </a:r>
+            <a:endParaRPr sz="2400" dirty="0">
+              <a:latin typeface="Tahoma" panose="020B0604030504040204" pitchFamily="34" charset="0"/>
+              <a:ea typeface="Tahoma" panose="020B0604030504040204" pitchFamily="34" charset="0"/>
+              <a:cs typeface="Tahoma" panose="020B0604030504040204" pitchFamily="34" charset="0"/>
+            </a:endParaRPr>
+          </a:p>
+          <a:p>
+            <a:pPr marL="914400" lvl="1" indent="-320040" algn="l" rtl="0">
+              <a:lnSpc>
+                <a:spcPct val="150000"/>
+              </a:lnSpc>
+              <a:spcBef>
+                <a:spcPts val="0"/>
+              </a:spcBef>
+              <a:spcAft>
+                <a:spcPts val="0"/>
+              </a:spcAft>
+              <a:buSzPts val="1440"/>
+              <a:buChar char="-"/>
+            </a:pPr>
+            <a:r>
+              <a:rPr lang="en-US" sz="2400" dirty="0" err="1">
+                <a:latin typeface="Tahoma" panose="020B0604030504040204" pitchFamily="34" charset="0"/>
+                <a:ea typeface="Tahoma" panose="020B0604030504040204" pitchFamily="34" charset="0"/>
+                <a:cs typeface="Tahoma" panose="020B0604030504040204" pitchFamily="34" charset="0"/>
+              </a:rPr>
+              <a:t>Riak</a:t>
+            </a:r>
+            <a:r>
+              <a:rPr lang="en-US" sz="2400" dirty="0">
+                <a:latin typeface="Tahoma" panose="020B0604030504040204" pitchFamily="34" charset="0"/>
+                <a:ea typeface="Tahoma" panose="020B0604030504040204" pitchFamily="34" charset="0"/>
+                <a:cs typeface="Tahoma" panose="020B0604030504040204" pitchFamily="34" charset="0"/>
+              </a:rPr>
+              <a:t> </a:t>
+            </a:r>
+            <a:endParaRPr sz="2400" dirty="0">
+              <a:latin typeface="Tahoma" panose="020B0604030504040204" pitchFamily="34" charset="0"/>
+              <a:ea typeface="Tahoma" panose="020B0604030504040204" pitchFamily="34" charset="0"/>
+              <a:cs typeface="Tahoma" panose="020B0604030504040204" pitchFamily="34" charset="0"/>
+            </a:endParaRPr>
+          </a:p>
+          <a:p>
+            <a:pPr marL="457200" lvl="0" indent="-320040" algn="l" rtl="0">
+              <a:lnSpc>
+                <a:spcPct val="150000"/>
+              </a:lnSpc>
+              <a:spcBef>
+                <a:spcPts val="0"/>
+              </a:spcBef>
+              <a:spcAft>
+                <a:spcPts val="0"/>
+              </a:spcAft>
+              <a:buSzPts val="1440"/>
+              <a:buChar char="-"/>
+            </a:pPr>
+            <a:r>
+              <a:rPr lang="en-US" sz="2400" dirty="0">
+                <a:latin typeface="Tahoma" panose="020B0604030504040204" pitchFamily="34" charset="0"/>
+                <a:ea typeface="Tahoma" panose="020B0604030504040204" pitchFamily="34" charset="0"/>
+                <a:cs typeface="Tahoma" panose="020B0604030504040204" pitchFamily="34" charset="0"/>
+              </a:rPr>
+              <a:t>Graph-based</a:t>
+            </a:r>
+            <a:endParaRPr sz="2400" dirty="0">
+              <a:latin typeface="Tahoma" panose="020B0604030504040204" pitchFamily="34" charset="0"/>
+              <a:ea typeface="Tahoma" panose="020B0604030504040204" pitchFamily="34" charset="0"/>
+              <a:cs typeface="Tahoma" panose="020B0604030504040204" pitchFamily="34" charset="0"/>
+            </a:endParaRPr>
+          </a:p>
+          <a:p>
+            <a:pPr marL="914400" lvl="1" indent="-320040" algn="l" rtl="0">
+              <a:lnSpc>
+                <a:spcPct val="150000"/>
+              </a:lnSpc>
+              <a:spcBef>
+                <a:spcPts val="0"/>
+              </a:spcBef>
+              <a:spcAft>
+                <a:spcPts val="0"/>
+              </a:spcAft>
+              <a:buSzPts val="1440"/>
+              <a:buChar char="-"/>
+            </a:pPr>
+            <a:r>
+              <a:rPr lang="en-US" sz="2400" dirty="0">
+                <a:latin typeface="Tahoma" panose="020B0604030504040204" pitchFamily="34" charset="0"/>
+                <a:ea typeface="Tahoma" panose="020B0604030504040204" pitchFamily="34" charset="0"/>
+                <a:cs typeface="Tahoma" panose="020B0604030504040204" pitchFamily="34" charset="0"/>
+              </a:rPr>
+              <a:t>Neo4J</a:t>
+            </a:r>
+            <a:endParaRPr sz="2400" dirty="0">
+              <a:latin typeface="Tahoma" panose="020B0604030504040204" pitchFamily="34" charset="0"/>
+              <a:ea typeface="Tahoma" panose="020B0604030504040204" pitchFamily="34" charset="0"/>
+              <a:cs typeface="Tahoma" panose="020B0604030504040204" pitchFamily="34" charset="0"/>
+            </a:endParaRPr>
+          </a:p>
+        </p:txBody>
+      </p:sp>
+    </p:spTree>
   </p:cSld>
   <p:clrMapOvr>
     <a:masterClrMapping/>
@@ -5054,10 +7375,10 @@
       </p:grpSpPr>
       <p:sp>
         <p:nvSpPr>
-          <p:cNvPr id="6" name="Text Placeholder 5">
+          <p:cNvPr id="2" name="Title 1">
             <a:extLst>
               <a:ext uri="{FF2B5EF4-FFF2-40B4-BE49-F238E27FC236}">
-                <a16:creationId xmlns:a16="http://schemas.microsoft.com/office/drawing/2014/main" id="{8F8B411F-C9E3-4641-B591-CB924CBDDB50}"/>
+                <a16:creationId xmlns:a16="http://schemas.microsoft.com/office/drawing/2014/main" id="{F2153DD3-C27C-457D-ADDD-066D01CB95CA}"/>
               </a:ext>
             </a:extLst>
           </p:cNvPr>
@@ -5065,29 +7386,215 @@
             <a:spLocks noGrp="1"/>
           </p:cNvSpPr>
           <p:nvPr>
-            <p:ph type="body" idx="1"/>
+            <p:ph type="title"/>
           </p:nvPr>
         </p:nvSpPr>
         <p:spPr>
           <a:xfrm>
-            <a:off x="1143000" y="580958"/>
-            <a:ext cx="4754880" cy="777240"/>
+            <a:off x="940904" y="641673"/>
+            <a:ext cx="4134016" cy="691763"/>
           </a:xfrm>
         </p:spPr>
         <p:txBody>
           <a:bodyPr/>
           <a:lstStyle/>
           <a:p>
-            <a:endParaRPr lang="en-US" dirty="0"/>
+            <a:r>
+              <a:rPr lang="en-US" sz="4400" dirty="0">
+                <a:latin typeface="Rockwell" panose="02060603020205020403" pitchFamily="18" charset="0"/>
+              </a:rPr>
+              <a:t>Fetching Data</a:t>
+            </a:r>
           </a:p>
         </p:txBody>
       </p:sp>
       <p:pic>
         <p:nvPicPr>
-          <p:cNvPr id="3" name="Content Placeholder 2">
+          <p:cNvPr id="7" name="Picture Placeholder 6">
             <a:extLst>
               <a:ext uri="{FF2B5EF4-FFF2-40B4-BE49-F238E27FC236}">
-                <a16:creationId xmlns:a16="http://schemas.microsoft.com/office/drawing/2014/main" id="{9615D78D-D787-40A8-8E04-1FC6C17C32B7}"/>
+                <a16:creationId xmlns:a16="http://schemas.microsoft.com/office/drawing/2014/main" id="{1B5957C2-9FF0-481F-AC68-0A3E3C7ECB6F}"/>
+              </a:ext>
+            </a:extLst>
+          </p:cNvPr>
+          <p:cNvPicPr>
+            <a:picLocks noGrp="1" noChangeAspect="1"/>
+          </p:cNvPicPr>
+          <p:nvPr>
+            <p:ph type="pic" idx="1"/>
+          </p:nvPr>
+        </p:nvPicPr>
+        <p:blipFill>
+          <a:blip r:embed="rId2"/>
+          <a:srcRect t="1194" b="1194"/>
+          <a:stretch>
+            <a:fillRect/>
+          </a:stretch>
+        </p:blipFill>
+        <p:spPr>
+          <a:xfrm>
+            <a:off x="5413375" y="1246188"/>
+            <a:ext cx="6099175" cy="4624387"/>
+          </a:xfrm>
+        </p:spPr>
+      </p:pic>
+      <p:sp>
+        <p:nvSpPr>
+          <p:cNvPr id="4" name="Text Placeholder 3">
+            <a:extLst>
+              <a:ext uri="{FF2B5EF4-FFF2-40B4-BE49-F238E27FC236}">
+                <a16:creationId xmlns:a16="http://schemas.microsoft.com/office/drawing/2014/main" id="{03C506D5-2B7F-42A6-8C0C-B3954218B7CE}"/>
+              </a:ext>
+            </a:extLst>
+          </p:cNvPr>
+          <p:cNvSpPr>
+            <a:spLocks noGrp="1"/>
+          </p:cNvSpPr>
+          <p:nvPr>
+            <p:ph type="body" sz="half" idx="2"/>
+          </p:nvPr>
+        </p:nvSpPr>
+        <p:spPr>
+          <a:xfrm>
+            <a:off x="940904" y="1484242"/>
+            <a:ext cx="4134016" cy="4386203"/>
+          </a:xfrm>
+        </p:spPr>
+        <p:txBody>
+          <a:bodyPr anchor="ctr">
+            <a:normAutofit/>
+          </a:bodyPr>
+          <a:lstStyle/>
+          <a:p>
+            <a:pPr marL="285750" indent="-285750">
+              <a:buFont typeface="Arial" panose="020B0604020202020204" pitchFamily="34" charset="0"/>
+              <a:buChar char="•"/>
+            </a:pPr>
+            <a:r>
+              <a:rPr lang="en-US" sz="2400" dirty="0">
+                <a:latin typeface="Tahoma" panose="020B0604030504040204" pitchFamily="34" charset="0"/>
+                <a:ea typeface="Tahoma" panose="020B0604030504040204" pitchFamily="34" charset="0"/>
+                <a:cs typeface="Tahoma" panose="020B0604030504040204" pitchFamily="34" charset="0"/>
+              </a:rPr>
+              <a:t>Movies were fetched using </a:t>
+            </a:r>
+            <a:r>
+              <a:rPr lang="en-US" sz="3200" b="1" dirty="0">
+                <a:latin typeface="Tahoma" panose="020B0604030504040204" pitchFamily="34" charset="0"/>
+                <a:ea typeface="Tahoma" panose="020B0604030504040204" pitchFamily="34" charset="0"/>
+                <a:cs typeface="Tahoma" panose="020B0604030504040204" pitchFamily="34" charset="0"/>
+              </a:rPr>
+              <a:t>The Movie DB API (TMDB)</a:t>
+            </a:r>
+          </a:p>
+          <a:p>
+            <a:pPr marL="285750" indent="-285750">
+              <a:buFont typeface="Arial" panose="020B0604020202020204" pitchFamily="34" charset="0"/>
+              <a:buChar char="•"/>
+            </a:pPr>
+            <a:r>
+              <a:rPr lang="en-US" sz="2400" dirty="0">
+                <a:latin typeface="Tahoma" panose="020B0604030504040204" pitchFamily="34" charset="0"/>
+                <a:ea typeface="Tahoma" panose="020B0604030504040204" pitchFamily="34" charset="0"/>
+                <a:cs typeface="Tahoma" panose="020B0604030504040204" pitchFamily="34" charset="0"/>
+              </a:rPr>
+              <a:t>Shows were fetched using </a:t>
+            </a:r>
+            <a:r>
+              <a:rPr lang="en-US" sz="3200" b="1" dirty="0" err="1">
+                <a:latin typeface="Tahoma" panose="020B0604030504040204" pitchFamily="34" charset="0"/>
+                <a:ea typeface="Tahoma" panose="020B0604030504040204" pitchFamily="34" charset="0"/>
+                <a:cs typeface="Tahoma" panose="020B0604030504040204" pitchFamily="34" charset="0"/>
+              </a:rPr>
+              <a:t>TVMaze</a:t>
+            </a:r>
+            <a:r>
+              <a:rPr lang="en-US" sz="3200" b="1" dirty="0">
+                <a:latin typeface="Tahoma" panose="020B0604030504040204" pitchFamily="34" charset="0"/>
+                <a:ea typeface="Tahoma" panose="020B0604030504040204" pitchFamily="34" charset="0"/>
+                <a:cs typeface="Tahoma" panose="020B0604030504040204" pitchFamily="34" charset="0"/>
+              </a:rPr>
+              <a:t> API</a:t>
+            </a:r>
+          </a:p>
+        </p:txBody>
+      </p:sp>
+    </p:spTree>
+    <p:extLst>
+      <p:ext uri="{BB962C8B-B14F-4D97-AF65-F5344CB8AC3E}">
+        <p14:creationId xmlns:p14="http://schemas.microsoft.com/office/powerpoint/2010/main" val="2820311883"/>
+      </p:ext>
+    </p:extLst>
+  </p:cSld>
+  <p:clrMapOvr>
+    <a:masterClrMapping/>
+  </p:clrMapOvr>
+</p:sld>
+</file>
+
+<file path=ppt/slides/slide9.xml><?xml version="1.0" encoding="utf-8"?>
+<p:sld xmlns:a="http://schemas.openxmlformats.org/drawingml/2006/main" xmlns:r="http://schemas.openxmlformats.org/officeDocument/2006/relationships" xmlns:p="http://schemas.openxmlformats.org/presentationml/2006/main">
+  <p:cSld>
+    <p:spTree>
+      <p:nvGrpSpPr>
+        <p:cNvPr id="1" name=""/>
+        <p:cNvGrpSpPr/>
+        <p:nvPr/>
+      </p:nvGrpSpPr>
+      <p:grpSpPr>
+        <a:xfrm>
+          <a:off x="0" y="0"/>
+          <a:ext cx="0" cy="0"/>
+          <a:chOff x="0" y="0"/>
+          <a:chExt cx="0" cy="0"/>
+        </a:xfrm>
+      </p:grpSpPr>
+      <p:sp>
+        <p:nvSpPr>
+          <p:cNvPr id="9" name="Text Placeholder 8">
+            <a:extLst>
+              <a:ext uri="{FF2B5EF4-FFF2-40B4-BE49-F238E27FC236}">
+                <a16:creationId xmlns:a16="http://schemas.microsoft.com/office/drawing/2014/main" id="{A834D9EE-8EAF-46B6-A4D6-97262A2B9D43}"/>
+              </a:ext>
+            </a:extLst>
+          </p:cNvPr>
+          <p:cNvSpPr>
+            <a:spLocks noGrp="1"/>
+          </p:cNvSpPr>
+          <p:nvPr>
+            <p:ph type="body" idx="1"/>
+          </p:nvPr>
+        </p:nvSpPr>
+        <p:spPr>
+          <a:xfrm>
+            <a:off x="1143000" y="753237"/>
+            <a:ext cx="4754880" cy="817429"/>
+          </a:xfrm>
+        </p:spPr>
+        <p:txBody>
+          <a:bodyPr>
+            <a:normAutofit/>
+          </a:bodyPr>
+          <a:lstStyle/>
+          <a:p>
+            <a:pPr algn="ctr"/>
+            <a:r>
+              <a:rPr lang="en-US" sz="2800" dirty="0">
+                <a:latin typeface="Tahoma" panose="020B0604030504040204" pitchFamily="34" charset="0"/>
+                <a:ea typeface="Tahoma" panose="020B0604030504040204" pitchFamily="34" charset="0"/>
+                <a:cs typeface="Tahoma" panose="020B0604030504040204" pitchFamily="34" charset="0"/>
+              </a:rPr>
+              <a:t>API Response Data</a:t>
+            </a:r>
+          </a:p>
+        </p:txBody>
+      </p:sp>
+      <p:pic>
+        <p:nvPicPr>
+          <p:cNvPr id="16" name="Content Placeholder 15">
+            <a:extLst>
+              <a:ext uri="{FF2B5EF4-FFF2-40B4-BE49-F238E27FC236}">
+                <a16:creationId xmlns:a16="http://schemas.microsoft.com/office/drawing/2014/main" id="{D798FC3A-8195-42A1-B605-4931F5203BA2}"/>
               </a:ext>
             </a:extLst>
           </p:cNvPr>
@@ -5106,17 +7613,17 @@
         </p:blipFill>
         <p:spPr>
           <a:xfrm>
-            <a:off x="1143000" y="1358198"/>
-            <a:ext cx="4754880" cy="4747327"/>
+            <a:off x="1143000" y="1581829"/>
+            <a:ext cx="4754563" cy="4511905"/>
           </a:xfrm>
         </p:spPr>
       </p:pic>
       <p:sp>
         <p:nvSpPr>
-          <p:cNvPr id="8" name="Text Placeholder 7">
+          <p:cNvPr id="11" name="Text Placeholder 10">
             <a:extLst>
               <a:ext uri="{FF2B5EF4-FFF2-40B4-BE49-F238E27FC236}">
-                <a16:creationId xmlns:a16="http://schemas.microsoft.com/office/drawing/2014/main" id="{666DA11C-2B17-40CE-A991-030E8568F1FD}"/>
+                <a16:creationId xmlns:a16="http://schemas.microsoft.com/office/drawing/2014/main" id="{A0346A2B-C9F7-46F2-B1C2-6E0F670B722F}"/>
               </a:ext>
             </a:extLst>
           </p:cNvPr>
@@ -5129,52 +7636,61 @@
         </p:nvSpPr>
         <p:spPr>
           <a:xfrm>
-            <a:off x="6096000" y="580958"/>
+            <a:off x="6096000" y="753237"/>
             <a:ext cx="4754880" cy="777240"/>
           </a:xfrm>
         </p:spPr>
         <p:txBody>
-          <a:bodyPr/>
+          <a:bodyPr>
+            <a:normAutofit/>
+          </a:bodyPr>
           <a:lstStyle/>
           <a:p>
-            <a:endParaRPr lang="en-US" dirty="0"/>
-          </a:p>
-        </p:txBody>
-      </p:sp>
-      <p:sp>
-        <p:nvSpPr>
-          <p:cNvPr id="9" name="Content Placeholder 8">
+            <a:pPr algn="ctr"/>
+            <a:r>
+              <a:rPr lang="en-US" sz="2800" dirty="0">
+                <a:latin typeface="Tahoma" panose="020B0604030504040204" pitchFamily="34" charset="0"/>
+                <a:ea typeface="Tahoma" panose="020B0604030504040204" pitchFamily="34" charset="0"/>
+                <a:cs typeface="Tahoma" panose="020B0604030504040204" pitchFamily="34" charset="0"/>
+              </a:rPr>
+              <a:t>Formatted Data</a:t>
+            </a:r>
+          </a:p>
+        </p:txBody>
+      </p:sp>
+      <p:pic>
+        <p:nvPicPr>
+          <p:cNvPr id="18" name="Content Placeholder 17">
             <a:extLst>
               <a:ext uri="{FF2B5EF4-FFF2-40B4-BE49-F238E27FC236}">
-                <a16:creationId xmlns:a16="http://schemas.microsoft.com/office/drawing/2014/main" id="{94E12BF2-35A6-4D45-B9CD-85102158F038}"/>
+                <a16:creationId xmlns:a16="http://schemas.microsoft.com/office/drawing/2014/main" id="{C2B2DB03-8A43-4451-B1B0-9D2AAEAA5305}"/>
               </a:ext>
             </a:extLst>
           </p:cNvPr>
-          <p:cNvSpPr>
-            <a:spLocks noGrp="1"/>
-          </p:cNvSpPr>
+          <p:cNvPicPr>
+            <a:picLocks noGrp="1" noChangeAspect="1"/>
+          </p:cNvPicPr>
           <p:nvPr>
             <p:ph sz="quarter" idx="4"/>
           </p:nvPr>
-        </p:nvSpPr>
+        </p:nvPicPr>
+        <p:blipFill>
+          <a:blip r:embed="rId3"/>
+          <a:stretch>
+            <a:fillRect/>
+          </a:stretch>
+        </p:blipFill>
         <p:spPr>
           <a:xfrm>
-            <a:off x="6096000" y="1357435"/>
-            <a:ext cx="4754880" cy="4747327"/>
+            <a:off x="6269038" y="1581829"/>
+            <a:ext cx="4754562" cy="4511905"/>
           </a:xfrm>
         </p:spPr>
-        <p:txBody>
-          <a:bodyPr/>
-          <a:lstStyle/>
-          <a:p>
-            <a:endParaRPr lang="en-US" dirty="0"/>
-          </a:p>
-        </p:txBody>
-      </p:sp>
+      </p:pic>
     </p:spTree>
     <p:extLst>
       <p:ext uri="{BB962C8B-B14F-4D97-AF65-F5344CB8AC3E}">
-        <p14:creationId xmlns:p14="http://schemas.microsoft.com/office/powerpoint/2010/main" val="2479869723"/>
+        <p14:creationId xmlns:p14="http://schemas.microsoft.com/office/powerpoint/2010/main" val="723261768"/>
       </p:ext>
     </p:extLst>
   </p:cSld>
@@ -6012,6 +8528,23 @@
 </file>
 
 <file path=customXml/item1.xml><?xml version="1.0" encoding="utf-8"?>
+<p:properties xmlns:p="http://schemas.microsoft.com/office/2006/metadata/properties" xmlns:xsi="http://www.w3.org/2001/XMLSchema-instance" xmlns:pc="http://schemas.microsoft.com/office/infopath/2007/PartnerControls">
+  <documentManagement>
+    <MediaServiceKeyPoints xmlns="71af3243-3dd4-4a8d-8c0d-dd76da1f02a5" xsi:nil="true"/>
+  </documentManagement>
+</p:properties>
+</file>
+
+<file path=customXml/item2.xml><?xml version="1.0" encoding="utf-8"?>
+<?mso-contentType ?>
+<FormTemplates xmlns="http://schemas.microsoft.com/sharepoint/v3/contenttype/forms">
+  <Display>DocumentLibraryForm</Display>
+  <Edit>DocumentLibraryForm</Edit>
+  <New>DocumentLibraryForm</New>
+</FormTemplates>
+</file>
+
+<file path=customXml/item3.xml><?xml version="1.0" encoding="utf-8"?>
 <ct:contentTypeSchema xmlns:ct="http://schemas.microsoft.com/office/2006/metadata/contentType" xmlns:ma="http://schemas.microsoft.com/office/2006/metadata/properties/metaAttributes" ct:_="" ma:_="" ma:contentTypeName="Document" ma:contentTypeID="0x01010079F111ED35F8CC479449609E8A0923A6" ma:contentTypeVersion="11" ma:contentTypeDescription="Create a new document." ma:contentTypeScope="" ma:versionID="96291512c1ee715ab617f4c07df79fc1">
   <xsd:schema xmlns:xsd="http://www.w3.org/2001/XMLSchema" xmlns:xs="http://www.w3.org/2001/XMLSchema" xmlns:p="http://schemas.microsoft.com/office/2006/metadata/properties" xmlns:ns2="71af3243-3dd4-4a8d-8c0d-dd76da1f02a5" xmlns:ns3="16c05727-aa75-4e4a-9b5f-8a80a1165891" targetNamespace="http://schemas.microsoft.com/office/2006/metadata/properties" ma:root="true" ma:fieldsID="8256c27c40ca5c40ce1cf6c44f0205df" ns2:_="" ns3:_="">
     <xsd:import namespace="71af3243-3dd4-4a8d-8c0d-dd76da1f02a5"/>
@@ -6222,24 +8755,25 @@
 </ct:contentTypeSchema>
 </file>
 
-<file path=customXml/item2.xml><?xml version="1.0" encoding="utf-8"?>
-<?mso-contentType ?>
-<FormTemplates xmlns="http://schemas.microsoft.com/sharepoint/v3/contenttype/forms">
-  <Display>DocumentLibraryForm</Display>
-  <Edit>DocumentLibraryForm</Edit>
-  <New>DocumentLibraryForm</New>
-</FormTemplates>
+<file path=customXml/itemProps1.xml><?xml version="1.0" encoding="utf-8"?>
+<ds:datastoreItem xmlns:ds="http://schemas.openxmlformats.org/officeDocument/2006/customXml" ds:itemID="{3D6CA70E-ED75-4FF0-A862-8EF12B737755}">
+  <ds:schemaRefs>
+    <ds:schemaRef ds:uri="http://schemas.microsoft.com/office/2006/metadata/properties"/>
+    <ds:schemaRef ds:uri="http://schemas.microsoft.com/office/infopath/2007/PartnerControls"/>
+    <ds:schemaRef ds:uri="71af3243-3dd4-4a8d-8c0d-dd76da1f02a5"/>
+  </ds:schemaRefs>
+</ds:datastoreItem>
 </file>
 
-<file path=customXml/item3.xml><?xml version="1.0" encoding="utf-8"?>
-<p:properties xmlns:p="http://schemas.microsoft.com/office/2006/metadata/properties" xmlns:xsi="http://www.w3.org/2001/XMLSchema-instance" xmlns:pc="http://schemas.microsoft.com/office/infopath/2007/PartnerControls">
-  <documentManagement>
-    <MediaServiceKeyPoints xmlns="71af3243-3dd4-4a8d-8c0d-dd76da1f02a5" xsi:nil="true"/>
-  </documentManagement>
-</p:properties>
+<file path=customXml/itemProps2.xml><?xml version="1.0" encoding="utf-8"?>
+<ds:datastoreItem xmlns:ds="http://schemas.openxmlformats.org/officeDocument/2006/customXml" ds:itemID="{ABF1ABED-93B7-45AC-A513-2CB1FF159AFF}">
+  <ds:schemaRefs>
+    <ds:schemaRef ds:uri="http://schemas.microsoft.com/sharepoint/v3/contenttype/forms"/>
+  </ds:schemaRefs>
+</ds:datastoreItem>
 </file>
 
-<file path=customXml/itemProps1.xml><?xml version="1.0" encoding="utf-8"?>
+<file path=customXml/itemProps3.xml><?xml version="1.0" encoding="utf-8"?>
 <ds:datastoreItem xmlns:ds="http://schemas.openxmlformats.org/officeDocument/2006/customXml" ds:itemID="{79B27744-7857-4992-B755-05855FC59147}">
   <ds:schemaRefs>
     <ds:schemaRef ds:uri="http://schemas.microsoft.com/office/2006/metadata/contentType"/>
@@ -6256,22 +8790,4 @@
     <ds:schemaRef ds:uri="http://schemas.microsoft.com/internal/obd"/>
   </ds:schemaRefs>
 </ds:datastoreItem>
-</file>
-
-<file path=customXml/itemProps2.xml><?xml version="1.0" encoding="utf-8"?>
-<ds:datastoreItem xmlns:ds="http://schemas.openxmlformats.org/officeDocument/2006/customXml" ds:itemID="{ABF1ABED-93B7-45AC-A513-2CB1FF159AFF}">
-  <ds:schemaRefs>
-    <ds:schemaRef ds:uri="http://schemas.microsoft.com/sharepoint/v3/contenttype/forms"/>
-  </ds:schemaRefs>
-</ds:datastoreItem>
-</file>
-
-<file path=customXml/itemProps3.xml><?xml version="1.0" encoding="utf-8"?>
-<ds:datastoreItem xmlns:ds="http://schemas.openxmlformats.org/officeDocument/2006/customXml" ds:itemID="{3D6CA70E-ED75-4FF0-A862-8EF12B737755}">
-  <ds:schemaRefs>
-    <ds:schemaRef ds:uri="http://schemas.microsoft.com/office/2006/metadata/properties"/>
-    <ds:schemaRef ds:uri="http://schemas.microsoft.com/office/infopath/2007/PartnerControls"/>
-    <ds:schemaRef ds:uri="71af3243-3dd4-4a8d-8c0d-dd76da1f02a5"/>
-  </ds:schemaRefs>
-</ds:datastoreItem>
 </file>
</xml_diff>

<commit_message>
Finiah selection and projection
</commit_message>
<xml_diff>
--- a/MongoDB Project.pptx
+++ b/MongoDB Project.pptx
@@ -5,10 +5,10 @@
     <p:sldMasterId id="2147483684" r:id="rId4"/>
   </p:sldMasterIdLst>
   <p:notesMasterIdLst>
-    <p:notesMasterId r:id="rId18"/>
+    <p:notesMasterId r:id="rId19"/>
   </p:notesMasterIdLst>
   <p:handoutMasterIdLst>
-    <p:handoutMasterId r:id="rId19"/>
+    <p:handoutMasterId r:id="rId20"/>
   </p:handoutMasterIdLst>
   <p:sldIdLst>
     <p:sldId id="256" r:id="rId5"/>
@@ -24,6 +24,7 @@
     <p:sldId id="264" r:id="rId15"/>
     <p:sldId id="266" r:id="rId16"/>
     <p:sldId id="265" r:id="rId17"/>
+    <p:sldId id="271" r:id="rId18"/>
   </p:sldIdLst>
   <p:sldSz cx="12192000" cy="6858000"/>
   <p:notesSz cx="6858000" cy="9144000"/>
@@ -5508,7 +5509,7 @@
                 <a:ea typeface="Tahoma" panose="020B0604030504040204" pitchFamily="34" charset="0"/>
                 <a:cs typeface="Tahoma" panose="020B0604030504040204" pitchFamily="34" charset="0"/>
               </a:rPr>
-              <a:t>/condition"}).pretty();</a:t>
+              <a:t>/ condition"}).pretty();</a:t>
             </a:r>
           </a:p>
         </p:txBody>
@@ -5736,15 +5737,41 @@
         </p:nvSpPr>
         <p:spPr>
           <a:xfrm>
-            <a:off x="1143000" y="580958"/>
-            <a:ext cx="4754880" cy="777240"/>
+            <a:off x="689113" y="580958"/>
+            <a:ext cx="5049395" cy="777240"/>
           </a:xfrm>
         </p:spPr>
         <p:txBody>
-          <a:bodyPr/>
+          <a:bodyPr>
+            <a:normAutofit/>
+          </a:bodyPr>
           <a:lstStyle/>
           <a:p>
-            <a:endParaRPr lang="en-US" dirty="0"/>
+            <a:pPr algn="ctr"/>
+            <a:r>
+              <a:rPr lang="en-US" sz="2000" b="0" dirty="0">
+                <a:latin typeface="Tahoma" panose="020B0604030504040204" pitchFamily="34" charset="0"/>
+                <a:ea typeface="Tahoma" panose="020B0604030504040204" pitchFamily="34" charset="0"/>
+                <a:cs typeface="Tahoma" panose="020B0604030504040204" pitchFamily="34" charset="0"/>
+              </a:rPr>
+              <a:t>vote_count &gt; 1000 </a:t>
+            </a:r>
+            <a:r>
+              <a:rPr lang="en-US" sz="2000" dirty="0">
+                <a:latin typeface="Tahoma" panose="020B0604030504040204" pitchFamily="34" charset="0"/>
+                <a:ea typeface="Tahoma" panose="020B0604030504040204" pitchFamily="34" charset="0"/>
+                <a:cs typeface="Tahoma" panose="020B0604030504040204" pitchFamily="34" charset="0"/>
+              </a:rPr>
+              <a:t>AND </a:t>
+            </a:r>
+            <a:r>
+              <a:rPr lang="en-US" sz="2000" b="0" dirty="0">
+                <a:latin typeface="Tahoma" panose="020B0604030504040204" pitchFamily="34" charset="0"/>
+                <a:ea typeface="Tahoma" panose="020B0604030504040204" pitchFamily="34" charset="0"/>
+                <a:cs typeface="Tahoma" panose="020B0604030504040204" pitchFamily="34" charset="0"/>
+              </a:rPr>
+              <a:t>vote_average &gt; 6</a:t>
+            </a:r>
           </a:p>
         </p:txBody>
       </p:sp>
@@ -5772,8 +5799,8 @@
         </p:blipFill>
         <p:spPr>
           <a:xfrm>
-            <a:off x="1143000" y="1358198"/>
-            <a:ext cx="4754880" cy="4747327"/>
+            <a:off x="838200" y="1358198"/>
+            <a:ext cx="4754880" cy="4918844"/>
           </a:xfrm>
         </p:spPr>
       </p:pic>
@@ -5795,52 +5822,516 @@
         </p:nvSpPr>
         <p:spPr>
           <a:xfrm>
-            <a:off x="6096000" y="580958"/>
-            <a:ext cx="4754880" cy="777240"/>
+            <a:off x="5765013" y="3758317"/>
+            <a:ext cx="5588786" cy="777240"/>
           </a:xfrm>
         </p:spPr>
         <p:txBody>
-          <a:bodyPr/>
+          <a:bodyPr>
+            <a:normAutofit/>
+          </a:bodyPr>
           <a:lstStyle/>
           <a:p>
-            <a:endParaRPr lang="en-US" dirty="0"/>
-          </a:p>
-        </p:txBody>
-      </p:sp>
-      <p:sp>
-        <p:nvSpPr>
-          <p:cNvPr id="9" name="Content Placeholder 8">
+            <a:pPr algn="ctr"/>
+            <a:r>
+              <a:rPr lang="en-US" sz="2000" b="0" dirty="0">
+                <a:latin typeface="Tahoma" panose="020B0604030504040204" pitchFamily="34" charset="0"/>
+                <a:ea typeface="Tahoma" panose="020B0604030504040204" pitchFamily="34" charset="0"/>
+                <a:cs typeface="Tahoma" panose="020B0604030504040204" pitchFamily="34" charset="0"/>
+              </a:rPr>
+              <a:t>view the id, name and sort TV shows</a:t>
+            </a:r>
+          </a:p>
+          <a:p>
+            <a:pPr algn="ctr"/>
+            <a:r>
+              <a:rPr lang="en-US" sz="2000" b="0" dirty="0">
+                <a:latin typeface="Tahoma" panose="020B0604030504040204" pitchFamily="34" charset="0"/>
+                <a:ea typeface="Tahoma" panose="020B0604030504040204" pitchFamily="34" charset="0"/>
+                <a:cs typeface="Tahoma" panose="020B0604030504040204" pitchFamily="34" charset="0"/>
+              </a:rPr>
+              <a:t> according to their id</a:t>
+            </a:r>
+          </a:p>
+        </p:txBody>
+      </p:sp>
+      <p:pic>
+        <p:nvPicPr>
+          <p:cNvPr id="4" name="Content Placeholder 3">
             <a:extLst>
               <a:ext uri="{FF2B5EF4-FFF2-40B4-BE49-F238E27FC236}">
-                <a16:creationId xmlns:a16="http://schemas.microsoft.com/office/drawing/2014/main" id="{94E12BF2-35A6-4D45-B9CD-85102158F038}"/>
+                <a16:creationId xmlns:a16="http://schemas.microsoft.com/office/drawing/2014/main" id="{7CE41117-FA73-4ACF-AF15-7925A80A16DF}"/>
               </a:ext>
             </a:extLst>
           </p:cNvPr>
-          <p:cNvSpPr>
-            <a:spLocks noGrp="1"/>
-          </p:cNvSpPr>
+          <p:cNvPicPr>
+            <a:picLocks noGrp="1" noChangeAspect="1"/>
+          </p:cNvPicPr>
           <p:nvPr>
             <p:ph sz="quarter" idx="4"/>
           </p:nvPr>
-        </p:nvSpPr>
+        </p:nvPicPr>
+        <p:blipFill>
+          <a:blip r:embed="rId3"/>
+          <a:stretch>
+            <a:fillRect/>
+          </a:stretch>
+        </p:blipFill>
         <p:spPr>
           <a:xfrm>
-            <a:off x="6096000" y="1357435"/>
-            <a:ext cx="4754880" cy="4747327"/>
+            <a:off x="5765013" y="1672606"/>
+            <a:ext cx="5588787" cy="1649554"/>
           </a:xfrm>
         </p:spPr>
-        <p:txBody>
-          <a:bodyPr/>
-          <a:lstStyle/>
-          <a:p>
-            <a:endParaRPr lang="en-US" dirty="0"/>
-          </a:p>
-        </p:txBody>
-      </p:sp>
+      </p:pic>
+      <p:sp>
+        <p:nvSpPr>
+          <p:cNvPr id="10" name="Text Placeholder 7">
+            <a:extLst>
+              <a:ext uri="{FF2B5EF4-FFF2-40B4-BE49-F238E27FC236}">
+                <a16:creationId xmlns:a16="http://schemas.microsoft.com/office/drawing/2014/main" id="{113215C4-6A82-4126-BC62-58B23B8BB414}"/>
+              </a:ext>
+            </a:extLst>
+          </p:cNvPr>
+          <p:cNvSpPr txBox="1">
+            <a:spLocks/>
+          </p:cNvSpPr>
+          <p:nvPr/>
+        </p:nvSpPr>
+        <p:spPr>
+          <a:xfrm>
+            <a:off x="5765013" y="708361"/>
+            <a:ext cx="5588786" cy="777240"/>
+          </a:xfrm>
+          <a:prstGeom prst="rect">
+            <a:avLst/>
+          </a:prstGeom>
+        </p:spPr>
+        <p:txBody>
+          <a:bodyPr vert="horz" lIns="91440" tIns="45720" rIns="91440" bIns="45720" rtlCol="0" anchor="ctr">
+            <a:normAutofit/>
+          </a:bodyPr>
+          <a:lstStyle>
+            <a:lvl1pPr marL="0" indent="0" algn="l" defTabSz="914400" rtl="0" eaLnBrk="1" latinLnBrk="0" hangingPunct="1">
+              <a:lnSpc>
+                <a:spcPct val="90000"/>
+              </a:lnSpc>
+              <a:spcBef>
+                <a:spcPts val="0"/>
+              </a:spcBef>
+              <a:buClr>
+                <a:schemeClr val="accent1"/>
+              </a:buClr>
+              <a:buSzPct val="80000"/>
+              <a:buFont typeface="Corbel" pitchFamily="34" charset="0"/>
+              <a:buNone/>
+              <a:defRPr sz="2400" b="1" kern="1200">
+                <a:solidFill>
+                  <a:schemeClr val="accent1"/>
+                </a:solidFill>
+                <a:latin typeface="+mn-lt"/>
+                <a:ea typeface="+mn-ea"/>
+                <a:cs typeface="+mn-cs"/>
+              </a:defRPr>
+            </a:lvl1pPr>
+            <a:lvl2pPr marL="457200" indent="0" algn="l" defTabSz="914400" rtl="0" eaLnBrk="1" latinLnBrk="0" hangingPunct="1">
+              <a:lnSpc>
+                <a:spcPct val="90000"/>
+              </a:lnSpc>
+              <a:spcBef>
+                <a:spcPts val="200"/>
+              </a:spcBef>
+              <a:spcAft>
+                <a:spcPts val="400"/>
+              </a:spcAft>
+              <a:buClr>
+                <a:schemeClr val="accent1"/>
+              </a:buClr>
+              <a:buSzPct val="80000"/>
+              <a:buFont typeface="Corbel" pitchFamily="34" charset="0"/>
+              <a:buNone/>
+              <a:defRPr sz="2000" b="1" kern="1200">
+                <a:solidFill>
+                  <a:schemeClr val="accent1"/>
+                </a:solidFill>
+                <a:latin typeface="+mn-lt"/>
+                <a:ea typeface="+mn-ea"/>
+                <a:cs typeface="+mn-cs"/>
+              </a:defRPr>
+            </a:lvl2pPr>
+            <a:lvl3pPr marL="914400" indent="0" algn="l" defTabSz="914400" rtl="0" eaLnBrk="1" latinLnBrk="0" hangingPunct="1">
+              <a:lnSpc>
+                <a:spcPct val="90000"/>
+              </a:lnSpc>
+              <a:spcBef>
+                <a:spcPts val="200"/>
+              </a:spcBef>
+              <a:spcAft>
+                <a:spcPts val="400"/>
+              </a:spcAft>
+              <a:buClr>
+                <a:schemeClr val="accent1"/>
+              </a:buClr>
+              <a:buSzPct val="80000"/>
+              <a:buFont typeface="Corbel" pitchFamily="34" charset="0"/>
+              <a:buNone/>
+              <a:defRPr sz="1800" b="1" kern="1200">
+                <a:solidFill>
+                  <a:schemeClr val="accent1"/>
+                </a:solidFill>
+                <a:latin typeface="+mn-lt"/>
+                <a:ea typeface="+mn-ea"/>
+                <a:cs typeface="+mn-cs"/>
+              </a:defRPr>
+            </a:lvl3pPr>
+            <a:lvl4pPr marL="1371600" indent="0" algn="l" defTabSz="914400" rtl="0" eaLnBrk="1" latinLnBrk="0" hangingPunct="1">
+              <a:lnSpc>
+                <a:spcPct val="90000"/>
+              </a:lnSpc>
+              <a:spcBef>
+                <a:spcPts val="200"/>
+              </a:spcBef>
+              <a:spcAft>
+                <a:spcPts val="400"/>
+              </a:spcAft>
+              <a:buClr>
+                <a:schemeClr val="accent1"/>
+              </a:buClr>
+              <a:buSzPct val="80000"/>
+              <a:buFont typeface="Corbel" pitchFamily="34" charset="0"/>
+              <a:buNone/>
+              <a:defRPr sz="1600" b="1" kern="1200">
+                <a:solidFill>
+                  <a:schemeClr val="accent1"/>
+                </a:solidFill>
+                <a:latin typeface="+mn-lt"/>
+                <a:ea typeface="+mn-ea"/>
+                <a:cs typeface="+mn-cs"/>
+              </a:defRPr>
+            </a:lvl4pPr>
+            <a:lvl5pPr marL="1828800" indent="0" algn="l" defTabSz="914400" rtl="0" eaLnBrk="1" latinLnBrk="0" hangingPunct="1">
+              <a:lnSpc>
+                <a:spcPct val="90000"/>
+              </a:lnSpc>
+              <a:spcBef>
+                <a:spcPts val="200"/>
+              </a:spcBef>
+              <a:spcAft>
+                <a:spcPts val="400"/>
+              </a:spcAft>
+              <a:buClr>
+                <a:schemeClr val="accent1"/>
+              </a:buClr>
+              <a:buSzPct val="80000"/>
+              <a:buFont typeface="Corbel" pitchFamily="34" charset="0"/>
+              <a:buNone/>
+              <a:defRPr sz="1600" b="1" kern="1200">
+                <a:solidFill>
+                  <a:schemeClr val="accent1"/>
+                </a:solidFill>
+                <a:latin typeface="+mn-lt"/>
+                <a:ea typeface="+mn-ea"/>
+                <a:cs typeface="+mn-cs"/>
+              </a:defRPr>
+            </a:lvl5pPr>
+            <a:lvl6pPr marL="2286000" indent="0" algn="l" defTabSz="914400" rtl="0" eaLnBrk="1" latinLnBrk="0" hangingPunct="1">
+              <a:lnSpc>
+                <a:spcPct val="90000"/>
+              </a:lnSpc>
+              <a:spcBef>
+                <a:spcPts val="200"/>
+              </a:spcBef>
+              <a:spcAft>
+                <a:spcPts val="400"/>
+              </a:spcAft>
+              <a:buClr>
+                <a:schemeClr val="accent1"/>
+              </a:buClr>
+              <a:buSzPct val="80000"/>
+              <a:buFont typeface="Corbel" pitchFamily="34" charset="0"/>
+              <a:buNone/>
+              <a:defRPr sz="1600" b="1" kern="1200">
+                <a:solidFill>
+                  <a:schemeClr val="accent1"/>
+                </a:solidFill>
+                <a:latin typeface="+mn-lt"/>
+                <a:ea typeface="+mn-ea"/>
+                <a:cs typeface="+mn-cs"/>
+              </a:defRPr>
+            </a:lvl6pPr>
+            <a:lvl7pPr marL="2743200" indent="0" algn="l" defTabSz="914400" rtl="0" eaLnBrk="1" latinLnBrk="0" hangingPunct="1">
+              <a:lnSpc>
+                <a:spcPct val="90000"/>
+              </a:lnSpc>
+              <a:spcBef>
+                <a:spcPts val="200"/>
+              </a:spcBef>
+              <a:spcAft>
+                <a:spcPts val="400"/>
+              </a:spcAft>
+              <a:buClr>
+                <a:schemeClr val="accent1"/>
+              </a:buClr>
+              <a:buSzPct val="80000"/>
+              <a:buFont typeface="Corbel" pitchFamily="34" charset="0"/>
+              <a:buNone/>
+              <a:defRPr sz="1600" b="1" kern="1200">
+                <a:solidFill>
+                  <a:schemeClr val="accent1"/>
+                </a:solidFill>
+                <a:latin typeface="+mn-lt"/>
+                <a:ea typeface="+mn-ea"/>
+                <a:cs typeface="+mn-cs"/>
+              </a:defRPr>
+            </a:lvl7pPr>
+            <a:lvl8pPr marL="3200400" indent="0" algn="l" defTabSz="914400" rtl="0" eaLnBrk="1" latinLnBrk="0" hangingPunct="1">
+              <a:lnSpc>
+                <a:spcPct val="90000"/>
+              </a:lnSpc>
+              <a:spcBef>
+                <a:spcPts val="200"/>
+              </a:spcBef>
+              <a:spcAft>
+                <a:spcPts val="400"/>
+              </a:spcAft>
+              <a:buClr>
+                <a:schemeClr val="accent1"/>
+              </a:buClr>
+              <a:buSzPct val="80000"/>
+              <a:buFont typeface="Corbel" pitchFamily="34" charset="0"/>
+              <a:buNone/>
+              <a:defRPr sz="1600" b="1" kern="1200">
+                <a:solidFill>
+                  <a:schemeClr val="accent1"/>
+                </a:solidFill>
+                <a:latin typeface="+mn-lt"/>
+                <a:ea typeface="+mn-ea"/>
+                <a:cs typeface="+mn-cs"/>
+              </a:defRPr>
+            </a:lvl8pPr>
+            <a:lvl9pPr marL="3657600" indent="0" algn="l" defTabSz="914400" rtl="0" eaLnBrk="1" latinLnBrk="0" hangingPunct="1">
+              <a:lnSpc>
+                <a:spcPct val="90000"/>
+              </a:lnSpc>
+              <a:spcBef>
+                <a:spcPts val="200"/>
+              </a:spcBef>
+              <a:spcAft>
+                <a:spcPts val="400"/>
+              </a:spcAft>
+              <a:buClr>
+                <a:schemeClr val="accent1"/>
+              </a:buClr>
+              <a:buSzPct val="80000"/>
+              <a:buFont typeface="Corbel" pitchFamily="34" charset="0"/>
+              <a:buNone/>
+              <a:defRPr sz="1600" b="1" kern="1200">
+                <a:solidFill>
+                  <a:schemeClr val="accent1"/>
+                </a:solidFill>
+                <a:latin typeface="+mn-lt"/>
+                <a:ea typeface="+mn-ea"/>
+                <a:cs typeface="+mn-cs"/>
+              </a:defRPr>
+            </a:lvl9pPr>
+          </a:lstStyle>
+          <a:p>
+            <a:pPr algn="ctr"/>
+            <a:r>
+              <a:rPr lang="en-US" sz="2000" b="0" dirty="0">
+                <a:latin typeface="Tahoma" panose="020B0604030504040204" pitchFamily="34" charset="0"/>
+                <a:ea typeface="Tahoma" panose="020B0604030504040204" pitchFamily="34" charset="0"/>
+                <a:cs typeface="Tahoma" panose="020B0604030504040204" pitchFamily="34" charset="0"/>
+              </a:rPr>
+              <a:t>view the id, name, genres and rating of</a:t>
+            </a:r>
+          </a:p>
+          <a:p>
+            <a:pPr algn="ctr"/>
+            <a:r>
+              <a:rPr lang="en-US" sz="2000" b="0" dirty="0">
+                <a:latin typeface="Tahoma" panose="020B0604030504040204" pitchFamily="34" charset="0"/>
+                <a:ea typeface="Tahoma" panose="020B0604030504040204" pitchFamily="34" charset="0"/>
+                <a:cs typeface="Tahoma" panose="020B0604030504040204" pitchFamily="34" charset="0"/>
+              </a:rPr>
+              <a:t>TV show of id 143</a:t>
+            </a:r>
+          </a:p>
+        </p:txBody>
+      </p:sp>
+      <p:pic>
+        <p:nvPicPr>
+          <p:cNvPr id="5" name="Picture 4">
+            <a:extLst>
+              <a:ext uri="{FF2B5EF4-FFF2-40B4-BE49-F238E27FC236}">
+                <a16:creationId xmlns:a16="http://schemas.microsoft.com/office/drawing/2014/main" id="{2701B954-01A0-4DBD-8614-9B86F29CF3D8}"/>
+              </a:ext>
+            </a:extLst>
+          </p:cNvPr>
+          <p:cNvPicPr>
+            <a:picLocks noChangeAspect="1"/>
+          </p:cNvPicPr>
+          <p:nvPr/>
+        </p:nvPicPr>
+        <p:blipFill>
+          <a:blip r:embed="rId4"/>
+          <a:stretch>
+            <a:fillRect/>
+          </a:stretch>
+        </p:blipFill>
+        <p:spPr>
+          <a:xfrm>
+            <a:off x="5765013" y="4703271"/>
+            <a:ext cx="5590673" cy="964245"/>
+          </a:xfrm>
+          <a:prstGeom prst="rect">
+            <a:avLst/>
+          </a:prstGeom>
+        </p:spPr>
+      </p:pic>
     </p:spTree>
     <p:extLst>
       <p:ext uri="{BB962C8B-B14F-4D97-AF65-F5344CB8AC3E}">
         <p14:creationId xmlns:p14="http://schemas.microsoft.com/office/powerpoint/2010/main" val="2479869723"/>
+      </p:ext>
+    </p:extLst>
+  </p:cSld>
+  <p:clrMapOvr>
+    <a:masterClrMapping/>
+  </p:clrMapOvr>
+</p:sld>
+</file>
+
+<file path=ppt/slides/slide14.xml><?xml version="1.0" encoding="utf-8"?>
+<p:sld xmlns:a="http://schemas.openxmlformats.org/drawingml/2006/main" xmlns:r="http://schemas.openxmlformats.org/officeDocument/2006/relationships" xmlns:p="http://schemas.openxmlformats.org/presentationml/2006/main">
+  <p:cSld>
+    <p:spTree>
+      <p:nvGrpSpPr>
+        <p:cNvPr id="1" name=""/>
+        <p:cNvGrpSpPr/>
+        <p:nvPr/>
+      </p:nvGrpSpPr>
+      <p:grpSpPr>
+        <a:xfrm>
+          <a:off x="0" y="0"/>
+          <a:ext cx="0" cy="0"/>
+          <a:chOff x="0" y="0"/>
+          <a:chExt cx="0" cy="0"/>
+        </a:xfrm>
+      </p:grpSpPr>
+      <p:sp>
+        <p:nvSpPr>
+          <p:cNvPr id="4" name="Content Placeholder 3">
+            <a:extLst>
+              <a:ext uri="{FF2B5EF4-FFF2-40B4-BE49-F238E27FC236}">
+                <a16:creationId xmlns:a16="http://schemas.microsoft.com/office/drawing/2014/main" id="{C73FF414-3511-4790-9099-1E632A6D975E}"/>
+              </a:ext>
+            </a:extLst>
+          </p:cNvPr>
+          <p:cNvSpPr>
+            <a:spLocks noGrp="1"/>
+          </p:cNvSpPr>
+          <p:nvPr>
+            <p:ph type="body" sz="half" idx="2"/>
+          </p:nvPr>
+        </p:nvSpPr>
+        <p:spPr>
+          <a:xfrm>
+            <a:off x="679703" y="1069848"/>
+            <a:ext cx="10832593" cy="1699856"/>
+          </a:xfrm>
+        </p:spPr>
+        <p:txBody>
+          <a:bodyPr anchor="t"/>
+          <a:lstStyle/>
+          <a:p>
+            <a:pPr indent="0">
+              <a:lnSpc>
+                <a:spcPct val="150000"/>
+              </a:lnSpc>
+              <a:spcBef>
+                <a:spcPts val="600"/>
+              </a:spcBef>
+              <a:spcAft>
+                <a:spcPts val="600"/>
+              </a:spcAft>
+              <a:buNone/>
+            </a:pPr>
+            <a:r>
+              <a:rPr lang="en-US" sz="2800" dirty="0">
+                <a:solidFill>
+                  <a:schemeClr val="tx1">
+                    <a:lumMod val="95000"/>
+                    <a:lumOff val="5000"/>
+                  </a:schemeClr>
+                </a:solidFill>
+                <a:latin typeface="Tahoma" panose="020B0604030504040204" pitchFamily="34" charset="0"/>
+                <a:ea typeface="Tahoma" panose="020B0604030504040204" pitchFamily="34" charset="0"/>
+                <a:cs typeface="Tahoma" panose="020B0604030504040204" pitchFamily="34" charset="0"/>
+              </a:rPr>
+              <a:t>3- Update:</a:t>
+            </a:r>
+          </a:p>
+          <a:p>
+            <a:pPr marL="0" lvl="1" indent="-342900">
+              <a:lnSpc>
+                <a:spcPct val="150000"/>
+              </a:lnSpc>
+              <a:spcBef>
+                <a:spcPts val="600"/>
+              </a:spcBef>
+              <a:spcAft>
+                <a:spcPts val="600"/>
+              </a:spcAft>
+              <a:buFont typeface="Arial" panose="020B0604020202020204" pitchFamily="34" charset="0"/>
+              <a:buChar char="•"/>
+            </a:pPr>
+            <a:r>
+              <a:rPr lang="en-US" sz="2200" dirty="0" err="1">
+                <a:latin typeface="Tahoma" panose="020B0604030504040204" pitchFamily="34" charset="0"/>
+                <a:ea typeface="Tahoma" panose="020B0604030504040204" pitchFamily="34" charset="0"/>
+                <a:cs typeface="Tahoma" panose="020B0604030504040204" pitchFamily="34" charset="0"/>
+              </a:rPr>
+              <a:t>db.COLLECTION_NAME.update</a:t>
+            </a:r>
+            <a:r>
+              <a:rPr lang="en-US" sz="2200" dirty="0">
+                <a:latin typeface="Tahoma" panose="020B0604030504040204" pitchFamily="34" charset="0"/>
+                <a:ea typeface="Tahoma" panose="020B0604030504040204" pitchFamily="34" charset="0"/>
+                <a:cs typeface="Tahoma" panose="020B0604030504040204" pitchFamily="34" charset="0"/>
+              </a:rPr>
+              <a:t>(SELECTION_CRITERIA, UPDATED_DATA)</a:t>
+            </a:r>
+          </a:p>
+        </p:txBody>
+      </p:sp>
+      <p:sp>
+        <p:nvSpPr>
+          <p:cNvPr id="3" name="Picture Placeholder 2">
+            <a:extLst>
+              <a:ext uri="{FF2B5EF4-FFF2-40B4-BE49-F238E27FC236}">
+                <a16:creationId xmlns:a16="http://schemas.microsoft.com/office/drawing/2014/main" id="{CE69FAC1-7713-4855-8D94-25A10F264C4B}"/>
+              </a:ext>
+            </a:extLst>
+          </p:cNvPr>
+          <p:cNvSpPr>
+            <a:spLocks noGrp="1"/>
+          </p:cNvSpPr>
+          <p:nvPr>
+            <p:ph type="pic" idx="1"/>
+          </p:nvPr>
+        </p:nvSpPr>
+        <p:spPr>
+          <a:xfrm>
+            <a:off x="679703" y="2769703"/>
+            <a:ext cx="10832593" cy="3100743"/>
+          </a:xfrm>
+        </p:spPr>
+      </p:sp>
+    </p:spTree>
+    <p:extLst>
+      <p:ext uri="{BB962C8B-B14F-4D97-AF65-F5344CB8AC3E}">
+        <p14:creationId xmlns:p14="http://schemas.microsoft.com/office/powerpoint/2010/main" val="1266648717"/>
       </p:ext>
     </p:extLst>
   </p:cSld>
@@ -8536,15 +9027,6 @@
 </file>
 
 <file path=customXml/item2.xml><?xml version="1.0" encoding="utf-8"?>
-<?mso-contentType ?>
-<FormTemplates xmlns="http://schemas.microsoft.com/sharepoint/v3/contenttype/forms">
-  <Display>DocumentLibraryForm</Display>
-  <Edit>DocumentLibraryForm</Edit>
-  <New>DocumentLibraryForm</New>
-</FormTemplates>
-</file>
-
-<file path=customXml/item3.xml><?xml version="1.0" encoding="utf-8"?>
 <ct:contentTypeSchema xmlns:ct="http://schemas.microsoft.com/office/2006/metadata/contentType" xmlns:ma="http://schemas.microsoft.com/office/2006/metadata/properties/metaAttributes" ct:_="" ma:_="" ma:contentTypeName="Document" ma:contentTypeID="0x01010079F111ED35F8CC479449609E8A0923A6" ma:contentTypeVersion="11" ma:contentTypeDescription="Create a new document." ma:contentTypeScope="" ma:versionID="96291512c1ee715ab617f4c07df79fc1">
   <xsd:schema xmlns:xsd="http://www.w3.org/2001/XMLSchema" xmlns:xs="http://www.w3.org/2001/XMLSchema" xmlns:p="http://schemas.microsoft.com/office/2006/metadata/properties" xmlns:ns2="71af3243-3dd4-4a8d-8c0d-dd76da1f02a5" xmlns:ns3="16c05727-aa75-4e4a-9b5f-8a80a1165891" targetNamespace="http://schemas.microsoft.com/office/2006/metadata/properties" ma:root="true" ma:fieldsID="8256c27c40ca5c40ce1cf6c44f0205df" ns2:_="" ns3:_="">
     <xsd:import namespace="71af3243-3dd4-4a8d-8c0d-dd76da1f02a5"/>
@@ -8755,6 +9237,15 @@
 </ct:contentTypeSchema>
 </file>
 
+<file path=customXml/item3.xml><?xml version="1.0" encoding="utf-8"?>
+<?mso-contentType ?>
+<FormTemplates xmlns="http://schemas.microsoft.com/sharepoint/v3/contenttype/forms">
+  <Display>DocumentLibraryForm</Display>
+  <Edit>DocumentLibraryForm</Edit>
+  <New>DocumentLibraryForm</New>
+</FormTemplates>
+</file>
+
 <file path=customXml/itemProps1.xml><?xml version="1.0" encoding="utf-8"?>
 <ds:datastoreItem xmlns:ds="http://schemas.openxmlformats.org/officeDocument/2006/customXml" ds:itemID="{3D6CA70E-ED75-4FF0-A862-8EF12B737755}">
   <ds:schemaRefs>
@@ -8766,14 +9257,6 @@
 </file>
 
 <file path=customXml/itemProps2.xml><?xml version="1.0" encoding="utf-8"?>
-<ds:datastoreItem xmlns:ds="http://schemas.openxmlformats.org/officeDocument/2006/customXml" ds:itemID="{ABF1ABED-93B7-45AC-A513-2CB1FF159AFF}">
-  <ds:schemaRefs>
-    <ds:schemaRef ds:uri="http://schemas.microsoft.com/sharepoint/v3/contenttype/forms"/>
-  </ds:schemaRefs>
-</ds:datastoreItem>
-</file>
-
-<file path=customXml/itemProps3.xml><?xml version="1.0" encoding="utf-8"?>
 <ds:datastoreItem xmlns:ds="http://schemas.openxmlformats.org/officeDocument/2006/customXml" ds:itemID="{79B27744-7857-4992-B755-05855FC59147}">
   <ds:schemaRefs>
     <ds:schemaRef ds:uri="http://schemas.microsoft.com/office/2006/metadata/contentType"/>
@@ -8790,4 +9273,12 @@
     <ds:schemaRef ds:uri="http://schemas.microsoft.com/internal/obd"/>
   </ds:schemaRefs>
 </ds:datastoreItem>
+</file>
+
+<file path=customXml/itemProps3.xml><?xml version="1.0" encoding="utf-8"?>
+<ds:datastoreItem xmlns:ds="http://schemas.openxmlformats.org/officeDocument/2006/customXml" ds:itemID="{ABF1ABED-93B7-45AC-A513-2CB1FF159AFF}">
+  <ds:schemaRefs>
+    <ds:schemaRef ds:uri="http://schemas.microsoft.com/sharepoint/v3/contenttype/forms"/>
+  </ds:schemaRefs>
+</ds:datastoreItem>
 </file>
</xml_diff>

<commit_message>
Add update and delete queries
</commit_message>
<xml_diff>
--- a/MongoDB Project.pptx
+++ b/MongoDB Project.pptx
@@ -5,10 +5,10 @@
     <p:sldMasterId id="2147483684" r:id="rId4"/>
   </p:sldMasterIdLst>
   <p:notesMasterIdLst>
-    <p:notesMasterId r:id="rId19"/>
+    <p:notesMasterId r:id="rId20"/>
   </p:notesMasterIdLst>
   <p:handoutMasterIdLst>
-    <p:handoutMasterId r:id="rId20"/>
+    <p:handoutMasterId r:id="rId21"/>
   </p:handoutMasterIdLst>
   <p:sldIdLst>
     <p:sldId id="256" r:id="rId5"/>
@@ -25,6 +25,7 @@
     <p:sldId id="266" r:id="rId16"/>
     <p:sldId id="265" r:id="rId17"/>
     <p:sldId id="271" r:id="rId18"/>
+    <p:sldId id="272" r:id="rId19"/>
   </p:sldIdLst>
   <p:sldSz cx="12192000" cy="6858000"/>
   <p:notesSz cx="6858000" cy="9144000"/>
@@ -6203,7 +6204,7 @@
 </file>
 
 <file path=ppt/slides/slide14.xml><?xml version="1.0" encoding="utf-8"?>
-<p:sld xmlns:a="http://schemas.openxmlformats.org/drawingml/2006/main" xmlns:r="http://schemas.openxmlformats.org/officeDocument/2006/relationships" xmlns:p="http://schemas.openxmlformats.org/presentationml/2006/main">
+<p:sld xmlns:a="http://schemas.openxmlformats.org/drawingml/2006/main" xmlns:r="http://schemas.openxmlformats.org/officeDocument/2006/relationships" xmlns:p="http://schemas.openxmlformats.org/presentationml/2006/main" show="0">
   <p:cSld>
     <p:spTree>
       <p:nvGrpSpPr>
@@ -6269,7 +6270,7 @@
                 <a:ea typeface="Tahoma" panose="020B0604030504040204" pitchFamily="34" charset="0"/>
                 <a:cs typeface="Tahoma" panose="020B0604030504040204" pitchFamily="34" charset="0"/>
               </a:rPr>
-              <a:t>3- Update:</a:t>
+              <a:t>3- Update Document:</a:t>
             </a:r>
           </a:p>
           <a:p>
@@ -6305,6 +6306,152 @@
           </a:p>
         </p:txBody>
       </p:sp>
+      <p:pic>
+        <p:nvPicPr>
+          <p:cNvPr id="12" name="Picture 11">
+            <a:extLst>
+              <a:ext uri="{FF2B5EF4-FFF2-40B4-BE49-F238E27FC236}">
+                <a16:creationId xmlns:a16="http://schemas.microsoft.com/office/drawing/2014/main" id="{66329332-13EE-4DAB-A9FC-19A188C62ACC}"/>
+              </a:ext>
+            </a:extLst>
+          </p:cNvPr>
+          <p:cNvPicPr>
+            <a:picLocks noChangeAspect="1"/>
+          </p:cNvPicPr>
+          <p:nvPr/>
+        </p:nvPicPr>
+        <p:blipFill>
+          <a:blip r:embed="rId2"/>
+          <a:stretch>
+            <a:fillRect/>
+          </a:stretch>
+        </p:blipFill>
+        <p:spPr>
+          <a:xfrm>
+            <a:off x="679703" y="2830996"/>
+            <a:ext cx="10832593" cy="2156715"/>
+          </a:xfrm>
+          <a:prstGeom prst="rect">
+            <a:avLst/>
+          </a:prstGeom>
+        </p:spPr>
+      </p:pic>
+    </p:spTree>
+    <p:extLst>
+      <p:ext uri="{BB962C8B-B14F-4D97-AF65-F5344CB8AC3E}">
+        <p14:creationId xmlns:p14="http://schemas.microsoft.com/office/powerpoint/2010/main" val="1266648717"/>
+      </p:ext>
+    </p:extLst>
+  </p:cSld>
+  <p:clrMapOvr>
+    <a:masterClrMapping/>
+  </p:clrMapOvr>
+</p:sld>
+</file>
+
+<file path=ppt/slides/slide15.xml><?xml version="1.0" encoding="utf-8"?>
+<p:sld xmlns:a="http://schemas.openxmlformats.org/drawingml/2006/main" xmlns:r="http://schemas.openxmlformats.org/officeDocument/2006/relationships" xmlns:p="http://schemas.openxmlformats.org/presentationml/2006/main" show="0">
+  <p:cSld>
+    <p:spTree>
+      <p:nvGrpSpPr>
+        <p:cNvPr id="1" name=""/>
+        <p:cNvGrpSpPr/>
+        <p:nvPr/>
+      </p:nvGrpSpPr>
+      <p:grpSpPr>
+        <a:xfrm>
+          <a:off x="0" y="0"/>
+          <a:ext cx="0" cy="0"/>
+          <a:chOff x="0" y="0"/>
+          <a:chExt cx="0" cy="0"/>
+        </a:xfrm>
+      </p:grpSpPr>
+      <p:sp>
+        <p:nvSpPr>
+          <p:cNvPr id="4" name="Content Placeholder 3">
+            <a:extLst>
+              <a:ext uri="{FF2B5EF4-FFF2-40B4-BE49-F238E27FC236}">
+                <a16:creationId xmlns:a16="http://schemas.microsoft.com/office/drawing/2014/main" id="{C73FF414-3511-4790-9099-1E632A6D975E}"/>
+              </a:ext>
+            </a:extLst>
+          </p:cNvPr>
+          <p:cNvSpPr>
+            <a:spLocks noGrp="1"/>
+          </p:cNvSpPr>
+          <p:nvPr>
+            <p:ph type="body" sz="half" idx="2"/>
+          </p:nvPr>
+        </p:nvSpPr>
+        <p:spPr>
+          <a:xfrm>
+            <a:off x="679703" y="1069848"/>
+            <a:ext cx="10832593" cy="1699856"/>
+          </a:xfrm>
+        </p:spPr>
+        <p:txBody>
+          <a:bodyPr anchor="t"/>
+          <a:lstStyle/>
+          <a:p>
+            <a:pPr indent="0">
+              <a:lnSpc>
+                <a:spcPct val="150000"/>
+              </a:lnSpc>
+              <a:spcBef>
+                <a:spcPts val="600"/>
+              </a:spcBef>
+              <a:spcAft>
+                <a:spcPts val="600"/>
+              </a:spcAft>
+              <a:buNone/>
+            </a:pPr>
+            <a:r>
+              <a:rPr lang="en-US" sz="2800" dirty="0">
+                <a:solidFill>
+                  <a:schemeClr val="tx1">
+                    <a:lumMod val="95000"/>
+                    <a:lumOff val="5000"/>
+                  </a:schemeClr>
+                </a:solidFill>
+                <a:latin typeface="Tahoma" panose="020B0604030504040204" pitchFamily="34" charset="0"/>
+                <a:ea typeface="Tahoma" panose="020B0604030504040204" pitchFamily="34" charset="0"/>
+                <a:cs typeface="Tahoma" panose="020B0604030504040204" pitchFamily="34" charset="0"/>
+              </a:rPr>
+              <a:t>4- Delete Document:</a:t>
+            </a:r>
+          </a:p>
+          <a:p>
+            <a:pPr marL="0" lvl="1" indent="-342900">
+              <a:lnSpc>
+                <a:spcPct val="150000"/>
+              </a:lnSpc>
+              <a:spcBef>
+                <a:spcPts val="600"/>
+              </a:spcBef>
+              <a:spcAft>
+                <a:spcPts val="600"/>
+              </a:spcAft>
+              <a:buFont typeface="Arial" panose="020B0604020202020204" pitchFamily="34" charset="0"/>
+              <a:buChar char="•"/>
+            </a:pPr>
+            <a:r>
+              <a:rPr lang="en-US" sz="2200" dirty="0" err="1">
+                <a:latin typeface="Tahoma" panose="020B0604030504040204" pitchFamily="34" charset="0"/>
+                <a:ea typeface="Tahoma" panose="020B0604030504040204" pitchFamily="34" charset="0"/>
+                <a:cs typeface="Tahoma" panose="020B0604030504040204" pitchFamily="34" charset="0"/>
+              </a:rPr>
+              <a:t>db.COLLECTION_NAME.remove</a:t>
+            </a:r>
+            <a:r>
+              <a:rPr lang="en-US" sz="2200" dirty="0">
+                <a:latin typeface="Tahoma" panose="020B0604030504040204" pitchFamily="34" charset="0"/>
+                <a:ea typeface="Tahoma" panose="020B0604030504040204" pitchFamily="34" charset="0"/>
+                <a:cs typeface="Tahoma" panose="020B0604030504040204" pitchFamily="34" charset="0"/>
+              </a:rPr>
+              <a:t>(DELLETION_CRITTERIA)</a:t>
+            </a:r>
+          </a:p>
+        </p:txBody>
+      </p:sp>
       <p:sp>
         <p:nvSpPr>
           <p:cNvPr id="3" name="Picture Placeholder 2">
@@ -6331,7 +6478,7 @@
     </p:spTree>
     <p:extLst>
       <p:ext uri="{BB962C8B-B14F-4D97-AF65-F5344CB8AC3E}">
-        <p14:creationId xmlns:p14="http://schemas.microsoft.com/office/powerpoint/2010/main" val="1266648717"/>
+        <p14:creationId xmlns:p14="http://schemas.microsoft.com/office/powerpoint/2010/main" val="1686090818"/>
       </p:ext>
     </p:extLst>
   </p:cSld>

</xml_diff>

<commit_message>
Add aggregation and insertion queries
</commit_message>
<xml_diff>
--- a/MongoDB Project.pptx
+++ b/MongoDB Project.pptx
@@ -5,10 +5,10 @@
     <p:sldMasterId id="2147483684" r:id="rId4"/>
   </p:sldMasterIdLst>
   <p:notesMasterIdLst>
-    <p:notesMasterId r:id="rId20"/>
+    <p:notesMasterId r:id="rId22"/>
   </p:notesMasterIdLst>
   <p:handoutMasterIdLst>
-    <p:handoutMasterId r:id="rId21"/>
+    <p:handoutMasterId r:id="rId23"/>
   </p:handoutMasterIdLst>
   <p:sldIdLst>
     <p:sldId id="256" r:id="rId5"/>
@@ -26,6 +26,8 @@
     <p:sldId id="265" r:id="rId17"/>
     <p:sldId id="271" r:id="rId18"/>
     <p:sldId id="272" r:id="rId19"/>
+    <p:sldId id="273" r:id="rId20"/>
+    <p:sldId id="274" r:id="rId21"/>
   </p:sldIdLst>
   <p:sldSz cx="12192000" cy="6858000"/>
   <p:notesSz cx="6858000" cy="9144000"/>
@@ -5341,7 +5343,7 @@
         <p:spPr>
           <a:xfrm>
             <a:off x="679704" y="1097280"/>
-            <a:ext cx="4395216" cy="1737360"/>
+            <a:ext cx="4395216" cy="1553155"/>
           </a:xfrm>
         </p:spPr>
         <p:txBody>
@@ -5405,8 +5407,8 @@
         </p:nvSpPr>
         <p:spPr>
           <a:xfrm>
-            <a:off x="679704" y="2834640"/>
-            <a:ext cx="4395216" cy="2880360"/>
+            <a:off x="679704" y="2650435"/>
+            <a:ext cx="4395216" cy="3064565"/>
           </a:xfrm>
         </p:spPr>
         <p:txBody>
@@ -6204,7 +6206,7 @@
 </file>
 
 <file path=ppt/slides/slide14.xml><?xml version="1.0" encoding="utf-8"?>
-<p:sld xmlns:a="http://schemas.openxmlformats.org/drawingml/2006/main" xmlns:r="http://schemas.openxmlformats.org/officeDocument/2006/relationships" xmlns:p="http://schemas.openxmlformats.org/presentationml/2006/main" show="0">
+<p:sld xmlns:a="http://schemas.openxmlformats.org/drawingml/2006/main" xmlns:r="http://schemas.openxmlformats.org/officeDocument/2006/relationships" xmlns:p="http://schemas.openxmlformats.org/presentationml/2006/main">
   <p:cSld>
     <p:spTree>
       <p:nvGrpSpPr>
@@ -6270,7 +6272,7 @@
                 <a:ea typeface="Tahoma" panose="020B0604030504040204" pitchFamily="34" charset="0"/>
                 <a:cs typeface="Tahoma" panose="020B0604030504040204" pitchFamily="34" charset="0"/>
               </a:rPr>
-              <a:t>3- Update Document:</a:t>
+              <a:t>3- Update Document(s):</a:t>
             </a:r>
           </a:p>
           <a:p>
@@ -6350,7 +6352,7 @@
 </file>
 
 <file path=ppt/slides/slide15.xml><?xml version="1.0" encoding="utf-8"?>
-<p:sld xmlns:a="http://schemas.openxmlformats.org/drawingml/2006/main" xmlns:r="http://schemas.openxmlformats.org/officeDocument/2006/relationships" xmlns:p="http://schemas.openxmlformats.org/presentationml/2006/main" show="0">
+<p:sld xmlns:a="http://schemas.openxmlformats.org/drawingml/2006/main" xmlns:r="http://schemas.openxmlformats.org/officeDocument/2006/relationships" xmlns:p="http://schemas.openxmlformats.org/presentationml/2006/main">
   <p:cSld>
     <p:spTree>
       <p:nvGrpSpPr>
@@ -6384,8 +6386,8 @@
         </p:nvSpPr>
         <p:spPr>
           <a:xfrm>
-            <a:off x="679703" y="1069848"/>
-            <a:ext cx="10832593" cy="1699856"/>
+            <a:off x="679703" y="718810"/>
+            <a:ext cx="10832593" cy="1762923"/>
           </a:xfrm>
         </p:spPr>
         <p:txBody>
@@ -6416,7 +6418,7 @@
                 <a:ea typeface="Tahoma" panose="020B0604030504040204" pitchFamily="34" charset="0"/>
                 <a:cs typeface="Tahoma" panose="020B0604030504040204" pitchFamily="34" charset="0"/>
               </a:rPr>
-              <a:t>4- Delete Document:</a:t>
+              <a:t>4- Delete Document(s):</a:t>
             </a:r>
           </a:p>
           <a:p>
@@ -6452,12 +6454,356 @@
           </a:p>
         </p:txBody>
       </p:sp>
-      <p:sp>
-        <p:nvSpPr>
-          <p:cNvPr id="3" name="Picture Placeholder 2">
+      <p:pic>
+        <p:nvPicPr>
+          <p:cNvPr id="5" name="Picture 4">
             <a:extLst>
               <a:ext uri="{FF2B5EF4-FFF2-40B4-BE49-F238E27FC236}">
-                <a16:creationId xmlns:a16="http://schemas.microsoft.com/office/drawing/2014/main" id="{CE69FAC1-7713-4855-8D94-25A10F264C4B}"/>
+                <a16:creationId xmlns:a16="http://schemas.microsoft.com/office/drawing/2014/main" id="{CC207273-9A71-4E61-82D6-51097B9A407A}"/>
+              </a:ext>
+            </a:extLst>
+          </p:cNvPr>
+          <p:cNvPicPr>
+            <a:picLocks noChangeAspect="1"/>
+          </p:cNvPicPr>
+          <p:nvPr/>
+        </p:nvPicPr>
+        <p:blipFill>
+          <a:blip r:embed="rId2"/>
+          <a:stretch>
+            <a:fillRect/>
+          </a:stretch>
+        </p:blipFill>
+        <p:spPr>
+          <a:xfrm>
+            <a:off x="679703" y="2481733"/>
+            <a:ext cx="10832593" cy="2618711"/>
+          </a:xfrm>
+          <a:prstGeom prst="rect">
+            <a:avLst/>
+          </a:prstGeom>
+        </p:spPr>
+      </p:pic>
+      <p:sp>
+        <p:nvSpPr>
+          <p:cNvPr id="7" name="Content Placeholder 3">
+            <a:extLst>
+              <a:ext uri="{FF2B5EF4-FFF2-40B4-BE49-F238E27FC236}">
+                <a16:creationId xmlns:a16="http://schemas.microsoft.com/office/drawing/2014/main" id="{5809BBC7-BE4C-417A-9AA0-F4B0D892F03D}"/>
+              </a:ext>
+            </a:extLst>
+          </p:cNvPr>
+          <p:cNvSpPr txBox="1">
+            <a:spLocks/>
+          </p:cNvSpPr>
+          <p:nvPr/>
+        </p:nvSpPr>
+        <p:spPr>
+          <a:xfrm>
+            <a:off x="679703" y="5451481"/>
+            <a:ext cx="10832593" cy="687709"/>
+          </a:xfrm>
+          <a:prstGeom prst="rect">
+            <a:avLst/>
+          </a:prstGeom>
+        </p:spPr>
+        <p:txBody>
+          <a:bodyPr vert="horz" lIns="91440" tIns="45720" rIns="91440" bIns="45720" rtlCol="0" anchor="t">
+            <a:normAutofit/>
+          </a:bodyPr>
+          <a:lstStyle>
+            <a:lvl1pPr marL="0" indent="0" algn="l" defTabSz="914400" rtl="0" eaLnBrk="1" latinLnBrk="0" hangingPunct="1">
+              <a:lnSpc>
+                <a:spcPct val="100000"/>
+              </a:lnSpc>
+              <a:spcBef>
+                <a:spcPts val="1000"/>
+              </a:spcBef>
+              <a:buClr>
+                <a:schemeClr val="accent1"/>
+              </a:buClr>
+              <a:buSzPct val="80000"/>
+              <a:buFont typeface="Corbel" pitchFamily="34" charset="0"/>
+              <a:buNone/>
+              <a:defRPr sz="1700" kern="1200">
+                <a:solidFill>
+                  <a:schemeClr val="accent1"/>
+                </a:solidFill>
+                <a:latin typeface="+mn-lt"/>
+                <a:ea typeface="+mn-ea"/>
+                <a:cs typeface="+mn-cs"/>
+              </a:defRPr>
+            </a:lvl1pPr>
+            <a:lvl2pPr marL="457200" indent="0" algn="l" defTabSz="914400" rtl="0" eaLnBrk="1" latinLnBrk="0" hangingPunct="1">
+              <a:lnSpc>
+                <a:spcPct val="90000"/>
+              </a:lnSpc>
+              <a:spcBef>
+                <a:spcPts val="200"/>
+              </a:spcBef>
+              <a:spcAft>
+                <a:spcPts val="400"/>
+              </a:spcAft>
+              <a:buClr>
+                <a:schemeClr val="accent1"/>
+              </a:buClr>
+              <a:buSzPct val="80000"/>
+              <a:buFont typeface="Corbel" pitchFamily="34" charset="0"/>
+              <a:buNone/>
+              <a:defRPr sz="1200" kern="1200">
+                <a:solidFill>
+                  <a:schemeClr val="accent1"/>
+                </a:solidFill>
+                <a:latin typeface="+mn-lt"/>
+                <a:ea typeface="+mn-ea"/>
+                <a:cs typeface="+mn-cs"/>
+              </a:defRPr>
+            </a:lvl2pPr>
+            <a:lvl3pPr marL="914400" indent="0" algn="l" defTabSz="914400" rtl="0" eaLnBrk="1" latinLnBrk="0" hangingPunct="1">
+              <a:lnSpc>
+                <a:spcPct val="90000"/>
+              </a:lnSpc>
+              <a:spcBef>
+                <a:spcPts val="200"/>
+              </a:spcBef>
+              <a:spcAft>
+                <a:spcPts val="400"/>
+              </a:spcAft>
+              <a:buClr>
+                <a:schemeClr val="accent1"/>
+              </a:buClr>
+              <a:buSzPct val="80000"/>
+              <a:buFont typeface="Corbel" pitchFamily="34" charset="0"/>
+              <a:buNone/>
+              <a:defRPr sz="1000" kern="1200">
+                <a:solidFill>
+                  <a:schemeClr val="accent1"/>
+                </a:solidFill>
+                <a:latin typeface="+mn-lt"/>
+                <a:ea typeface="+mn-ea"/>
+                <a:cs typeface="+mn-cs"/>
+              </a:defRPr>
+            </a:lvl3pPr>
+            <a:lvl4pPr marL="1371600" indent="0" algn="l" defTabSz="914400" rtl="0" eaLnBrk="1" latinLnBrk="0" hangingPunct="1">
+              <a:lnSpc>
+                <a:spcPct val="90000"/>
+              </a:lnSpc>
+              <a:spcBef>
+                <a:spcPts val="200"/>
+              </a:spcBef>
+              <a:spcAft>
+                <a:spcPts val="400"/>
+              </a:spcAft>
+              <a:buClr>
+                <a:schemeClr val="accent1"/>
+              </a:buClr>
+              <a:buSzPct val="80000"/>
+              <a:buFont typeface="Corbel" pitchFamily="34" charset="0"/>
+              <a:buNone/>
+              <a:defRPr sz="900" kern="1200">
+                <a:solidFill>
+                  <a:schemeClr val="accent1"/>
+                </a:solidFill>
+                <a:latin typeface="+mn-lt"/>
+                <a:ea typeface="+mn-ea"/>
+                <a:cs typeface="+mn-cs"/>
+              </a:defRPr>
+            </a:lvl4pPr>
+            <a:lvl5pPr marL="1828800" indent="0" algn="l" defTabSz="914400" rtl="0" eaLnBrk="1" latinLnBrk="0" hangingPunct="1">
+              <a:lnSpc>
+                <a:spcPct val="90000"/>
+              </a:lnSpc>
+              <a:spcBef>
+                <a:spcPts val="200"/>
+              </a:spcBef>
+              <a:spcAft>
+                <a:spcPts val="400"/>
+              </a:spcAft>
+              <a:buClr>
+                <a:schemeClr val="accent1"/>
+              </a:buClr>
+              <a:buSzPct val="80000"/>
+              <a:buFont typeface="Corbel" pitchFamily="34" charset="0"/>
+              <a:buNone/>
+              <a:defRPr sz="900" kern="1200">
+                <a:solidFill>
+                  <a:schemeClr val="accent1"/>
+                </a:solidFill>
+                <a:latin typeface="+mn-lt"/>
+                <a:ea typeface="+mn-ea"/>
+                <a:cs typeface="+mn-cs"/>
+              </a:defRPr>
+            </a:lvl5pPr>
+            <a:lvl6pPr marL="2286000" indent="0" algn="l" defTabSz="914400" rtl="0" eaLnBrk="1" latinLnBrk="0" hangingPunct="1">
+              <a:lnSpc>
+                <a:spcPct val="90000"/>
+              </a:lnSpc>
+              <a:spcBef>
+                <a:spcPts val="200"/>
+              </a:spcBef>
+              <a:spcAft>
+                <a:spcPts val="400"/>
+              </a:spcAft>
+              <a:buClr>
+                <a:schemeClr val="accent1"/>
+              </a:buClr>
+              <a:buSzPct val="80000"/>
+              <a:buFont typeface="Corbel" pitchFamily="34" charset="0"/>
+              <a:buNone/>
+              <a:defRPr sz="900" kern="1200">
+                <a:solidFill>
+                  <a:schemeClr val="accent1"/>
+                </a:solidFill>
+                <a:latin typeface="+mn-lt"/>
+                <a:ea typeface="+mn-ea"/>
+                <a:cs typeface="+mn-cs"/>
+              </a:defRPr>
+            </a:lvl6pPr>
+            <a:lvl7pPr marL="2743200" indent="0" algn="l" defTabSz="914400" rtl="0" eaLnBrk="1" latinLnBrk="0" hangingPunct="1">
+              <a:lnSpc>
+                <a:spcPct val="90000"/>
+              </a:lnSpc>
+              <a:spcBef>
+                <a:spcPts val="200"/>
+              </a:spcBef>
+              <a:spcAft>
+                <a:spcPts val="400"/>
+              </a:spcAft>
+              <a:buClr>
+                <a:schemeClr val="accent1"/>
+              </a:buClr>
+              <a:buSzPct val="80000"/>
+              <a:buFont typeface="Corbel" pitchFamily="34" charset="0"/>
+              <a:buNone/>
+              <a:defRPr sz="900" kern="1200">
+                <a:solidFill>
+                  <a:schemeClr val="accent1"/>
+                </a:solidFill>
+                <a:latin typeface="+mn-lt"/>
+                <a:ea typeface="+mn-ea"/>
+                <a:cs typeface="+mn-cs"/>
+              </a:defRPr>
+            </a:lvl7pPr>
+            <a:lvl8pPr marL="3200400" indent="0" algn="l" defTabSz="914400" rtl="0" eaLnBrk="1" latinLnBrk="0" hangingPunct="1">
+              <a:lnSpc>
+                <a:spcPct val="90000"/>
+              </a:lnSpc>
+              <a:spcBef>
+                <a:spcPts val="200"/>
+              </a:spcBef>
+              <a:spcAft>
+                <a:spcPts val="400"/>
+              </a:spcAft>
+              <a:buClr>
+                <a:schemeClr val="accent1"/>
+              </a:buClr>
+              <a:buSzPct val="80000"/>
+              <a:buFont typeface="Corbel" pitchFamily="34" charset="0"/>
+              <a:buNone/>
+              <a:defRPr sz="900" kern="1200">
+                <a:solidFill>
+                  <a:schemeClr val="accent1"/>
+                </a:solidFill>
+                <a:latin typeface="+mn-lt"/>
+                <a:ea typeface="+mn-ea"/>
+                <a:cs typeface="+mn-cs"/>
+              </a:defRPr>
+            </a:lvl8pPr>
+            <a:lvl9pPr marL="3657600" indent="0" algn="l" defTabSz="914400" rtl="0" eaLnBrk="1" latinLnBrk="0" hangingPunct="1">
+              <a:lnSpc>
+                <a:spcPct val="90000"/>
+              </a:lnSpc>
+              <a:spcBef>
+                <a:spcPts val="200"/>
+              </a:spcBef>
+              <a:spcAft>
+                <a:spcPts val="400"/>
+              </a:spcAft>
+              <a:buClr>
+                <a:schemeClr val="accent1"/>
+              </a:buClr>
+              <a:buSzPct val="80000"/>
+              <a:buFont typeface="Corbel" pitchFamily="34" charset="0"/>
+              <a:buNone/>
+              <a:defRPr sz="900" kern="1200">
+                <a:solidFill>
+                  <a:schemeClr val="accent1"/>
+                </a:solidFill>
+                <a:latin typeface="+mn-lt"/>
+                <a:ea typeface="+mn-ea"/>
+                <a:cs typeface="+mn-cs"/>
+              </a:defRPr>
+            </a:lvl9pPr>
+          </a:lstStyle>
+          <a:p>
+            <a:pPr marL="0" lvl="1" indent="-342900">
+              <a:lnSpc>
+                <a:spcPct val="150000"/>
+              </a:lnSpc>
+              <a:spcBef>
+                <a:spcPts val="600"/>
+              </a:spcBef>
+              <a:spcAft>
+                <a:spcPts val="600"/>
+              </a:spcAft>
+              <a:buFont typeface="Arial" panose="020B0604020202020204" pitchFamily="34" charset="0"/>
+              <a:buChar char="•"/>
+            </a:pPr>
+            <a:r>
+              <a:rPr lang="en-US" sz="2200" dirty="0" err="1">
+                <a:latin typeface="Tahoma" panose="020B0604030504040204" pitchFamily="34" charset="0"/>
+                <a:ea typeface="Tahoma" panose="020B0604030504040204" pitchFamily="34" charset="0"/>
+                <a:cs typeface="Tahoma" panose="020B0604030504040204" pitchFamily="34" charset="0"/>
+              </a:rPr>
+              <a:t>db.COLLECTION_NAME.remove</a:t>
+            </a:r>
+            <a:r>
+              <a:rPr lang="en-US" sz="2200" dirty="0">
+                <a:latin typeface="Tahoma" panose="020B0604030504040204" pitchFamily="34" charset="0"/>
+                <a:ea typeface="Tahoma" panose="020B0604030504040204" pitchFamily="34" charset="0"/>
+                <a:cs typeface="Tahoma" panose="020B0604030504040204" pitchFamily="34" charset="0"/>
+              </a:rPr>
+              <a:t>() -&gt; Deletes all documents in a collection</a:t>
+            </a:r>
+          </a:p>
+        </p:txBody>
+      </p:sp>
+    </p:spTree>
+    <p:extLst>
+      <p:ext uri="{BB962C8B-B14F-4D97-AF65-F5344CB8AC3E}">
+        <p14:creationId xmlns:p14="http://schemas.microsoft.com/office/powerpoint/2010/main" val="1686090818"/>
+      </p:ext>
+    </p:extLst>
+  </p:cSld>
+  <p:clrMapOvr>
+    <a:masterClrMapping/>
+  </p:clrMapOvr>
+</p:sld>
+</file>
+
+<file path=ppt/slides/slide16.xml><?xml version="1.0" encoding="utf-8"?>
+<p:sld xmlns:a="http://schemas.openxmlformats.org/drawingml/2006/main" xmlns:r="http://schemas.openxmlformats.org/officeDocument/2006/relationships" xmlns:p="http://schemas.openxmlformats.org/presentationml/2006/main">
+  <p:cSld>
+    <p:spTree>
+      <p:nvGrpSpPr>
+        <p:cNvPr id="1" name=""/>
+        <p:cNvGrpSpPr/>
+        <p:nvPr/>
+      </p:nvGrpSpPr>
+      <p:grpSpPr>
+        <a:xfrm>
+          <a:off x="0" y="0"/>
+          <a:ext cx="0" cy="0"/>
+          <a:chOff x="0" y="0"/>
+          <a:chExt cx="0" cy="0"/>
+        </a:xfrm>
+      </p:grpSpPr>
+      <p:sp>
+        <p:nvSpPr>
+          <p:cNvPr id="4" name="Content Placeholder 3">
+            <a:extLst>
+              <a:ext uri="{FF2B5EF4-FFF2-40B4-BE49-F238E27FC236}">
+                <a16:creationId xmlns:a16="http://schemas.microsoft.com/office/drawing/2014/main" id="{C73FF414-3511-4790-9099-1E632A6D975E}"/>
               </a:ext>
             </a:extLst>
           </p:cNvPr>
@@ -6465,20 +6811,678 @@
             <a:spLocks noGrp="1"/>
           </p:cNvSpPr>
           <p:nvPr>
-            <p:ph type="pic" idx="1"/>
+            <p:ph type="body" sz="half" idx="2"/>
           </p:nvPr>
         </p:nvSpPr>
         <p:spPr>
           <a:xfrm>
-            <a:off x="679703" y="2769703"/>
-            <a:ext cx="10832593" cy="3100743"/>
+            <a:off x="651453" y="718810"/>
+            <a:ext cx="5612982" cy="1666581"/>
           </a:xfrm>
         </p:spPr>
+        <p:txBody>
+          <a:bodyPr anchor="t">
+            <a:normAutofit/>
+          </a:bodyPr>
+          <a:lstStyle/>
+          <a:p>
+            <a:pPr indent="0">
+              <a:lnSpc>
+                <a:spcPct val="150000"/>
+              </a:lnSpc>
+              <a:spcBef>
+                <a:spcPts val="600"/>
+              </a:spcBef>
+              <a:spcAft>
+                <a:spcPts val="600"/>
+              </a:spcAft>
+              <a:buNone/>
+            </a:pPr>
+            <a:r>
+              <a:rPr lang="en-US" sz="2800" dirty="0">
+                <a:solidFill>
+                  <a:schemeClr val="tx1">
+                    <a:lumMod val="95000"/>
+                    <a:lumOff val="5000"/>
+                  </a:schemeClr>
+                </a:solidFill>
+                <a:latin typeface="Tahoma" panose="020B0604030504040204" pitchFamily="34" charset="0"/>
+                <a:ea typeface="Tahoma" panose="020B0604030504040204" pitchFamily="34" charset="0"/>
+                <a:cs typeface="Tahoma" panose="020B0604030504040204" pitchFamily="34" charset="0"/>
+              </a:rPr>
+              <a:t>5- Insert Document(s):</a:t>
+            </a:r>
+          </a:p>
+          <a:p>
+            <a:pPr marL="0" lvl="1" indent="-342900">
+              <a:lnSpc>
+                <a:spcPct val="150000"/>
+              </a:lnSpc>
+              <a:spcBef>
+                <a:spcPts val="600"/>
+              </a:spcBef>
+              <a:spcAft>
+                <a:spcPts val="600"/>
+              </a:spcAft>
+              <a:buFont typeface="Arial" panose="020B0604020202020204" pitchFamily="34" charset="0"/>
+              <a:buChar char="•"/>
+            </a:pPr>
+            <a:r>
+              <a:rPr lang="en-US" sz="2400" dirty="0" err="1">
+                <a:latin typeface="Tahoma" panose="020B0604030504040204" pitchFamily="34" charset="0"/>
+                <a:ea typeface="Tahoma" panose="020B0604030504040204" pitchFamily="34" charset="0"/>
+                <a:cs typeface="Tahoma" panose="020B0604030504040204" pitchFamily="34" charset="0"/>
+              </a:rPr>
+              <a:t>db.categories.insert</a:t>
+            </a:r>
+            <a:r>
+              <a:rPr lang="en-US" sz="2400" dirty="0">
+                <a:latin typeface="Tahoma" panose="020B0604030504040204" pitchFamily="34" charset="0"/>
+                <a:ea typeface="Tahoma" panose="020B0604030504040204" pitchFamily="34" charset="0"/>
+                <a:cs typeface="Tahoma" panose="020B0604030504040204" pitchFamily="34" charset="0"/>
+              </a:rPr>
+              <a:t>({DOCUMENT})</a:t>
+            </a:r>
+          </a:p>
+        </p:txBody>
+      </p:sp>
+      <p:pic>
+        <p:nvPicPr>
+          <p:cNvPr id="2" name="Picture 1">
+            <a:extLst>
+              <a:ext uri="{FF2B5EF4-FFF2-40B4-BE49-F238E27FC236}">
+                <a16:creationId xmlns:a16="http://schemas.microsoft.com/office/drawing/2014/main" id="{203425F0-2200-4CDE-96BB-48FB8F72393A}"/>
+              </a:ext>
+            </a:extLst>
+          </p:cNvPr>
+          <p:cNvPicPr>
+            <a:picLocks noChangeAspect="1"/>
+          </p:cNvPicPr>
+          <p:nvPr/>
+        </p:nvPicPr>
+        <p:blipFill>
+          <a:blip r:embed="rId2"/>
+          <a:stretch>
+            <a:fillRect/>
+          </a:stretch>
+        </p:blipFill>
+        <p:spPr>
+          <a:xfrm>
+            <a:off x="7044567" y="718810"/>
+            <a:ext cx="4180025" cy="5420380"/>
+          </a:xfrm>
+          <a:prstGeom prst="rect">
+            <a:avLst/>
+          </a:prstGeom>
+        </p:spPr>
+      </p:pic>
+      <p:pic>
+        <p:nvPicPr>
+          <p:cNvPr id="3" name="Picture 2">
+            <a:extLst>
+              <a:ext uri="{FF2B5EF4-FFF2-40B4-BE49-F238E27FC236}">
+                <a16:creationId xmlns:a16="http://schemas.microsoft.com/office/drawing/2014/main" id="{CAC68814-80B6-40BF-A542-57B7581372F7}"/>
+              </a:ext>
+            </a:extLst>
+          </p:cNvPr>
+          <p:cNvPicPr>
+            <a:picLocks noChangeAspect="1"/>
+          </p:cNvPicPr>
+          <p:nvPr/>
+        </p:nvPicPr>
+        <p:blipFill>
+          <a:blip r:embed="rId3"/>
+          <a:stretch>
+            <a:fillRect/>
+          </a:stretch>
+        </p:blipFill>
+        <p:spPr>
+          <a:xfrm>
+            <a:off x="651452" y="4784035"/>
+            <a:ext cx="6154661" cy="1355155"/>
+          </a:xfrm>
+          <a:prstGeom prst="rect">
+            <a:avLst/>
+          </a:prstGeom>
+        </p:spPr>
+      </p:pic>
+      <p:sp>
+        <p:nvSpPr>
+          <p:cNvPr id="8" name="Content Placeholder 3">
+            <a:extLst>
+              <a:ext uri="{FF2B5EF4-FFF2-40B4-BE49-F238E27FC236}">
+                <a16:creationId xmlns:a16="http://schemas.microsoft.com/office/drawing/2014/main" id="{13212B79-C3F5-4006-8CB8-EA76ACE802EA}"/>
+              </a:ext>
+            </a:extLst>
+          </p:cNvPr>
+          <p:cNvSpPr txBox="1">
+            <a:spLocks/>
+          </p:cNvSpPr>
+          <p:nvPr/>
+        </p:nvSpPr>
+        <p:spPr>
+          <a:xfrm>
+            <a:off x="651453" y="2806029"/>
+            <a:ext cx="5612982" cy="1666581"/>
+          </a:xfrm>
+          <a:prstGeom prst="rect">
+            <a:avLst/>
+          </a:prstGeom>
+        </p:spPr>
+        <p:txBody>
+          <a:bodyPr vert="horz" lIns="91440" tIns="45720" rIns="91440" bIns="45720" rtlCol="0" anchor="t">
+            <a:normAutofit/>
+          </a:bodyPr>
+          <a:lstStyle>
+            <a:lvl1pPr marL="0" indent="0" algn="l" defTabSz="914400" rtl="0" eaLnBrk="1" latinLnBrk="0" hangingPunct="1">
+              <a:lnSpc>
+                <a:spcPct val="100000"/>
+              </a:lnSpc>
+              <a:spcBef>
+                <a:spcPts val="1000"/>
+              </a:spcBef>
+              <a:buClr>
+                <a:schemeClr val="accent1"/>
+              </a:buClr>
+              <a:buSzPct val="80000"/>
+              <a:buFont typeface="Corbel" pitchFamily="34" charset="0"/>
+              <a:buNone/>
+              <a:defRPr sz="1700" kern="1200">
+                <a:solidFill>
+                  <a:schemeClr val="accent1"/>
+                </a:solidFill>
+                <a:latin typeface="+mn-lt"/>
+                <a:ea typeface="+mn-ea"/>
+                <a:cs typeface="+mn-cs"/>
+              </a:defRPr>
+            </a:lvl1pPr>
+            <a:lvl2pPr marL="457200" indent="0" algn="l" defTabSz="914400" rtl="0" eaLnBrk="1" latinLnBrk="0" hangingPunct="1">
+              <a:lnSpc>
+                <a:spcPct val="90000"/>
+              </a:lnSpc>
+              <a:spcBef>
+                <a:spcPts val="200"/>
+              </a:spcBef>
+              <a:spcAft>
+                <a:spcPts val="400"/>
+              </a:spcAft>
+              <a:buClr>
+                <a:schemeClr val="accent1"/>
+              </a:buClr>
+              <a:buSzPct val="80000"/>
+              <a:buFont typeface="Corbel" pitchFamily="34" charset="0"/>
+              <a:buNone/>
+              <a:defRPr sz="1200" kern="1200">
+                <a:solidFill>
+                  <a:schemeClr val="accent1"/>
+                </a:solidFill>
+                <a:latin typeface="+mn-lt"/>
+                <a:ea typeface="+mn-ea"/>
+                <a:cs typeface="+mn-cs"/>
+              </a:defRPr>
+            </a:lvl2pPr>
+            <a:lvl3pPr marL="914400" indent="0" algn="l" defTabSz="914400" rtl="0" eaLnBrk="1" latinLnBrk="0" hangingPunct="1">
+              <a:lnSpc>
+                <a:spcPct val="90000"/>
+              </a:lnSpc>
+              <a:spcBef>
+                <a:spcPts val="200"/>
+              </a:spcBef>
+              <a:spcAft>
+                <a:spcPts val="400"/>
+              </a:spcAft>
+              <a:buClr>
+                <a:schemeClr val="accent1"/>
+              </a:buClr>
+              <a:buSzPct val="80000"/>
+              <a:buFont typeface="Corbel" pitchFamily="34" charset="0"/>
+              <a:buNone/>
+              <a:defRPr sz="1000" kern="1200">
+                <a:solidFill>
+                  <a:schemeClr val="accent1"/>
+                </a:solidFill>
+                <a:latin typeface="+mn-lt"/>
+                <a:ea typeface="+mn-ea"/>
+                <a:cs typeface="+mn-cs"/>
+              </a:defRPr>
+            </a:lvl3pPr>
+            <a:lvl4pPr marL="1371600" indent="0" algn="l" defTabSz="914400" rtl="0" eaLnBrk="1" latinLnBrk="0" hangingPunct="1">
+              <a:lnSpc>
+                <a:spcPct val="90000"/>
+              </a:lnSpc>
+              <a:spcBef>
+                <a:spcPts val="200"/>
+              </a:spcBef>
+              <a:spcAft>
+                <a:spcPts val="400"/>
+              </a:spcAft>
+              <a:buClr>
+                <a:schemeClr val="accent1"/>
+              </a:buClr>
+              <a:buSzPct val="80000"/>
+              <a:buFont typeface="Corbel" pitchFamily="34" charset="0"/>
+              <a:buNone/>
+              <a:defRPr sz="900" kern="1200">
+                <a:solidFill>
+                  <a:schemeClr val="accent1"/>
+                </a:solidFill>
+                <a:latin typeface="+mn-lt"/>
+                <a:ea typeface="+mn-ea"/>
+                <a:cs typeface="+mn-cs"/>
+              </a:defRPr>
+            </a:lvl4pPr>
+            <a:lvl5pPr marL="1828800" indent="0" algn="l" defTabSz="914400" rtl="0" eaLnBrk="1" latinLnBrk="0" hangingPunct="1">
+              <a:lnSpc>
+                <a:spcPct val="90000"/>
+              </a:lnSpc>
+              <a:spcBef>
+                <a:spcPts val="200"/>
+              </a:spcBef>
+              <a:spcAft>
+                <a:spcPts val="400"/>
+              </a:spcAft>
+              <a:buClr>
+                <a:schemeClr val="accent1"/>
+              </a:buClr>
+              <a:buSzPct val="80000"/>
+              <a:buFont typeface="Corbel" pitchFamily="34" charset="0"/>
+              <a:buNone/>
+              <a:defRPr sz="900" kern="1200">
+                <a:solidFill>
+                  <a:schemeClr val="accent1"/>
+                </a:solidFill>
+                <a:latin typeface="+mn-lt"/>
+                <a:ea typeface="+mn-ea"/>
+                <a:cs typeface="+mn-cs"/>
+              </a:defRPr>
+            </a:lvl5pPr>
+            <a:lvl6pPr marL="2286000" indent="0" algn="l" defTabSz="914400" rtl="0" eaLnBrk="1" latinLnBrk="0" hangingPunct="1">
+              <a:lnSpc>
+                <a:spcPct val="90000"/>
+              </a:lnSpc>
+              <a:spcBef>
+                <a:spcPts val="200"/>
+              </a:spcBef>
+              <a:spcAft>
+                <a:spcPts val="400"/>
+              </a:spcAft>
+              <a:buClr>
+                <a:schemeClr val="accent1"/>
+              </a:buClr>
+              <a:buSzPct val="80000"/>
+              <a:buFont typeface="Corbel" pitchFamily="34" charset="0"/>
+              <a:buNone/>
+              <a:defRPr sz="900" kern="1200">
+                <a:solidFill>
+                  <a:schemeClr val="accent1"/>
+                </a:solidFill>
+                <a:latin typeface="+mn-lt"/>
+                <a:ea typeface="+mn-ea"/>
+                <a:cs typeface="+mn-cs"/>
+              </a:defRPr>
+            </a:lvl6pPr>
+            <a:lvl7pPr marL="2743200" indent="0" algn="l" defTabSz="914400" rtl="0" eaLnBrk="1" latinLnBrk="0" hangingPunct="1">
+              <a:lnSpc>
+                <a:spcPct val="90000"/>
+              </a:lnSpc>
+              <a:spcBef>
+                <a:spcPts val="200"/>
+              </a:spcBef>
+              <a:spcAft>
+                <a:spcPts val="400"/>
+              </a:spcAft>
+              <a:buClr>
+                <a:schemeClr val="accent1"/>
+              </a:buClr>
+              <a:buSzPct val="80000"/>
+              <a:buFont typeface="Corbel" pitchFamily="34" charset="0"/>
+              <a:buNone/>
+              <a:defRPr sz="900" kern="1200">
+                <a:solidFill>
+                  <a:schemeClr val="accent1"/>
+                </a:solidFill>
+                <a:latin typeface="+mn-lt"/>
+                <a:ea typeface="+mn-ea"/>
+                <a:cs typeface="+mn-cs"/>
+              </a:defRPr>
+            </a:lvl7pPr>
+            <a:lvl8pPr marL="3200400" indent="0" algn="l" defTabSz="914400" rtl="0" eaLnBrk="1" latinLnBrk="0" hangingPunct="1">
+              <a:lnSpc>
+                <a:spcPct val="90000"/>
+              </a:lnSpc>
+              <a:spcBef>
+                <a:spcPts val="200"/>
+              </a:spcBef>
+              <a:spcAft>
+                <a:spcPts val="400"/>
+              </a:spcAft>
+              <a:buClr>
+                <a:schemeClr val="accent1"/>
+              </a:buClr>
+              <a:buSzPct val="80000"/>
+              <a:buFont typeface="Corbel" pitchFamily="34" charset="0"/>
+              <a:buNone/>
+              <a:defRPr sz="900" kern="1200">
+                <a:solidFill>
+                  <a:schemeClr val="accent1"/>
+                </a:solidFill>
+                <a:latin typeface="+mn-lt"/>
+                <a:ea typeface="+mn-ea"/>
+                <a:cs typeface="+mn-cs"/>
+              </a:defRPr>
+            </a:lvl8pPr>
+            <a:lvl9pPr marL="3657600" indent="0" algn="l" defTabSz="914400" rtl="0" eaLnBrk="1" latinLnBrk="0" hangingPunct="1">
+              <a:lnSpc>
+                <a:spcPct val="90000"/>
+              </a:lnSpc>
+              <a:spcBef>
+                <a:spcPts val="200"/>
+              </a:spcBef>
+              <a:spcAft>
+                <a:spcPts val="400"/>
+              </a:spcAft>
+              <a:buClr>
+                <a:schemeClr val="accent1"/>
+              </a:buClr>
+              <a:buSzPct val="80000"/>
+              <a:buFont typeface="Corbel" pitchFamily="34" charset="0"/>
+              <a:buNone/>
+              <a:defRPr sz="900" kern="1200">
+                <a:solidFill>
+                  <a:schemeClr val="accent1"/>
+                </a:solidFill>
+                <a:latin typeface="+mn-lt"/>
+                <a:ea typeface="+mn-ea"/>
+                <a:cs typeface="+mn-cs"/>
+              </a:defRPr>
+            </a:lvl9pPr>
+          </a:lstStyle>
+          <a:p>
+            <a:pPr>
+              <a:spcBef>
+                <a:spcPts val="600"/>
+              </a:spcBef>
+              <a:spcAft>
+                <a:spcPts val="600"/>
+              </a:spcAft>
+            </a:pPr>
+            <a:r>
+              <a:rPr lang="en-US" sz="2800" dirty="0">
+                <a:solidFill>
+                  <a:schemeClr val="tx1">
+                    <a:lumMod val="95000"/>
+                    <a:lumOff val="5000"/>
+                  </a:schemeClr>
+                </a:solidFill>
+                <a:latin typeface="Tahoma" panose="020B0604030504040204" pitchFamily="34" charset="0"/>
+                <a:ea typeface="Tahoma" panose="020B0604030504040204" pitchFamily="34" charset="0"/>
+                <a:cs typeface="Tahoma" panose="020B0604030504040204" pitchFamily="34" charset="0"/>
+              </a:rPr>
+              <a:t>6- Delete a collection/database:</a:t>
+            </a:r>
+          </a:p>
+          <a:p>
+            <a:pPr marL="0" lvl="1" indent="-342900">
+              <a:lnSpc>
+                <a:spcPct val="100000"/>
+              </a:lnSpc>
+              <a:spcBef>
+                <a:spcPts val="600"/>
+              </a:spcBef>
+              <a:spcAft>
+                <a:spcPts val="600"/>
+              </a:spcAft>
+              <a:buFont typeface="Arial" panose="020B0604020202020204" pitchFamily="34" charset="0"/>
+              <a:buChar char="•"/>
+            </a:pPr>
+            <a:r>
+              <a:rPr lang="en-US" sz="2400" dirty="0">
+                <a:latin typeface="Tahoma" panose="020B0604030504040204" pitchFamily="34" charset="0"/>
+                <a:ea typeface="Tahoma" panose="020B0604030504040204" pitchFamily="34" charset="0"/>
+                <a:cs typeface="Tahoma" panose="020B0604030504040204" pitchFamily="34" charset="0"/>
+              </a:rPr>
+              <a:t>db. </a:t>
+            </a:r>
+            <a:r>
+              <a:rPr lang="en-US" sz="2400" dirty="0" err="1">
+                <a:latin typeface="Tahoma" panose="020B0604030504040204" pitchFamily="34" charset="0"/>
+                <a:ea typeface="Tahoma" panose="020B0604030504040204" pitchFamily="34" charset="0"/>
+                <a:cs typeface="Tahoma" panose="020B0604030504040204" pitchFamily="34" charset="0"/>
+              </a:rPr>
+              <a:t>COLLECTION_NAME.drop</a:t>
+            </a:r>
+            <a:r>
+              <a:rPr lang="en-US" sz="2400" dirty="0">
+                <a:latin typeface="Tahoma" panose="020B0604030504040204" pitchFamily="34" charset="0"/>
+                <a:ea typeface="Tahoma" panose="020B0604030504040204" pitchFamily="34" charset="0"/>
+                <a:cs typeface="Tahoma" panose="020B0604030504040204" pitchFamily="34" charset="0"/>
+              </a:rPr>
+              <a:t>()</a:t>
+            </a:r>
+          </a:p>
+          <a:p>
+            <a:pPr marL="0" lvl="1" indent="-342900">
+              <a:lnSpc>
+                <a:spcPct val="100000"/>
+              </a:lnSpc>
+              <a:spcBef>
+                <a:spcPts val="600"/>
+              </a:spcBef>
+              <a:spcAft>
+                <a:spcPts val="600"/>
+              </a:spcAft>
+              <a:buFont typeface="Arial" panose="020B0604020202020204" pitchFamily="34" charset="0"/>
+              <a:buChar char="•"/>
+            </a:pPr>
+            <a:r>
+              <a:rPr lang="en-US" sz="2400" dirty="0" err="1">
+                <a:latin typeface="Tahoma" panose="020B0604030504040204" pitchFamily="34" charset="0"/>
+                <a:ea typeface="Tahoma" panose="020B0604030504040204" pitchFamily="34" charset="0"/>
+                <a:cs typeface="Tahoma" panose="020B0604030504040204" pitchFamily="34" charset="0"/>
+              </a:rPr>
+              <a:t>db.dropDatabase</a:t>
+            </a:r>
+            <a:r>
+              <a:rPr lang="en-US" sz="2400" dirty="0">
+                <a:latin typeface="Tahoma" panose="020B0604030504040204" pitchFamily="34" charset="0"/>
+                <a:ea typeface="Tahoma" panose="020B0604030504040204" pitchFamily="34" charset="0"/>
+                <a:cs typeface="Tahoma" panose="020B0604030504040204" pitchFamily="34" charset="0"/>
+              </a:rPr>
+              <a:t>()</a:t>
+            </a:r>
+          </a:p>
+        </p:txBody>
       </p:sp>
     </p:spTree>
     <p:extLst>
       <p:ext uri="{BB962C8B-B14F-4D97-AF65-F5344CB8AC3E}">
-        <p14:creationId xmlns:p14="http://schemas.microsoft.com/office/powerpoint/2010/main" val="1686090818"/>
+        <p14:creationId xmlns:p14="http://schemas.microsoft.com/office/powerpoint/2010/main" val="2157789799"/>
+      </p:ext>
+    </p:extLst>
+  </p:cSld>
+  <p:clrMapOvr>
+    <a:masterClrMapping/>
+  </p:clrMapOvr>
+</p:sld>
+</file>
+
+<file path=ppt/slides/slide17.xml><?xml version="1.0" encoding="utf-8"?>
+<p:sld xmlns:a="http://schemas.openxmlformats.org/drawingml/2006/main" xmlns:r="http://schemas.openxmlformats.org/officeDocument/2006/relationships" xmlns:p="http://schemas.openxmlformats.org/presentationml/2006/main">
+  <p:cSld>
+    <p:spTree>
+      <p:nvGrpSpPr>
+        <p:cNvPr id="1" name=""/>
+        <p:cNvGrpSpPr/>
+        <p:nvPr/>
+      </p:nvGrpSpPr>
+      <p:grpSpPr>
+        <a:xfrm>
+          <a:off x="0" y="0"/>
+          <a:ext cx="0" cy="0"/>
+          <a:chOff x="0" y="0"/>
+          <a:chExt cx="0" cy="0"/>
+        </a:xfrm>
+      </p:grpSpPr>
+      <p:sp>
+        <p:nvSpPr>
+          <p:cNvPr id="2" name="Title 1">
+            <a:extLst>
+              <a:ext uri="{FF2B5EF4-FFF2-40B4-BE49-F238E27FC236}">
+                <a16:creationId xmlns:a16="http://schemas.microsoft.com/office/drawing/2014/main" id="{F2153DD3-C27C-457D-ADDD-066D01CB95CA}"/>
+              </a:ext>
+            </a:extLst>
+          </p:cNvPr>
+          <p:cNvSpPr>
+            <a:spLocks noGrp="1"/>
+          </p:cNvSpPr>
+          <p:nvPr>
+            <p:ph type="title"/>
+          </p:nvPr>
+        </p:nvSpPr>
+        <p:spPr>
+          <a:xfrm>
+            <a:off x="679704" y="1097280"/>
+            <a:ext cx="4395216" cy="1553155"/>
+          </a:xfrm>
+        </p:spPr>
+        <p:txBody>
+          <a:bodyPr anchor="t"/>
+          <a:lstStyle/>
+          <a:p>
+            <a:r>
+              <a:rPr lang="en-US" dirty="0">
+                <a:latin typeface="Rockwell" panose="02060603020205020403" pitchFamily="18" charset="0"/>
+              </a:rPr>
+              <a:t>Aggregation</a:t>
+            </a:r>
+          </a:p>
+        </p:txBody>
+      </p:sp>
+      <p:sp>
+        <p:nvSpPr>
+          <p:cNvPr id="4" name="Content Placeholder 3">
+            <a:extLst>
+              <a:ext uri="{FF2B5EF4-FFF2-40B4-BE49-F238E27FC236}">
+                <a16:creationId xmlns:a16="http://schemas.microsoft.com/office/drawing/2014/main" id="{C73FF414-3511-4790-9099-1E632A6D975E}"/>
+              </a:ext>
+            </a:extLst>
+          </p:cNvPr>
+          <p:cNvSpPr>
+            <a:spLocks noGrp="1"/>
+          </p:cNvSpPr>
+          <p:nvPr>
+            <p:ph type="body" sz="half" idx="2"/>
+          </p:nvPr>
+        </p:nvSpPr>
+        <p:spPr>
+          <a:xfrm>
+            <a:off x="679704" y="2001079"/>
+            <a:ext cx="10832592" cy="954156"/>
+          </a:xfrm>
+        </p:spPr>
+        <p:txBody>
+          <a:bodyPr>
+            <a:normAutofit/>
+          </a:bodyPr>
+          <a:lstStyle/>
+          <a:p>
+            <a:pPr marL="502920" indent="-457200">
+              <a:buFont typeface="Arial" panose="020B0604020202020204" pitchFamily="34" charset="0"/>
+              <a:buChar char="•"/>
+            </a:pPr>
+            <a:r>
+              <a:rPr lang="en-US" sz="2400" dirty="0" err="1">
+                <a:latin typeface="Tahoma" panose="020B0604030504040204" pitchFamily="34" charset="0"/>
+                <a:ea typeface="Tahoma" panose="020B0604030504040204" pitchFamily="34" charset="0"/>
+                <a:cs typeface="Tahoma" panose="020B0604030504040204" pitchFamily="34" charset="0"/>
+              </a:rPr>
+              <a:t>db.COLLECTION_NAME.aggregate</a:t>
+            </a:r>
+            <a:r>
+              <a:rPr lang="en-US" sz="2400" dirty="0">
+                <a:latin typeface="Tahoma" panose="020B0604030504040204" pitchFamily="34" charset="0"/>
+                <a:ea typeface="Tahoma" panose="020B0604030504040204" pitchFamily="34" charset="0"/>
+                <a:cs typeface="Tahoma" panose="020B0604030504040204" pitchFamily="34" charset="0"/>
+              </a:rPr>
+              <a:t>(AGGREGATE_OPERATION)</a:t>
+            </a:r>
+          </a:p>
+          <a:p>
+            <a:pPr marL="502920" indent="-457200">
+              <a:buFont typeface="Arial" panose="020B0604020202020204" pitchFamily="34" charset="0"/>
+              <a:buChar char="•"/>
+            </a:pPr>
+            <a:r>
+              <a:rPr lang="en-US" sz="2400" dirty="0">
+                <a:latin typeface="Tahoma" panose="020B0604030504040204" pitchFamily="34" charset="0"/>
+                <a:ea typeface="Tahoma" panose="020B0604030504040204" pitchFamily="34" charset="0"/>
+                <a:cs typeface="Tahoma" panose="020B0604030504040204" pitchFamily="34" charset="0"/>
+              </a:rPr>
+              <a:t>Such as: $sum, $avg, $max, $min, ..</a:t>
+            </a:r>
+            <a:r>
+              <a:rPr lang="en-US" sz="2400" dirty="0" err="1">
+                <a:latin typeface="Tahoma" panose="020B0604030504040204" pitchFamily="34" charset="0"/>
+                <a:ea typeface="Tahoma" panose="020B0604030504040204" pitchFamily="34" charset="0"/>
+                <a:cs typeface="Tahoma" panose="020B0604030504040204" pitchFamily="34" charset="0"/>
+              </a:rPr>
+              <a:t>etc</a:t>
+            </a:r>
+            <a:endParaRPr lang="en-US" sz="2400" dirty="0">
+              <a:solidFill>
+                <a:schemeClr val="tx1">
+                  <a:lumMod val="95000"/>
+                  <a:lumOff val="5000"/>
+                </a:schemeClr>
+              </a:solidFill>
+              <a:latin typeface="Tahoma" panose="020B0604030504040204" pitchFamily="34" charset="0"/>
+              <a:ea typeface="Tahoma" panose="020B0604030504040204" pitchFamily="34" charset="0"/>
+              <a:cs typeface="Tahoma" panose="020B0604030504040204" pitchFamily="34" charset="0"/>
+            </a:endParaRPr>
+          </a:p>
+          <a:p>
+            <a:endParaRPr lang="en-US" sz="2200" dirty="0">
+              <a:latin typeface="Tahoma" panose="020B0604030504040204" pitchFamily="34" charset="0"/>
+              <a:ea typeface="Tahoma" panose="020B0604030504040204" pitchFamily="34" charset="0"/>
+              <a:cs typeface="Tahoma" panose="020B0604030504040204" pitchFamily="34" charset="0"/>
+            </a:endParaRPr>
+          </a:p>
+        </p:txBody>
+      </p:sp>
+      <p:pic>
+        <p:nvPicPr>
+          <p:cNvPr id="6" name="Picture 5">
+            <a:extLst>
+              <a:ext uri="{FF2B5EF4-FFF2-40B4-BE49-F238E27FC236}">
+                <a16:creationId xmlns:a16="http://schemas.microsoft.com/office/drawing/2014/main" id="{61BA847A-5330-40C9-9474-05B10981C5FD}"/>
+              </a:ext>
+            </a:extLst>
+          </p:cNvPr>
+          <p:cNvPicPr>
+            <a:picLocks noChangeAspect="1"/>
+          </p:cNvPicPr>
+          <p:nvPr/>
+        </p:nvPicPr>
+        <p:blipFill>
+          <a:blip r:embed="rId2"/>
+          <a:stretch>
+            <a:fillRect/>
+          </a:stretch>
+        </p:blipFill>
+        <p:spPr>
+          <a:xfrm>
+            <a:off x="679704" y="3220944"/>
+            <a:ext cx="10832592" cy="2659046"/>
+          </a:xfrm>
+          <a:prstGeom prst="rect">
+            <a:avLst/>
+          </a:prstGeom>
+        </p:spPr>
+      </p:pic>
+    </p:spTree>
+    <p:extLst>
+      <p:ext uri="{BB962C8B-B14F-4D97-AF65-F5344CB8AC3E}">
+        <p14:creationId xmlns:p14="http://schemas.microsoft.com/office/powerpoint/2010/main" val="713418646"/>
       </p:ext>
     </p:extLst>
   </p:cSld>
@@ -6552,7 +7556,7 @@
               <a:buNone/>
             </a:pPr>
             <a:r>
-              <a:rPr lang="en-US" dirty="0">
+              <a:rPr lang="en-US" b="1" dirty="0">
                 <a:latin typeface="Rockwell"/>
                 <a:ea typeface="Rockwell"/>
                 <a:cs typeface="Rockwell"/>
@@ -6560,7 +7564,7 @@
               </a:rPr>
               <a:t>Introduction - What Does NOSQL mean?</a:t>
             </a:r>
-            <a:endParaRPr dirty="0"/>
+            <a:endParaRPr b="1" dirty="0"/>
           </a:p>
         </p:txBody>
       </p:sp>
@@ -9166,14 +10170,6 @@
 </file>
 
 <file path=customXml/item1.xml><?xml version="1.0" encoding="utf-8"?>
-<p:properties xmlns:p="http://schemas.microsoft.com/office/2006/metadata/properties" xmlns:xsi="http://www.w3.org/2001/XMLSchema-instance" xmlns:pc="http://schemas.microsoft.com/office/infopath/2007/PartnerControls">
-  <documentManagement>
-    <MediaServiceKeyPoints xmlns="71af3243-3dd4-4a8d-8c0d-dd76da1f02a5" xsi:nil="true"/>
-  </documentManagement>
-</p:properties>
-</file>
-
-<file path=customXml/item2.xml><?xml version="1.0" encoding="utf-8"?>
 <ct:contentTypeSchema xmlns:ct="http://schemas.microsoft.com/office/2006/metadata/contentType" xmlns:ma="http://schemas.microsoft.com/office/2006/metadata/properties/metaAttributes" ct:_="" ma:_="" ma:contentTypeName="Document" ma:contentTypeID="0x01010079F111ED35F8CC479449609E8A0923A6" ma:contentTypeVersion="11" ma:contentTypeDescription="Create a new document." ma:contentTypeScope="" ma:versionID="96291512c1ee715ab617f4c07df79fc1">
   <xsd:schema xmlns:xsd="http://www.w3.org/2001/XMLSchema" xmlns:xs="http://www.w3.org/2001/XMLSchema" xmlns:p="http://schemas.microsoft.com/office/2006/metadata/properties" xmlns:ns2="71af3243-3dd4-4a8d-8c0d-dd76da1f02a5" xmlns:ns3="16c05727-aa75-4e4a-9b5f-8a80a1165891" targetNamespace="http://schemas.microsoft.com/office/2006/metadata/properties" ma:root="true" ma:fieldsID="8256c27c40ca5c40ce1cf6c44f0205df" ns2:_="" ns3:_="">
     <xsd:import namespace="71af3243-3dd4-4a8d-8c0d-dd76da1f02a5"/>
@@ -9384,6 +10380,14 @@
 </ct:contentTypeSchema>
 </file>
 
+<file path=customXml/item2.xml><?xml version="1.0" encoding="utf-8"?>
+<p:properties xmlns:p="http://schemas.microsoft.com/office/2006/metadata/properties" xmlns:xsi="http://www.w3.org/2001/XMLSchema-instance" xmlns:pc="http://schemas.microsoft.com/office/infopath/2007/PartnerControls">
+  <documentManagement>
+    <MediaServiceKeyPoints xmlns="71af3243-3dd4-4a8d-8c0d-dd76da1f02a5" xsi:nil="true"/>
+  </documentManagement>
+</p:properties>
+</file>
+
 <file path=customXml/item3.xml><?xml version="1.0" encoding="utf-8"?>
 <?mso-contentType ?>
 <FormTemplates xmlns="http://schemas.microsoft.com/sharepoint/v3/contenttype/forms">
@@ -9394,16 +10398,6 @@
 </file>
 
 <file path=customXml/itemProps1.xml><?xml version="1.0" encoding="utf-8"?>
-<ds:datastoreItem xmlns:ds="http://schemas.openxmlformats.org/officeDocument/2006/customXml" ds:itemID="{3D6CA70E-ED75-4FF0-A862-8EF12B737755}">
-  <ds:schemaRefs>
-    <ds:schemaRef ds:uri="http://schemas.microsoft.com/office/2006/metadata/properties"/>
-    <ds:schemaRef ds:uri="http://schemas.microsoft.com/office/infopath/2007/PartnerControls"/>
-    <ds:schemaRef ds:uri="71af3243-3dd4-4a8d-8c0d-dd76da1f02a5"/>
-  </ds:schemaRefs>
-</ds:datastoreItem>
-</file>
-
-<file path=customXml/itemProps2.xml><?xml version="1.0" encoding="utf-8"?>
 <ds:datastoreItem xmlns:ds="http://schemas.openxmlformats.org/officeDocument/2006/customXml" ds:itemID="{79B27744-7857-4992-B755-05855FC59147}">
   <ds:schemaRefs>
     <ds:schemaRef ds:uri="http://schemas.microsoft.com/office/2006/metadata/contentType"/>
@@ -9422,6 +10416,16 @@
 </ds:datastoreItem>
 </file>
 
+<file path=customXml/itemProps2.xml><?xml version="1.0" encoding="utf-8"?>
+<ds:datastoreItem xmlns:ds="http://schemas.openxmlformats.org/officeDocument/2006/customXml" ds:itemID="{3D6CA70E-ED75-4FF0-A862-8EF12B737755}">
+  <ds:schemaRefs>
+    <ds:schemaRef ds:uri="http://schemas.microsoft.com/office/2006/metadata/properties"/>
+    <ds:schemaRef ds:uri="http://schemas.microsoft.com/office/infopath/2007/PartnerControls"/>
+    <ds:schemaRef ds:uri="71af3243-3dd4-4a8d-8c0d-dd76da1f02a5"/>
+  </ds:schemaRefs>
+</ds:datastoreItem>
+</file>
+
 <file path=customXml/itemProps3.xml><?xml version="1.0" encoding="utf-8"?>
 <ds:datastoreItem xmlns:ds="http://schemas.openxmlformats.org/officeDocument/2006/customXml" ds:itemID="{ABF1ABED-93B7-45AC-A513-2CB1FF159AFF}">
   <ds:schemaRefs>

</xml_diff>